<commit_message>
Add dot11n TX support....
</commit_message>
<xml_diff>
--- a/cora.pptx
+++ b/cora.pptx
@@ -5,7 +5,7 @@
     <p:sldMasterId id="2147483648" r:id="rId1"/>
   </p:sldMasterIdLst>
   <p:notesMasterIdLst>
-    <p:notesMasterId r:id="rId26"/>
+    <p:notesMasterId r:id="rId27"/>
   </p:notesMasterIdLst>
   <p:sldIdLst>
     <p:sldId id="256" r:id="rId2"/>
@@ -28,10 +28,11 @@
     <p:sldId id="279" r:id="rId19"/>
     <p:sldId id="284" r:id="rId20"/>
     <p:sldId id="283" r:id="rId21"/>
-    <p:sldId id="278" r:id="rId22"/>
-    <p:sldId id="274" r:id="rId23"/>
-    <p:sldId id="286" r:id="rId24"/>
-    <p:sldId id="285" r:id="rId25"/>
+    <p:sldId id="287" r:id="rId22"/>
+    <p:sldId id="278" r:id="rId23"/>
+    <p:sldId id="274" r:id="rId24"/>
+    <p:sldId id="286" r:id="rId25"/>
+    <p:sldId id="285" r:id="rId26"/>
   </p:sldIdLst>
   <p:sldSz cx="9144000" cy="6858000" type="screen4x3"/>
   <p:notesSz cx="6858000" cy="9144000"/>
@@ -163,6 +164,11 @@
           <p14:sldIdLst>
             <p14:sldId id="284"/>
             <p14:sldId id="283"/>
+          </p14:sldIdLst>
+        </p14:section>
+        <p14:section name="802.11n TX" id="{9734BDA1-1F8F-4FF2-9E9E-5743E66C36B8}">
+          <p14:sldIdLst>
+            <p14:sldId id="287"/>
           </p14:sldIdLst>
         </p14:section>
         <p14:section name="Roadmap" id="{892E4002-CEC3-4108-9836-F37F5C3BCB70}">
@@ -4923,7 +4929,7 @@
           <a:p>
             <a:fld id="{1CCAE213-0BEA-41FB-800D-FF7841C35566}" type="datetimeFigureOut">
               <a:rPr lang="zh-CN" altLang="en-US" smtClean="0"/>
-              <a:t>2012/4/12</a:t>
+              <a:t>2012/5/15</a:t>
             </a:fld>
             <a:endParaRPr lang="zh-CN" altLang="en-US"/>
           </a:p>
@@ -5645,7 +5651,7 @@
             <a:fld id="{1D8BD707-D9CF-40AE-B4C6-C98DA3205C09}" type="datetimeFigureOut">
               <a:rPr lang="en-US" smtClean="0"/>
               <a:pPr/>
-              <a:t>4/12/2012</a:t>
+              <a:t>5/15/2012</a:t>
             </a:fld>
             <a:endParaRPr lang="en-US"/>
           </a:p>
@@ -5822,7 +5828,7 @@
             <a:fld id="{1D8BD707-D9CF-40AE-B4C6-C98DA3205C09}" type="datetimeFigureOut">
               <a:rPr lang="en-US" smtClean="0"/>
               <a:pPr/>
-              <a:t>4/12/2012</a:t>
+              <a:t>5/15/2012</a:t>
             </a:fld>
             <a:endParaRPr lang="en-US"/>
           </a:p>
@@ -5989,7 +5995,7 @@
             <a:fld id="{1D8BD707-D9CF-40AE-B4C6-C98DA3205C09}" type="datetimeFigureOut">
               <a:rPr lang="en-US" smtClean="0"/>
               <a:pPr/>
-              <a:t>4/12/2012</a:t>
+              <a:t>5/15/2012</a:t>
             </a:fld>
             <a:endParaRPr lang="en-US"/>
           </a:p>
@@ -6232,7 +6238,7 @@
             <a:fld id="{1D8BD707-D9CF-40AE-B4C6-C98DA3205C09}" type="datetimeFigureOut">
               <a:rPr lang="en-US" smtClean="0"/>
               <a:pPr/>
-              <a:t>4/12/2012</a:t>
+              <a:t>5/15/2012</a:t>
             </a:fld>
             <a:endParaRPr lang="en-US"/>
           </a:p>
@@ -6517,7 +6523,7 @@
             <a:fld id="{1D8BD707-D9CF-40AE-B4C6-C98DA3205C09}" type="datetimeFigureOut">
               <a:rPr lang="en-US" smtClean="0"/>
               <a:pPr/>
-              <a:t>4/12/2012</a:t>
+              <a:t>5/15/2012</a:t>
             </a:fld>
             <a:endParaRPr lang="en-US"/>
           </a:p>
@@ -6936,7 +6942,7 @@
             <a:fld id="{1D8BD707-D9CF-40AE-B4C6-C98DA3205C09}" type="datetimeFigureOut">
               <a:rPr lang="en-US" smtClean="0"/>
               <a:pPr/>
-              <a:t>4/12/2012</a:t>
+              <a:t>5/15/2012</a:t>
             </a:fld>
             <a:endParaRPr lang="en-US"/>
           </a:p>
@@ -7051,7 +7057,7 @@
             <a:fld id="{1D8BD707-D9CF-40AE-B4C6-C98DA3205C09}" type="datetimeFigureOut">
               <a:rPr lang="en-US" smtClean="0"/>
               <a:pPr/>
-              <a:t>4/12/2012</a:t>
+              <a:t>5/15/2012</a:t>
             </a:fld>
             <a:endParaRPr lang="en-US"/>
           </a:p>
@@ -7143,7 +7149,7 @@
             <a:fld id="{1D8BD707-D9CF-40AE-B4C6-C98DA3205C09}" type="datetimeFigureOut">
               <a:rPr lang="en-US" smtClean="0"/>
               <a:pPr/>
-              <a:t>4/12/2012</a:t>
+              <a:t>5/15/2012</a:t>
             </a:fld>
             <a:endParaRPr lang="en-US"/>
           </a:p>
@@ -7417,7 +7423,7 @@
             <a:fld id="{1D8BD707-D9CF-40AE-B4C6-C98DA3205C09}" type="datetimeFigureOut">
               <a:rPr lang="en-US" smtClean="0"/>
               <a:pPr/>
-              <a:t>4/12/2012</a:t>
+              <a:t>5/15/2012</a:t>
             </a:fld>
             <a:endParaRPr lang="en-US"/>
           </a:p>
@@ -7667,7 +7673,7 @@
             <a:fld id="{1D8BD707-D9CF-40AE-B4C6-C98DA3205C09}" type="datetimeFigureOut">
               <a:rPr lang="en-US" smtClean="0"/>
               <a:pPr/>
-              <a:t>4/12/2012</a:t>
+              <a:t>5/15/2012</a:t>
             </a:fld>
             <a:endParaRPr lang="en-US"/>
           </a:p>
@@ -7877,7 +7883,7 @@
             <a:fld id="{1D8BD707-D9CF-40AE-B4C6-C98DA3205C09}" type="datetimeFigureOut">
               <a:rPr lang="en-US" smtClean="0"/>
               <a:pPr/>
-              <a:t>4/12/2012</a:t>
+              <a:t>5/15/2012</a:t>
             </a:fld>
             <a:endParaRPr lang="en-US"/>
           </a:p>
@@ -8288,11 +8294,7 @@
           <a:p>
             <a:r>
               <a:rPr lang="en-US" altLang="zh-CN" dirty="0" smtClean="0"/>
-              <a:t>FANG </a:t>
-            </a:r>
-            <a:r>
-              <a:rPr lang="en-US" altLang="zh-CN" dirty="0" smtClean="0"/>
-              <a:t>Ji</a:t>
+              <a:t>FANG Ji</a:t>
             </a:r>
             <a:endParaRPr lang="zh-CN" altLang="en-US" dirty="0"/>
           </a:p>
@@ -16015,6 +16017,1517 @@
           <a:lstStyle/>
           <a:p>
             <a:r>
+              <a:rPr lang="en-US" dirty="0" smtClean="0"/>
+              <a:t>802.11n TX</a:t>
+            </a:r>
+            <a:endParaRPr lang="en-US" dirty="0"/>
+          </a:p>
+        </p:txBody>
+      </p:sp>
+      <p:sp>
+        <p:nvSpPr>
+          <p:cNvPr id="4" name="Rectangle 3"/>
+          <p:cNvSpPr/>
+          <p:nvPr/>
+        </p:nvSpPr>
+        <p:spPr>
+          <a:xfrm>
+            <a:off x="173400" y="1905000"/>
+            <a:ext cx="540000" cy="360000"/>
+          </a:xfrm>
+          <a:prstGeom prst="rect">
+            <a:avLst/>
+          </a:prstGeom>
+        </p:spPr>
+        <p:style>
+          <a:lnRef idx="2">
+            <a:schemeClr val="accent1">
+              <a:shade val="50000"/>
+            </a:schemeClr>
+          </a:lnRef>
+          <a:fillRef idx="1">
+            <a:schemeClr val="accent1"/>
+          </a:fillRef>
+          <a:effectRef idx="0">
+            <a:schemeClr val="accent1"/>
+          </a:effectRef>
+          <a:fontRef idx="minor">
+            <a:schemeClr val="lt1"/>
+          </a:fontRef>
+        </p:style>
+        <p:txBody>
+          <a:bodyPr rtlCol="0" anchor="ctr"/>
+          <a:lstStyle/>
+          <a:p>
+            <a:pPr algn="ctr"/>
+            <a:r>
+              <a:rPr lang="en-US" sz="900" dirty="0" smtClean="0"/>
+              <a:t>L_STF</a:t>
+            </a:r>
+            <a:endParaRPr lang="en-US" sz="900" dirty="0"/>
+          </a:p>
+        </p:txBody>
+      </p:sp>
+      <p:sp>
+        <p:nvSpPr>
+          <p:cNvPr id="5" name="Rectangle 4"/>
+          <p:cNvSpPr/>
+          <p:nvPr/>
+        </p:nvSpPr>
+        <p:spPr>
+          <a:xfrm>
+            <a:off x="7689087" y="1800717"/>
+            <a:ext cx="457200" cy="4904883"/>
+          </a:xfrm>
+          <a:prstGeom prst="rect">
+            <a:avLst/>
+          </a:prstGeom>
+        </p:spPr>
+        <p:style>
+          <a:lnRef idx="2">
+            <a:schemeClr val="accent1">
+              <a:shade val="50000"/>
+            </a:schemeClr>
+          </a:lnRef>
+          <a:fillRef idx="1">
+            <a:schemeClr val="accent1"/>
+          </a:fillRef>
+          <a:effectRef idx="0">
+            <a:schemeClr val="accent1"/>
+          </a:effectRef>
+          <a:fontRef idx="minor">
+            <a:schemeClr val="lt1"/>
+          </a:fontRef>
+        </p:style>
+        <p:txBody>
+          <a:bodyPr rtlCol="0" anchor="ctr"/>
+          <a:lstStyle/>
+          <a:p>
+            <a:pPr algn="ctr"/>
+            <a:r>
+              <a:rPr lang="en-US" dirty="0" smtClean="0"/>
+              <a:t>TX</a:t>
+            </a:r>
+            <a:endParaRPr lang="en-US" dirty="0"/>
+          </a:p>
+        </p:txBody>
+      </p:sp>
+      <p:sp>
+        <p:nvSpPr>
+          <p:cNvPr id="6" name="Rectangle 5"/>
+          <p:cNvSpPr/>
+          <p:nvPr/>
+        </p:nvSpPr>
+        <p:spPr>
+          <a:xfrm>
+            <a:off x="173400" y="2280536"/>
+            <a:ext cx="540000" cy="360000"/>
+          </a:xfrm>
+          <a:prstGeom prst="rect">
+            <a:avLst/>
+          </a:prstGeom>
+        </p:spPr>
+        <p:style>
+          <a:lnRef idx="2">
+            <a:schemeClr val="accent1">
+              <a:shade val="50000"/>
+            </a:schemeClr>
+          </a:lnRef>
+          <a:fillRef idx="1">
+            <a:schemeClr val="accent1"/>
+          </a:fillRef>
+          <a:effectRef idx="0">
+            <a:schemeClr val="accent1"/>
+          </a:effectRef>
+          <a:fontRef idx="minor">
+            <a:schemeClr val="lt1"/>
+          </a:fontRef>
+        </p:style>
+        <p:txBody>
+          <a:bodyPr rtlCol="0" anchor="ctr"/>
+          <a:lstStyle/>
+          <a:p>
+            <a:pPr algn="ctr"/>
+            <a:r>
+              <a:rPr lang="en-US" sz="900" dirty="0" smtClean="0"/>
+              <a:t>L_LTF</a:t>
+            </a:r>
+            <a:endParaRPr lang="en-US" sz="900" dirty="0"/>
+          </a:p>
+        </p:txBody>
+      </p:sp>
+      <p:sp>
+        <p:nvSpPr>
+          <p:cNvPr id="25" name="Rectangle 24"/>
+          <p:cNvSpPr/>
+          <p:nvPr/>
+        </p:nvSpPr>
+        <p:spPr>
+          <a:xfrm>
+            <a:off x="173400" y="2640536"/>
+            <a:ext cx="540000" cy="360000"/>
+          </a:xfrm>
+          <a:prstGeom prst="rect">
+            <a:avLst/>
+          </a:prstGeom>
+        </p:spPr>
+        <p:style>
+          <a:lnRef idx="2">
+            <a:schemeClr val="accent2">
+              <a:shade val="50000"/>
+            </a:schemeClr>
+          </a:lnRef>
+          <a:fillRef idx="1">
+            <a:schemeClr val="accent2"/>
+          </a:fillRef>
+          <a:effectRef idx="0">
+            <a:schemeClr val="accent2"/>
+          </a:effectRef>
+          <a:fontRef idx="minor">
+            <a:schemeClr val="lt1"/>
+          </a:fontRef>
+        </p:style>
+        <p:txBody>
+          <a:bodyPr rtlCol="0" anchor="ctr"/>
+          <a:lstStyle/>
+          <a:p>
+            <a:pPr algn="ctr"/>
+            <a:r>
+              <a:rPr lang="en-US" sz="900" dirty="0" smtClean="0"/>
+              <a:t>L_SIG</a:t>
+            </a:r>
+            <a:endParaRPr lang="en-US" sz="900" dirty="0"/>
+          </a:p>
+        </p:txBody>
+      </p:sp>
+      <p:sp>
+        <p:nvSpPr>
+          <p:cNvPr id="26" name="Rectangle 25"/>
+          <p:cNvSpPr/>
+          <p:nvPr/>
+        </p:nvSpPr>
+        <p:spPr>
+          <a:xfrm>
+            <a:off x="914400" y="2656254"/>
+            <a:ext cx="540000" cy="360000"/>
+          </a:xfrm>
+          <a:prstGeom prst="rect">
+            <a:avLst/>
+          </a:prstGeom>
+        </p:spPr>
+        <p:style>
+          <a:lnRef idx="2">
+            <a:schemeClr val="accent2">
+              <a:shade val="50000"/>
+            </a:schemeClr>
+          </a:lnRef>
+          <a:fillRef idx="1">
+            <a:schemeClr val="accent2"/>
+          </a:fillRef>
+          <a:effectRef idx="0">
+            <a:schemeClr val="accent2"/>
+          </a:effectRef>
+          <a:fontRef idx="minor">
+            <a:schemeClr val="lt1"/>
+          </a:fontRef>
+        </p:style>
+        <p:txBody>
+          <a:bodyPr rtlCol="0" anchor="ctr"/>
+          <a:lstStyle/>
+          <a:p>
+            <a:pPr algn="ctr"/>
+            <a:r>
+              <a:rPr lang="en-US" sz="900" dirty="0" smtClean="0"/>
+              <a:t>conv12</a:t>
+            </a:r>
+            <a:endParaRPr lang="en-US" sz="900" dirty="0"/>
+          </a:p>
+        </p:txBody>
+      </p:sp>
+      <p:sp>
+        <p:nvSpPr>
+          <p:cNvPr id="27" name="Rectangle 26"/>
+          <p:cNvSpPr/>
+          <p:nvPr/>
+        </p:nvSpPr>
+        <p:spPr>
+          <a:xfrm>
+            <a:off x="1917979" y="2659594"/>
+            <a:ext cx="540000" cy="360000"/>
+          </a:xfrm>
+          <a:prstGeom prst="rect">
+            <a:avLst/>
+          </a:prstGeom>
+        </p:spPr>
+        <p:style>
+          <a:lnRef idx="2">
+            <a:schemeClr val="accent2">
+              <a:shade val="50000"/>
+            </a:schemeClr>
+          </a:lnRef>
+          <a:fillRef idx="1">
+            <a:schemeClr val="accent2"/>
+          </a:fillRef>
+          <a:effectRef idx="0">
+            <a:schemeClr val="accent2"/>
+          </a:effectRef>
+          <a:fontRef idx="minor">
+            <a:schemeClr val="lt1"/>
+          </a:fontRef>
+        </p:style>
+        <p:txBody>
+          <a:bodyPr rtlCol="0" anchor="ctr"/>
+          <a:lstStyle/>
+          <a:p>
+            <a:pPr algn="ctr"/>
+            <a:r>
+              <a:rPr lang="en-US" sz="900" dirty="0" err="1" smtClean="0"/>
+              <a:t>interlv</a:t>
+            </a:r>
+            <a:endParaRPr lang="en-US" sz="900" dirty="0"/>
+          </a:p>
+        </p:txBody>
+      </p:sp>
+      <p:sp>
+        <p:nvSpPr>
+          <p:cNvPr id="28" name="Rectangle 27"/>
+          <p:cNvSpPr/>
+          <p:nvPr/>
+        </p:nvSpPr>
+        <p:spPr>
+          <a:xfrm>
+            <a:off x="2819400" y="2652936"/>
+            <a:ext cx="540000" cy="360000"/>
+          </a:xfrm>
+          <a:prstGeom prst="rect">
+            <a:avLst/>
+          </a:prstGeom>
+        </p:spPr>
+        <p:style>
+          <a:lnRef idx="2">
+            <a:schemeClr val="accent2">
+              <a:shade val="50000"/>
+            </a:schemeClr>
+          </a:lnRef>
+          <a:fillRef idx="1">
+            <a:schemeClr val="accent2"/>
+          </a:fillRef>
+          <a:effectRef idx="0">
+            <a:schemeClr val="accent2"/>
+          </a:effectRef>
+          <a:fontRef idx="minor">
+            <a:schemeClr val="lt1"/>
+          </a:fontRef>
+        </p:style>
+        <p:txBody>
+          <a:bodyPr rtlCol="0" anchor="ctr"/>
+          <a:lstStyle/>
+          <a:p>
+            <a:pPr algn="ctr"/>
+            <a:r>
+              <a:rPr lang="en-US" sz="900" dirty="0" err="1" smtClean="0"/>
+              <a:t>BPSK_i</a:t>
+            </a:r>
+            <a:endParaRPr lang="en-US" sz="900" dirty="0"/>
+          </a:p>
+        </p:txBody>
+      </p:sp>
+      <p:sp>
+        <p:nvSpPr>
+          <p:cNvPr id="29" name="Rectangle 28"/>
+          <p:cNvSpPr/>
+          <p:nvPr/>
+        </p:nvSpPr>
+        <p:spPr>
+          <a:xfrm>
+            <a:off x="3720100" y="2640536"/>
+            <a:ext cx="540000" cy="360000"/>
+          </a:xfrm>
+          <a:prstGeom prst="rect">
+            <a:avLst/>
+          </a:prstGeom>
+        </p:spPr>
+        <p:style>
+          <a:lnRef idx="2">
+            <a:schemeClr val="accent2">
+              <a:shade val="50000"/>
+            </a:schemeClr>
+          </a:lnRef>
+          <a:fillRef idx="1">
+            <a:schemeClr val="accent2"/>
+          </a:fillRef>
+          <a:effectRef idx="0">
+            <a:schemeClr val="accent2"/>
+          </a:effectRef>
+          <a:fontRef idx="minor">
+            <a:schemeClr val="lt1"/>
+          </a:fontRef>
+        </p:style>
+        <p:txBody>
+          <a:bodyPr rtlCol="0" anchor="ctr"/>
+          <a:lstStyle/>
+          <a:p>
+            <a:pPr algn="ctr"/>
+            <a:r>
+              <a:rPr lang="en-US" sz="900" dirty="0" smtClean="0"/>
+              <a:t>Pilot</a:t>
+            </a:r>
+            <a:endParaRPr lang="en-US" sz="900" dirty="0"/>
+          </a:p>
+        </p:txBody>
+      </p:sp>
+      <p:sp>
+        <p:nvSpPr>
+          <p:cNvPr id="30" name="Rectangle 29"/>
+          <p:cNvSpPr/>
+          <p:nvPr/>
+        </p:nvSpPr>
+        <p:spPr>
+          <a:xfrm>
+            <a:off x="4572000" y="2659594"/>
+            <a:ext cx="540000" cy="360000"/>
+          </a:xfrm>
+          <a:prstGeom prst="rect">
+            <a:avLst/>
+          </a:prstGeom>
+        </p:spPr>
+        <p:style>
+          <a:lnRef idx="2">
+            <a:schemeClr val="accent2">
+              <a:shade val="50000"/>
+            </a:schemeClr>
+          </a:lnRef>
+          <a:fillRef idx="1">
+            <a:schemeClr val="accent2"/>
+          </a:fillRef>
+          <a:effectRef idx="0">
+            <a:schemeClr val="accent2"/>
+          </a:effectRef>
+          <a:fontRef idx="minor">
+            <a:schemeClr val="lt1"/>
+          </a:fontRef>
+        </p:style>
+        <p:txBody>
+          <a:bodyPr rtlCol="0" anchor="ctr"/>
+          <a:lstStyle/>
+          <a:p>
+            <a:pPr algn="ctr"/>
+            <a:r>
+              <a:rPr lang="en-US" sz="900" dirty="0" smtClean="0"/>
+              <a:t>IFFT</a:t>
+            </a:r>
+            <a:endParaRPr lang="en-US" sz="900" dirty="0"/>
+          </a:p>
+        </p:txBody>
+      </p:sp>
+      <p:sp>
+        <p:nvSpPr>
+          <p:cNvPr id="31" name="Rectangle 30"/>
+          <p:cNvSpPr/>
+          <p:nvPr/>
+        </p:nvSpPr>
+        <p:spPr>
+          <a:xfrm>
+            <a:off x="5715000" y="3896118"/>
+            <a:ext cx="540000" cy="360000"/>
+          </a:xfrm>
+          <a:prstGeom prst="rect">
+            <a:avLst/>
+          </a:prstGeom>
+        </p:spPr>
+        <p:style>
+          <a:lnRef idx="2">
+            <a:schemeClr val="accent1">
+              <a:shade val="50000"/>
+            </a:schemeClr>
+          </a:lnRef>
+          <a:fillRef idx="1">
+            <a:schemeClr val="accent1"/>
+          </a:fillRef>
+          <a:effectRef idx="0">
+            <a:schemeClr val="accent1"/>
+          </a:effectRef>
+          <a:fontRef idx="minor">
+            <a:schemeClr val="lt1"/>
+          </a:fontRef>
+        </p:style>
+        <p:txBody>
+          <a:bodyPr rtlCol="0" anchor="ctr"/>
+          <a:lstStyle/>
+          <a:p>
+            <a:pPr algn="ctr"/>
+            <a:r>
+              <a:rPr lang="en-US" sz="900" dirty="0" smtClean="0"/>
+              <a:t>CP</a:t>
+            </a:r>
+            <a:endParaRPr lang="en-US" sz="900" dirty="0"/>
+          </a:p>
+        </p:txBody>
+      </p:sp>
+      <p:sp>
+        <p:nvSpPr>
+          <p:cNvPr id="32" name="Rectangle 31"/>
+          <p:cNvSpPr/>
+          <p:nvPr/>
+        </p:nvSpPr>
+        <p:spPr>
+          <a:xfrm>
+            <a:off x="5715000" y="4522217"/>
+            <a:ext cx="540000" cy="360000"/>
+          </a:xfrm>
+          <a:prstGeom prst="rect">
+            <a:avLst/>
+          </a:prstGeom>
+        </p:spPr>
+        <p:style>
+          <a:lnRef idx="2">
+            <a:schemeClr val="accent1">
+              <a:shade val="50000"/>
+            </a:schemeClr>
+          </a:lnRef>
+          <a:fillRef idx="1">
+            <a:schemeClr val="accent1"/>
+          </a:fillRef>
+          <a:effectRef idx="0">
+            <a:schemeClr val="accent1"/>
+          </a:effectRef>
+          <a:fontRef idx="minor">
+            <a:schemeClr val="lt1"/>
+          </a:fontRef>
+        </p:style>
+        <p:txBody>
+          <a:bodyPr rtlCol="0" anchor="ctr"/>
+          <a:lstStyle/>
+          <a:p>
+            <a:pPr algn="ctr"/>
+            <a:r>
+              <a:rPr lang="en-US" sz="900" dirty="0" smtClean="0"/>
+              <a:t>CSD</a:t>
+            </a:r>
+            <a:endParaRPr lang="en-US" sz="900" dirty="0"/>
+          </a:p>
+        </p:txBody>
+      </p:sp>
+      <p:sp>
+        <p:nvSpPr>
+          <p:cNvPr id="33" name="Rectangle 32"/>
+          <p:cNvSpPr/>
+          <p:nvPr/>
+        </p:nvSpPr>
+        <p:spPr>
+          <a:xfrm>
+            <a:off x="6477000" y="4522217"/>
+            <a:ext cx="540000" cy="360000"/>
+          </a:xfrm>
+          <a:prstGeom prst="rect">
+            <a:avLst/>
+          </a:prstGeom>
+        </p:spPr>
+        <p:style>
+          <a:lnRef idx="2">
+            <a:schemeClr val="accent1">
+              <a:shade val="50000"/>
+            </a:schemeClr>
+          </a:lnRef>
+          <a:fillRef idx="1">
+            <a:schemeClr val="accent1"/>
+          </a:fillRef>
+          <a:effectRef idx="0">
+            <a:schemeClr val="accent1"/>
+          </a:effectRef>
+          <a:fontRef idx="minor">
+            <a:schemeClr val="lt1"/>
+          </a:fontRef>
+        </p:style>
+        <p:txBody>
+          <a:bodyPr rtlCol="0" anchor="ctr"/>
+          <a:lstStyle/>
+          <a:p>
+            <a:pPr algn="ctr"/>
+            <a:r>
+              <a:rPr lang="en-US" sz="900" dirty="0" smtClean="0"/>
+              <a:t>CP</a:t>
+            </a:r>
+            <a:endParaRPr lang="en-US" sz="900" dirty="0"/>
+          </a:p>
+        </p:txBody>
+      </p:sp>
+      <p:sp>
+        <p:nvSpPr>
+          <p:cNvPr id="34" name="Rectangle 33"/>
+          <p:cNvSpPr/>
+          <p:nvPr/>
+        </p:nvSpPr>
+        <p:spPr>
+          <a:xfrm>
+            <a:off x="170441" y="3013853"/>
+            <a:ext cx="540000" cy="360000"/>
+          </a:xfrm>
+          <a:prstGeom prst="rect">
+            <a:avLst/>
+          </a:prstGeom>
+        </p:spPr>
+        <p:style>
+          <a:lnRef idx="2">
+            <a:schemeClr val="accent3">
+              <a:shade val="50000"/>
+            </a:schemeClr>
+          </a:lnRef>
+          <a:fillRef idx="1">
+            <a:schemeClr val="accent3"/>
+          </a:fillRef>
+          <a:effectRef idx="0">
+            <a:schemeClr val="accent3"/>
+          </a:effectRef>
+          <a:fontRef idx="minor">
+            <a:schemeClr val="lt1"/>
+          </a:fontRef>
+        </p:style>
+        <p:txBody>
+          <a:bodyPr rtlCol="0" anchor="ctr"/>
+          <a:lstStyle/>
+          <a:p>
+            <a:pPr algn="ctr"/>
+            <a:r>
+              <a:rPr lang="en-US" sz="900" dirty="0" smtClean="0"/>
+              <a:t>HT_SIG</a:t>
+            </a:r>
+            <a:endParaRPr lang="en-US" sz="900" dirty="0"/>
+          </a:p>
+        </p:txBody>
+      </p:sp>
+      <p:sp>
+        <p:nvSpPr>
+          <p:cNvPr id="43" name="Rectangle 42"/>
+          <p:cNvSpPr/>
+          <p:nvPr/>
+        </p:nvSpPr>
+        <p:spPr>
+          <a:xfrm>
+            <a:off x="170441" y="3373853"/>
+            <a:ext cx="540000" cy="360000"/>
+          </a:xfrm>
+          <a:prstGeom prst="rect">
+            <a:avLst/>
+          </a:prstGeom>
+        </p:spPr>
+        <p:style>
+          <a:lnRef idx="2">
+            <a:schemeClr val="accent1">
+              <a:shade val="50000"/>
+            </a:schemeClr>
+          </a:lnRef>
+          <a:fillRef idx="1">
+            <a:schemeClr val="accent1"/>
+          </a:fillRef>
+          <a:effectRef idx="0">
+            <a:schemeClr val="accent1"/>
+          </a:effectRef>
+          <a:fontRef idx="minor">
+            <a:schemeClr val="lt1"/>
+          </a:fontRef>
+        </p:style>
+        <p:txBody>
+          <a:bodyPr rtlCol="0" anchor="ctr"/>
+          <a:lstStyle/>
+          <a:p>
+            <a:pPr algn="ctr"/>
+            <a:r>
+              <a:rPr lang="en-US" sz="900" dirty="0" smtClean="0"/>
+              <a:t>HT_STF</a:t>
+            </a:r>
+            <a:endParaRPr lang="en-US" sz="900" dirty="0"/>
+          </a:p>
+        </p:txBody>
+      </p:sp>
+      <p:sp>
+        <p:nvSpPr>
+          <p:cNvPr id="44" name="Rectangle 43"/>
+          <p:cNvSpPr/>
+          <p:nvPr/>
+        </p:nvSpPr>
+        <p:spPr>
+          <a:xfrm>
+            <a:off x="173400" y="3733853"/>
+            <a:ext cx="540000" cy="360000"/>
+          </a:xfrm>
+          <a:prstGeom prst="rect">
+            <a:avLst/>
+          </a:prstGeom>
+        </p:spPr>
+        <p:style>
+          <a:lnRef idx="2">
+            <a:schemeClr val="accent1">
+              <a:shade val="50000"/>
+            </a:schemeClr>
+          </a:lnRef>
+          <a:fillRef idx="1">
+            <a:schemeClr val="accent1"/>
+          </a:fillRef>
+          <a:effectRef idx="0">
+            <a:schemeClr val="accent1"/>
+          </a:effectRef>
+          <a:fontRef idx="minor">
+            <a:schemeClr val="lt1"/>
+          </a:fontRef>
+        </p:style>
+        <p:txBody>
+          <a:bodyPr rtlCol="0" anchor="ctr"/>
+          <a:lstStyle/>
+          <a:p>
+            <a:pPr algn="ctr"/>
+            <a:r>
+              <a:rPr lang="en-US" sz="900" dirty="0" smtClean="0"/>
+              <a:t>HT_LTF</a:t>
+            </a:r>
+            <a:endParaRPr lang="en-US" sz="900" dirty="0"/>
+          </a:p>
+        </p:txBody>
+      </p:sp>
+      <p:sp>
+        <p:nvSpPr>
+          <p:cNvPr id="45" name="Rectangle 44"/>
+          <p:cNvSpPr/>
+          <p:nvPr/>
+        </p:nvSpPr>
+        <p:spPr>
+          <a:xfrm>
+            <a:off x="170441" y="4116281"/>
+            <a:ext cx="540000" cy="360000"/>
+          </a:xfrm>
+          <a:prstGeom prst="rect">
+            <a:avLst/>
+          </a:prstGeom>
+        </p:spPr>
+        <p:style>
+          <a:lnRef idx="2">
+            <a:schemeClr val="accent1">
+              <a:shade val="50000"/>
+            </a:schemeClr>
+          </a:lnRef>
+          <a:fillRef idx="1">
+            <a:schemeClr val="accent1"/>
+          </a:fillRef>
+          <a:effectRef idx="0">
+            <a:schemeClr val="accent1"/>
+          </a:effectRef>
+          <a:fontRef idx="minor">
+            <a:schemeClr val="lt1"/>
+          </a:fontRef>
+        </p:style>
+        <p:txBody>
+          <a:bodyPr rtlCol="0" anchor="ctr"/>
+          <a:lstStyle/>
+          <a:p>
+            <a:pPr algn="ctr"/>
+            <a:r>
+              <a:rPr lang="en-US" sz="900" dirty="0" smtClean="0"/>
+              <a:t>HT_DATA</a:t>
+            </a:r>
+            <a:endParaRPr lang="en-US" sz="900" dirty="0"/>
+          </a:p>
+        </p:txBody>
+      </p:sp>
+      <p:sp>
+        <p:nvSpPr>
+          <p:cNvPr id="46" name="Rectangle 45"/>
+          <p:cNvSpPr/>
+          <p:nvPr/>
+        </p:nvSpPr>
+        <p:spPr>
+          <a:xfrm>
+            <a:off x="958850" y="4116281"/>
+            <a:ext cx="540000" cy="360000"/>
+          </a:xfrm>
+          <a:prstGeom prst="rect">
+            <a:avLst/>
+          </a:prstGeom>
+        </p:spPr>
+        <p:style>
+          <a:lnRef idx="2">
+            <a:schemeClr val="accent1">
+              <a:shade val="50000"/>
+            </a:schemeClr>
+          </a:lnRef>
+          <a:fillRef idx="1">
+            <a:schemeClr val="accent1"/>
+          </a:fillRef>
+          <a:effectRef idx="0">
+            <a:schemeClr val="accent1"/>
+          </a:effectRef>
+          <a:fontRef idx="minor">
+            <a:schemeClr val="lt1"/>
+          </a:fontRef>
+        </p:style>
+        <p:txBody>
+          <a:bodyPr rtlCol="0" anchor="ctr"/>
+          <a:lstStyle/>
+          <a:p>
+            <a:pPr algn="ctr"/>
+            <a:r>
+              <a:rPr lang="en-US" sz="900" dirty="0" err="1" smtClean="0"/>
+              <a:t>conv</a:t>
+            </a:r>
+            <a:endParaRPr lang="en-US" sz="900" dirty="0"/>
+          </a:p>
+        </p:txBody>
+      </p:sp>
+      <p:sp>
+        <p:nvSpPr>
+          <p:cNvPr id="49" name="Rectangle 48"/>
+          <p:cNvSpPr/>
+          <p:nvPr/>
+        </p:nvSpPr>
+        <p:spPr>
+          <a:xfrm>
+            <a:off x="2667000" y="3886200"/>
+            <a:ext cx="540000" cy="360000"/>
+          </a:xfrm>
+          <a:prstGeom prst="rect">
+            <a:avLst/>
+          </a:prstGeom>
+        </p:spPr>
+        <p:style>
+          <a:lnRef idx="2">
+            <a:schemeClr val="accent1">
+              <a:shade val="50000"/>
+            </a:schemeClr>
+          </a:lnRef>
+          <a:fillRef idx="1">
+            <a:schemeClr val="accent1"/>
+          </a:fillRef>
+          <a:effectRef idx="0">
+            <a:schemeClr val="accent1"/>
+          </a:effectRef>
+          <a:fontRef idx="minor">
+            <a:schemeClr val="lt1"/>
+          </a:fontRef>
+        </p:style>
+        <p:txBody>
+          <a:bodyPr rtlCol="0" anchor="ctr"/>
+          <a:lstStyle/>
+          <a:p>
+            <a:pPr algn="ctr"/>
+            <a:r>
+              <a:rPr lang="en-US" sz="900" dirty="0" err="1" smtClean="0"/>
+              <a:t>interlv</a:t>
+            </a:r>
+            <a:endParaRPr lang="en-US" sz="900" dirty="0"/>
+          </a:p>
+        </p:txBody>
+      </p:sp>
+      <p:sp>
+        <p:nvSpPr>
+          <p:cNvPr id="53" name="Rectangle 52"/>
+          <p:cNvSpPr/>
+          <p:nvPr/>
+        </p:nvSpPr>
+        <p:spPr>
+          <a:xfrm>
+            <a:off x="3399800" y="3893158"/>
+            <a:ext cx="540000" cy="360000"/>
+          </a:xfrm>
+          <a:prstGeom prst="rect">
+            <a:avLst/>
+          </a:prstGeom>
+        </p:spPr>
+        <p:style>
+          <a:lnRef idx="2">
+            <a:schemeClr val="accent1">
+              <a:shade val="50000"/>
+            </a:schemeClr>
+          </a:lnRef>
+          <a:fillRef idx="1">
+            <a:schemeClr val="accent1"/>
+          </a:fillRef>
+          <a:effectRef idx="0">
+            <a:schemeClr val="accent1"/>
+          </a:effectRef>
+          <a:fontRef idx="minor">
+            <a:schemeClr val="lt1"/>
+          </a:fontRef>
+        </p:style>
+        <p:txBody>
+          <a:bodyPr rtlCol="0" anchor="ctr"/>
+          <a:lstStyle/>
+          <a:p>
+            <a:pPr algn="ctr"/>
+            <a:r>
+              <a:rPr lang="en-US" sz="900" dirty="0" smtClean="0"/>
+              <a:t>map</a:t>
+            </a:r>
+            <a:endParaRPr lang="en-US" sz="900" dirty="0"/>
+          </a:p>
+        </p:txBody>
+      </p:sp>
+      <p:sp>
+        <p:nvSpPr>
+          <p:cNvPr id="54" name="Rectangle 53"/>
+          <p:cNvSpPr/>
+          <p:nvPr/>
+        </p:nvSpPr>
+        <p:spPr>
+          <a:xfrm>
+            <a:off x="2819400" y="3162266"/>
+            <a:ext cx="540000" cy="360000"/>
+          </a:xfrm>
+          <a:prstGeom prst="rect">
+            <a:avLst/>
+          </a:prstGeom>
+        </p:spPr>
+        <p:style>
+          <a:lnRef idx="2">
+            <a:schemeClr val="accent3">
+              <a:shade val="50000"/>
+            </a:schemeClr>
+          </a:lnRef>
+          <a:fillRef idx="1">
+            <a:schemeClr val="accent3"/>
+          </a:fillRef>
+          <a:effectRef idx="0">
+            <a:schemeClr val="accent3"/>
+          </a:effectRef>
+          <a:fontRef idx="minor">
+            <a:schemeClr val="lt1"/>
+          </a:fontRef>
+        </p:style>
+        <p:txBody>
+          <a:bodyPr rtlCol="0" anchor="ctr"/>
+          <a:lstStyle/>
+          <a:p>
+            <a:pPr algn="ctr"/>
+            <a:r>
+              <a:rPr lang="en-US" sz="900" dirty="0" err="1" smtClean="0"/>
+              <a:t>BPSK_q</a:t>
+            </a:r>
+            <a:endParaRPr lang="en-US" sz="900" dirty="0"/>
+          </a:p>
+        </p:txBody>
+      </p:sp>
+      <p:sp>
+        <p:nvSpPr>
+          <p:cNvPr id="59" name="Rectangle 58"/>
+          <p:cNvSpPr/>
+          <p:nvPr/>
+        </p:nvSpPr>
+        <p:spPr>
+          <a:xfrm>
+            <a:off x="1828800" y="4128981"/>
+            <a:ext cx="540000" cy="360000"/>
+          </a:xfrm>
+          <a:prstGeom prst="rect">
+            <a:avLst/>
+          </a:prstGeom>
+        </p:spPr>
+        <p:style>
+          <a:lnRef idx="2">
+            <a:schemeClr val="accent1">
+              <a:shade val="50000"/>
+            </a:schemeClr>
+          </a:lnRef>
+          <a:fillRef idx="1">
+            <a:schemeClr val="accent1"/>
+          </a:fillRef>
+          <a:effectRef idx="0">
+            <a:schemeClr val="accent1"/>
+          </a:effectRef>
+          <a:fontRef idx="minor">
+            <a:schemeClr val="lt1"/>
+          </a:fontRef>
+        </p:style>
+        <p:txBody>
+          <a:bodyPr rtlCol="0" anchor="ctr"/>
+          <a:lstStyle/>
+          <a:p>
+            <a:pPr algn="ctr"/>
+            <a:r>
+              <a:rPr lang="en-US" sz="900" dirty="0" smtClean="0"/>
+              <a:t>SP</a:t>
+            </a:r>
+            <a:endParaRPr lang="en-US" sz="900" dirty="0"/>
+          </a:p>
+        </p:txBody>
+      </p:sp>
+      <p:sp>
+        <p:nvSpPr>
+          <p:cNvPr id="60" name="Rectangle 59"/>
+          <p:cNvSpPr/>
+          <p:nvPr/>
+        </p:nvSpPr>
+        <p:spPr>
+          <a:xfrm>
+            <a:off x="2667000" y="4509683"/>
+            <a:ext cx="540000" cy="360000"/>
+          </a:xfrm>
+          <a:prstGeom prst="rect">
+            <a:avLst/>
+          </a:prstGeom>
+        </p:spPr>
+        <p:style>
+          <a:lnRef idx="2">
+            <a:schemeClr val="accent1">
+              <a:shade val="50000"/>
+            </a:schemeClr>
+          </a:lnRef>
+          <a:fillRef idx="1">
+            <a:schemeClr val="accent1"/>
+          </a:fillRef>
+          <a:effectRef idx="0">
+            <a:schemeClr val="accent1"/>
+          </a:effectRef>
+          <a:fontRef idx="minor">
+            <a:schemeClr val="lt1"/>
+          </a:fontRef>
+        </p:style>
+        <p:txBody>
+          <a:bodyPr rtlCol="0" anchor="ctr"/>
+          <a:lstStyle/>
+          <a:p>
+            <a:pPr algn="ctr"/>
+            <a:r>
+              <a:rPr lang="en-US" sz="900" dirty="0" err="1" smtClean="0"/>
+              <a:t>interlv</a:t>
+            </a:r>
+            <a:endParaRPr lang="en-US" sz="900" dirty="0"/>
+          </a:p>
+        </p:txBody>
+      </p:sp>
+      <p:sp>
+        <p:nvSpPr>
+          <p:cNvPr id="61" name="Rectangle 60"/>
+          <p:cNvSpPr/>
+          <p:nvPr/>
+        </p:nvSpPr>
+        <p:spPr>
+          <a:xfrm>
+            <a:off x="3399800" y="4509683"/>
+            <a:ext cx="540000" cy="360000"/>
+          </a:xfrm>
+          <a:prstGeom prst="rect">
+            <a:avLst/>
+          </a:prstGeom>
+        </p:spPr>
+        <p:style>
+          <a:lnRef idx="2">
+            <a:schemeClr val="accent1">
+              <a:shade val="50000"/>
+            </a:schemeClr>
+          </a:lnRef>
+          <a:fillRef idx="1">
+            <a:schemeClr val="accent1"/>
+          </a:fillRef>
+          <a:effectRef idx="0">
+            <a:schemeClr val="accent1"/>
+          </a:effectRef>
+          <a:fontRef idx="minor">
+            <a:schemeClr val="lt1"/>
+          </a:fontRef>
+        </p:style>
+        <p:txBody>
+          <a:bodyPr rtlCol="0" anchor="ctr"/>
+          <a:lstStyle/>
+          <a:p>
+            <a:pPr algn="ctr"/>
+            <a:r>
+              <a:rPr lang="en-US" sz="900" dirty="0" smtClean="0"/>
+              <a:t>map</a:t>
+            </a:r>
+            <a:endParaRPr lang="en-US" sz="900" dirty="0"/>
+          </a:p>
+        </p:txBody>
+      </p:sp>
+      <p:sp>
+        <p:nvSpPr>
+          <p:cNvPr id="62" name="Rectangle 61"/>
+          <p:cNvSpPr/>
+          <p:nvPr/>
+        </p:nvSpPr>
+        <p:spPr>
+          <a:xfrm>
+            <a:off x="4943100" y="3906902"/>
+            <a:ext cx="540000" cy="360000"/>
+          </a:xfrm>
+          <a:prstGeom prst="rect">
+            <a:avLst/>
+          </a:prstGeom>
+        </p:spPr>
+        <p:style>
+          <a:lnRef idx="2">
+            <a:schemeClr val="accent1">
+              <a:shade val="50000"/>
+            </a:schemeClr>
+          </a:lnRef>
+          <a:fillRef idx="1">
+            <a:schemeClr val="accent1"/>
+          </a:fillRef>
+          <a:effectRef idx="0">
+            <a:schemeClr val="accent1"/>
+          </a:effectRef>
+          <a:fontRef idx="minor">
+            <a:schemeClr val="lt1"/>
+          </a:fontRef>
+        </p:style>
+        <p:txBody>
+          <a:bodyPr rtlCol="0" anchor="ctr"/>
+          <a:lstStyle/>
+          <a:p>
+            <a:pPr algn="ctr"/>
+            <a:r>
+              <a:rPr lang="en-US" sz="900" dirty="0" smtClean="0"/>
+              <a:t>IFFT</a:t>
+            </a:r>
+            <a:endParaRPr lang="en-US" sz="900" dirty="0"/>
+          </a:p>
+        </p:txBody>
+      </p:sp>
+      <p:sp>
+        <p:nvSpPr>
+          <p:cNvPr id="63" name="Rectangle 62"/>
+          <p:cNvSpPr/>
+          <p:nvPr/>
+        </p:nvSpPr>
+        <p:spPr>
+          <a:xfrm>
+            <a:off x="4943100" y="4511169"/>
+            <a:ext cx="540000" cy="360000"/>
+          </a:xfrm>
+          <a:prstGeom prst="rect">
+            <a:avLst/>
+          </a:prstGeom>
+        </p:spPr>
+        <p:style>
+          <a:lnRef idx="2">
+            <a:schemeClr val="accent1">
+              <a:shade val="50000"/>
+            </a:schemeClr>
+          </a:lnRef>
+          <a:fillRef idx="1">
+            <a:schemeClr val="accent1"/>
+          </a:fillRef>
+          <a:effectRef idx="0">
+            <a:schemeClr val="accent1"/>
+          </a:effectRef>
+          <a:fontRef idx="minor">
+            <a:schemeClr val="lt1"/>
+          </a:fontRef>
+        </p:style>
+        <p:txBody>
+          <a:bodyPr rtlCol="0" anchor="ctr"/>
+          <a:lstStyle/>
+          <a:p>
+            <a:pPr algn="ctr"/>
+            <a:r>
+              <a:rPr lang="en-US" sz="900" dirty="0" smtClean="0"/>
+              <a:t>IFFT</a:t>
+            </a:r>
+            <a:endParaRPr lang="en-US" sz="900" dirty="0"/>
+          </a:p>
+        </p:txBody>
+      </p:sp>
+      <p:sp>
+        <p:nvSpPr>
+          <p:cNvPr id="64" name="Rectangle 63"/>
+          <p:cNvSpPr/>
+          <p:nvPr/>
+        </p:nvSpPr>
+        <p:spPr>
+          <a:xfrm>
+            <a:off x="4184150" y="3904286"/>
+            <a:ext cx="540000" cy="360000"/>
+          </a:xfrm>
+          <a:prstGeom prst="rect">
+            <a:avLst/>
+          </a:prstGeom>
+        </p:spPr>
+        <p:style>
+          <a:lnRef idx="2">
+            <a:schemeClr val="accent1">
+              <a:shade val="50000"/>
+            </a:schemeClr>
+          </a:lnRef>
+          <a:fillRef idx="1">
+            <a:schemeClr val="accent1"/>
+          </a:fillRef>
+          <a:effectRef idx="0">
+            <a:schemeClr val="accent1"/>
+          </a:effectRef>
+          <a:fontRef idx="minor">
+            <a:schemeClr val="lt1"/>
+          </a:fontRef>
+        </p:style>
+        <p:txBody>
+          <a:bodyPr rtlCol="0" anchor="ctr"/>
+          <a:lstStyle/>
+          <a:p>
+            <a:pPr algn="ctr"/>
+            <a:r>
+              <a:rPr lang="en-US" sz="900" dirty="0" smtClean="0"/>
+              <a:t>Pilot</a:t>
+            </a:r>
+            <a:endParaRPr lang="en-US" sz="900" dirty="0"/>
+          </a:p>
+        </p:txBody>
+      </p:sp>
+      <p:sp>
+        <p:nvSpPr>
+          <p:cNvPr id="65" name="Rectangle 64"/>
+          <p:cNvSpPr/>
+          <p:nvPr/>
+        </p:nvSpPr>
+        <p:spPr>
+          <a:xfrm>
+            <a:off x="4184150" y="4509683"/>
+            <a:ext cx="540000" cy="360000"/>
+          </a:xfrm>
+          <a:prstGeom prst="rect">
+            <a:avLst/>
+          </a:prstGeom>
+        </p:spPr>
+        <p:style>
+          <a:lnRef idx="2">
+            <a:schemeClr val="accent1">
+              <a:shade val="50000"/>
+            </a:schemeClr>
+          </a:lnRef>
+          <a:fillRef idx="1">
+            <a:schemeClr val="accent1"/>
+          </a:fillRef>
+          <a:effectRef idx="0">
+            <a:schemeClr val="accent1"/>
+          </a:effectRef>
+          <a:fontRef idx="minor">
+            <a:schemeClr val="lt1"/>
+          </a:fontRef>
+        </p:style>
+        <p:txBody>
+          <a:bodyPr rtlCol="0" anchor="ctr"/>
+          <a:lstStyle/>
+          <a:p>
+            <a:pPr algn="ctr"/>
+            <a:r>
+              <a:rPr lang="en-US" sz="900" dirty="0" smtClean="0"/>
+              <a:t>Pilot</a:t>
+            </a:r>
+            <a:endParaRPr lang="en-US" sz="900" dirty="0"/>
+          </a:p>
+        </p:txBody>
+      </p:sp>
+      <p:sp>
+        <p:nvSpPr>
+          <p:cNvPr id="67" name="Rectangular Callout 66"/>
+          <p:cNvSpPr/>
+          <p:nvPr/>
+        </p:nvSpPr>
+        <p:spPr>
+          <a:xfrm>
+            <a:off x="710440" y="4720776"/>
+            <a:ext cx="788409" cy="332619"/>
+          </a:xfrm>
+          <a:prstGeom prst="wedgeRectCallout">
+            <a:avLst>
+              <a:gd name="adj1" fmla="val 22977"/>
+              <a:gd name="adj2" fmla="val -120513"/>
+            </a:avLst>
+          </a:prstGeom>
+        </p:spPr>
+        <p:style>
+          <a:lnRef idx="2">
+            <a:schemeClr val="accent1">
+              <a:shade val="50000"/>
+            </a:schemeClr>
+          </a:lnRef>
+          <a:fillRef idx="1">
+            <a:schemeClr val="accent1"/>
+          </a:fillRef>
+          <a:effectRef idx="0">
+            <a:schemeClr val="accent1"/>
+          </a:effectRef>
+          <a:fontRef idx="minor">
+            <a:schemeClr val="lt1"/>
+          </a:fontRef>
+        </p:style>
+        <p:txBody>
+          <a:bodyPr rtlCol="0" anchor="ctr"/>
+          <a:lstStyle/>
+          <a:p>
+            <a:pPr algn="ctr"/>
+            <a:r>
+              <a:rPr lang="en-US" sz="1000" dirty="0" smtClean="0"/>
+              <a:t>12/23/34</a:t>
+            </a:r>
+          </a:p>
+        </p:txBody>
+      </p:sp>
+      <p:sp>
+        <p:nvSpPr>
+          <p:cNvPr id="68" name="Rectangular Callout 67"/>
+          <p:cNvSpPr/>
+          <p:nvPr/>
+        </p:nvSpPr>
+        <p:spPr>
+          <a:xfrm>
+            <a:off x="2457978" y="5105400"/>
+            <a:ext cx="631421" cy="332619"/>
+          </a:xfrm>
+          <a:prstGeom prst="wedgeRectCallout">
+            <a:avLst>
+              <a:gd name="adj1" fmla="val 22977"/>
+              <a:gd name="adj2" fmla="val -120513"/>
+            </a:avLst>
+          </a:prstGeom>
+        </p:spPr>
+        <p:style>
+          <a:lnRef idx="2">
+            <a:schemeClr val="accent1">
+              <a:shade val="50000"/>
+            </a:schemeClr>
+          </a:lnRef>
+          <a:fillRef idx="1">
+            <a:schemeClr val="accent1"/>
+          </a:fillRef>
+          <a:effectRef idx="0">
+            <a:schemeClr val="accent1"/>
+          </a:effectRef>
+          <a:fontRef idx="minor">
+            <a:schemeClr val="lt1"/>
+          </a:fontRef>
+        </p:style>
+        <p:txBody>
+          <a:bodyPr rtlCol="0" anchor="ctr"/>
+          <a:lstStyle/>
+          <a:p>
+            <a:pPr algn="ctr"/>
+            <a:r>
+              <a:rPr lang="en-US" sz="1000" dirty="0" smtClean="0"/>
+              <a:t>1/2/4/6</a:t>
+            </a:r>
+          </a:p>
+        </p:txBody>
+      </p:sp>
+      <p:sp>
+        <p:nvSpPr>
+          <p:cNvPr id="69" name="Rectangular Callout 68"/>
+          <p:cNvSpPr/>
+          <p:nvPr/>
+        </p:nvSpPr>
+        <p:spPr>
+          <a:xfrm>
+            <a:off x="3193550" y="5105400"/>
+            <a:ext cx="990600" cy="457200"/>
+          </a:xfrm>
+          <a:prstGeom prst="wedgeRectCallout">
+            <a:avLst>
+              <a:gd name="adj1" fmla="val -8433"/>
+              <a:gd name="adj2" fmla="val -98120"/>
+            </a:avLst>
+          </a:prstGeom>
+        </p:spPr>
+        <p:style>
+          <a:lnRef idx="2">
+            <a:schemeClr val="accent1">
+              <a:shade val="50000"/>
+            </a:schemeClr>
+          </a:lnRef>
+          <a:fillRef idx="1">
+            <a:schemeClr val="accent1"/>
+          </a:fillRef>
+          <a:effectRef idx="0">
+            <a:schemeClr val="accent1"/>
+          </a:effectRef>
+          <a:fontRef idx="minor">
+            <a:schemeClr val="lt1"/>
+          </a:fontRef>
+        </p:style>
+        <p:txBody>
+          <a:bodyPr rtlCol="0" anchor="ctr"/>
+          <a:lstStyle/>
+          <a:p>
+            <a:pPr algn="ctr"/>
+            <a:r>
+              <a:rPr lang="en-US" sz="1000" dirty="0" smtClean="0"/>
+              <a:t>BPSK/QPSK/16QAM/64QAM</a:t>
+            </a:r>
+          </a:p>
+        </p:txBody>
+      </p:sp>
+      <p:sp>
+        <p:nvSpPr>
+          <p:cNvPr id="70" name="Rectangle 69"/>
+          <p:cNvSpPr/>
+          <p:nvPr/>
+        </p:nvSpPr>
+        <p:spPr>
+          <a:xfrm>
+            <a:off x="5438775" y="2659594"/>
+            <a:ext cx="540000" cy="360000"/>
+          </a:xfrm>
+          <a:prstGeom prst="rect">
+            <a:avLst/>
+          </a:prstGeom>
+        </p:spPr>
+        <p:style>
+          <a:lnRef idx="2">
+            <a:schemeClr val="accent2">
+              <a:shade val="50000"/>
+            </a:schemeClr>
+          </a:lnRef>
+          <a:fillRef idx="1">
+            <a:schemeClr val="accent2"/>
+          </a:fillRef>
+          <a:effectRef idx="0">
+            <a:schemeClr val="accent2"/>
+          </a:effectRef>
+          <a:fontRef idx="minor">
+            <a:schemeClr val="lt1"/>
+          </a:fontRef>
+        </p:style>
+        <p:txBody>
+          <a:bodyPr rtlCol="0" anchor="ctr"/>
+          <a:lstStyle/>
+          <a:p>
+            <a:pPr algn="ctr"/>
+            <a:r>
+              <a:rPr lang="en-US" sz="900" dirty="0" smtClean="0"/>
+              <a:t>CP</a:t>
+            </a:r>
+            <a:endParaRPr lang="en-US" sz="900" dirty="0"/>
+          </a:p>
+        </p:txBody>
+      </p:sp>
+      <p:sp>
+        <p:nvSpPr>
+          <p:cNvPr id="71" name="Rectangle 70"/>
+          <p:cNvSpPr/>
+          <p:nvPr/>
+        </p:nvSpPr>
+        <p:spPr>
+          <a:xfrm>
+            <a:off x="5445000" y="3162266"/>
+            <a:ext cx="540000" cy="360000"/>
+          </a:xfrm>
+          <a:prstGeom prst="rect">
+            <a:avLst/>
+          </a:prstGeom>
+        </p:spPr>
+        <p:style>
+          <a:lnRef idx="2">
+            <a:schemeClr val="accent2">
+              <a:shade val="50000"/>
+            </a:schemeClr>
+          </a:lnRef>
+          <a:fillRef idx="1">
+            <a:schemeClr val="accent2"/>
+          </a:fillRef>
+          <a:effectRef idx="0">
+            <a:schemeClr val="accent2"/>
+          </a:effectRef>
+          <a:fontRef idx="minor">
+            <a:schemeClr val="lt1"/>
+          </a:fontRef>
+        </p:style>
+        <p:txBody>
+          <a:bodyPr rtlCol="0" anchor="ctr"/>
+          <a:lstStyle/>
+          <a:p>
+            <a:pPr algn="ctr"/>
+            <a:r>
+              <a:rPr lang="en-US" sz="900" dirty="0" smtClean="0"/>
+              <a:t>CSD</a:t>
+            </a:r>
+            <a:endParaRPr lang="en-US" sz="900" dirty="0"/>
+          </a:p>
+        </p:txBody>
+      </p:sp>
+      <p:sp>
+        <p:nvSpPr>
+          <p:cNvPr id="72" name="Rectangle 71"/>
+          <p:cNvSpPr/>
+          <p:nvPr/>
+        </p:nvSpPr>
+        <p:spPr>
+          <a:xfrm>
+            <a:off x="6324600" y="3174803"/>
+            <a:ext cx="540000" cy="360000"/>
+          </a:xfrm>
+          <a:prstGeom prst="rect">
+            <a:avLst/>
+          </a:prstGeom>
+        </p:spPr>
+        <p:style>
+          <a:lnRef idx="2">
+            <a:schemeClr val="accent2">
+              <a:shade val="50000"/>
+            </a:schemeClr>
+          </a:lnRef>
+          <a:fillRef idx="1">
+            <a:schemeClr val="accent2"/>
+          </a:fillRef>
+          <a:effectRef idx="0">
+            <a:schemeClr val="accent2"/>
+          </a:effectRef>
+          <a:fontRef idx="minor">
+            <a:schemeClr val="lt1"/>
+          </a:fontRef>
+        </p:style>
+        <p:txBody>
+          <a:bodyPr rtlCol="0" anchor="ctr"/>
+          <a:lstStyle/>
+          <a:p>
+            <a:pPr algn="ctr"/>
+            <a:r>
+              <a:rPr lang="en-US" sz="900" dirty="0" smtClean="0"/>
+              <a:t>CP</a:t>
+            </a:r>
+            <a:endParaRPr lang="en-US" sz="900" dirty="0"/>
+          </a:p>
+        </p:txBody>
+      </p:sp>
+    </p:spTree>
+    <p:extLst>
+      <p:ext uri="{BB962C8B-B14F-4D97-AF65-F5344CB8AC3E}">
+        <p14:creationId xmlns:p14="http://schemas.microsoft.com/office/powerpoint/2010/main" val="2625505871"/>
+      </p:ext>
+    </p:extLst>
+  </p:cSld>
+  <p:clrMapOvr>
+    <a:masterClrMapping/>
+  </p:clrMapOvr>
+</p:sld>
+</file>
+
+<file path=ppt/slides/slide22.xml><?xml version="1.0" encoding="utf-8"?>
+<p:sld xmlns:a="http://schemas.openxmlformats.org/drawingml/2006/main" xmlns:r="http://schemas.openxmlformats.org/officeDocument/2006/relationships" xmlns:p="http://schemas.openxmlformats.org/presentationml/2006/main">
+  <p:cSld>
+    <p:spTree>
+      <p:nvGrpSpPr>
+        <p:cNvPr id="1" name=""/>
+        <p:cNvGrpSpPr/>
+        <p:nvPr/>
+      </p:nvGrpSpPr>
+      <p:grpSpPr>
+        <a:xfrm>
+          <a:off x="0" y="0"/>
+          <a:ext cx="0" cy="0"/>
+          <a:chOff x="0" y="0"/>
+          <a:chExt cx="0" cy="0"/>
+        </a:xfrm>
+      </p:grpSpPr>
+      <p:sp>
+        <p:nvSpPr>
+          <p:cNvPr id="2" name="Title 1"/>
+          <p:cNvSpPr>
+            <a:spLocks noGrp="1"/>
+          </p:cNvSpPr>
+          <p:nvPr>
+            <p:ph type="title"/>
+          </p:nvPr>
+        </p:nvSpPr>
+        <p:spPr/>
+        <p:txBody>
+          <a:bodyPr/>
+          <a:lstStyle/>
+          <a:p>
+            <a:r>
               <a:rPr lang="en-US" altLang="zh-CN" dirty="0" smtClean="0"/>
               <a:t>Roadmap</a:t>
             </a:r>
@@ -16067,7 +17580,7 @@
 </p:sld>
 </file>
 
-<file path=ppt/slides/slide22.xml><?xml version="1.0" encoding="utf-8"?>
+<file path=ppt/slides/slide23.xml><?xml version="1.0" encoding="utf-8"?>
 <p:sld xmlns:a="http://schemas.openxmlformats.org/drawingml/2006/main" xmlns:r="http://schemas.openxmlformats.org/officeDocument/2006/relationships" xmlns:p="http://schemas.openxmlformats.org/presentationml/2006/main">
   <p:cSld>
     <p:spTree>
@@ -16139,7 +17652,7 @@
 </p:sld>
 </file>
 
-<file path=ppt/slides/slide23.xml><?xml version="1.0" encoding="utf-8"?>
+<file path=ppt/slides/slide24.xml><?xml version="1.0" encoding="utf-8"?>
 <p:sld xmlns:a="http://schemas.openxmlformats.org/drawingml/2006/main" xmlns:r="http://schemas.openxmlformats.org/officeDocument/2006/relationships" xmlns:p="http://schemas.openxmlformats.org/presentationml/2006/main">
   <p:cSld>
     <p:spTree>
@@ -16199,7 +17712,7 @@
 </p:sld>
 </file>
 
-<file path=ppt/slides/slide24.xml><?xml version="1.0" encoding="utf-8"?>
+<file path=ppt/slides/slide25.xml><?xml version="1.0" encoding="utf-8"?>
 <p:sld xmlns:a="http://schemas.openxmlformats.org/drawingml/2006/main" xmlns:r="http://schemas.openxmlformats.org/officeDocument/2006/relationships" xmlns:p="http://schemas.openxmlformats.org/presentationml/2006/main">
   <p:cSld>
     <p:spTree>

</xml_diff>

<commit_message>
Update ppt, precalculate parameters for parallel MIMO.
</commit_message>
<xml_diff>
--- a/cora.pptx
+++ b/cora.pptx
@@ -5,7 +5,7 @@
     <p:sldMasterId id="2147483648" r:id="rId1"/>
   </p:sldMasterIdLst>
   <p:notesMasterIdLst>
-    <p:notesMasterId r:id="rId29"/>
+    <p:notesMasterId r:id="rId31"/>
   </p:notesMasterIdLst>
   <p:sldIdLst>
     <p:sldId id="256" r:id="rId2"/>
@@ -35,6 +35,8 @@
     <p:sldId id="274" r:id="rId26"/>
     <p:sldId id="286" r:id="rId27"/>
     <p:sldId id="285" r:id="rId28"/>
+    <p:sldId id="290" r:id="rId29"/>
+    <p:sldId id="291" r:id="rId30"/>
   </p:sldIdLst>
   <p:sldSz cx="9144000" cy="6858000" type="screen4x3"/>
   <p:notesSz cx="6858000" cy="9144000"/>
@@ -185,6 +187,8 @@
           <p14:sldIdLst>
             <p14:sldId id="286"/>
             <p14:sldId id="285"/>
+            <p14:sldId id="290"/>
+            <p14:sldId id="291"/>
           </p14:sldIdLst>
         </p14:section>
       </p14:sectionLst>
@@ -614,11 +618,11 @@
           <c:showBubbleSize val="0"/>
         </c:dLbls>
         <c:gapWidth val="150"/>
-        <c:axId val="66466944"/>
-        <c:axId val="66468480"/>
+        <c:axId val="60636544"/>
+        <c:axId val="60642432"/>
       </c:barChart>
       <c:catAx>
-        <c:axId val="66466944"/>
+        <c:axId val="60636544"/>
         <c:scaling>
           <c:orientation val="minMax"/>
         </c:scaling>
@@ -628,7 +632,7 @@
         <c:majorTickMark val="out"/>
         <c:minorTickMark val="none"/>
         <c:tickLblPos val="nextTo"/>
-        <c:crossAx val="66468480"/>
+        <c:crossAx val="60642432"/>
         <c:crosses val="autoZero"/>
         <c:auto val="1"/>
         <c:lblAlgn val="ctr"/>
@@ -636,7 +640,7 @@
         <c:noMultiLvlLbl val="0"/>
       </c:catAx>
       <c:valAx>
-        <c:axId val="66468480"/>
+        <c:axId val="60642432"/>
         <c:scaling>
           <c:orientation val="minMax"/>
         </c:scaling>
@@ -667,7 +671,7 @@
         <c:majorTickMark val="out"/>
         <c:minorTickMark val="none"/>
         <c:tickLblPos val="nextTo"/>
-        <c:crossAx val="66466944"/>
+        <c:crossAx val="60636544"/>
         <c:crosses val="autoZero"/>
         <c:crossBetween val="between"/>
       </c:valAx>
@@ -971,11 +975,11 @@
           <c:showBubbleSize val="0"/>
         </c:dLbls>
         <c:gapWidth val="150"/>
-        <c:axId val="66551168"/>
-        <c:axId val="66565248"/>
+        <c:axId val="60430208"/>
+        <c:axId val="60431744"/>
       </c:barChart>
       <c:catAx>
-        <c:axId val="66551168"/>
+        <c:axId val="60430208"/>
         <c:scaling>
           <c:orientation val="minMax"/>
         </c:scaling>
@@ -985,7 +989,7 @@
         <c:majorTickMark val="out"/>
         <c:minorTickMark val="none"/>
         <c:tickLblPos val="nextTo"/>
-        <c:crossAx val="66565248"/>
+        <c:crossAx val="60431744"/>
         <c:crosses val="autoZero"/>
         <c:auto val="1"/>
         <c:lblAlgn val="ctr"/>
@@ -993,7 +997,7 @@
         <c:noMultiLvlLbl val="0"/>
       </c:catAx>
       <c:valAx>
-        <c:axId val="66565248"/>
+        <c:axId val="60431744"/>
         <c:scaling>
           <c:orientation val="minMax"/>
         </c:scaling>
@@ -1032,7 +1036,7 @@
         <c:majorTickMark val="out"/>
         <c:minorTickMark val="none"/>
         <c:tickLblPos val="nextTo"/>
-        <c:crossAx val="66551168"/>
+        <c:crossAx val="60430208"/>
         <c:crosses val="autoZero"/>
         <c:crossBetween val="between"/>
       </c:valAx>
@@ -5802,7 +5806,7 @@
           <a:p>
             <a:fld id="{1CCAE213-0BEA-41FB-800D-FF7841C35566}" type="datetimeFigureOut">
               <a:rPr lang="zh-CN" altLang="en-US" smtClean="0"/>
-              <a:t>2012/5/30</a:t>
+              <a:t>2012/6/11</a:t>
             </a:fld>
             <a:endParaRPr lang="zh-CN" altLang="en-US"/>
           </a:p>
@@ -6524,7 +6528,7 @@
             <a:fld id="{1D8BD707-D9CF-40AE-B4C6-C98DA3205C09}" type="datetimeFigureOut">
               <a:rPr lang="en-US" smtClean="0"/>
               <a:pPr/>
-              <a:t>5/30/2012</a:t>
+              <a:t>6/11/2012</a:t>
             </a:fld>
             <a:endParaRPr lang="en-US"/>
           </a:p>
@@ -6701,7 +6705,7 @@
             <a:fld id="{1D8BD707-D9CF-40AE-B4C6-C98DA3205C09}" type="datetimeFigureOut">
               <a:rPr lang="en-US" smtClean="0"/>
               <a:pPr/>
-              <a:t>5/30/2012</a:t>
+              <a:t>6/11/2012</a:t>
             </a:fld>
             <a:endParaRPr lang="en-US"/>
           </a:p>
@@ -6868,7 +6872,7 @@
             <a:fld id="{1D8BD707-D9CF-40AE-B4C6-C98DA3205C09}" type="datetimeFigureOut">
               <a:rPr lang="en-US" smtClean="0"/>
               <a:pPr/>
-              <a:t>5/30/2012</a:t>
+              <a:t>6/11/2012</a:t>
             </a:fld>
             <a:endParaRPr lang="en-US"/>
           </a:p>
@@ -7111,7 +7115,7 @@
             <a:fld id="{1D8BD707-D9CF-40AE-B4C6-C98DA3205C09}" type="datetimeFigureOut">
               <a:rPr lang="en-US" smtClean="0"/>
               <a:pPr/>
-              <a:t>5/30/2012</a:t>
+              <a:t>6/11/2012</a:t>
             </a:fld>
             <a:endParaRPr lang="en-US"/>
           </a:p>
@@ -7396,7 +7400,7 @@
             <a:fld id="{1D8BD707-D9CF-40AE-B4C6-C98DA3205C09}" type="datetimeFigureOut">
               <a:rPr lang="en-US" smtClean="0"/>
               <a:pPr/>
-              <a:t>5/30/2012</a:t>
+              <a:t>6/11/2012</a:t>
             </a:fld>
             <a:endParaRPr lang="en-US"/>
           </a:p>
@@ -7815,7 +7819,7 @@
             <a:fld id="{1D8BD707-D9CF-40AE-B4C6-C98DA3205C09}" type="datetimeFigureOut">
               <a:rPr lang="en-US" smtClean="0"/>
               <a:pPr/>
-              <a:t>5/30/2012</a:t>
+              <a:t>6/11/2012</a:t>
             </a:fld>
             <a:endParaRPr lang="en-US"/>
           </a:p>
@@ -7930,7 +7934,7 @@
             <a:fld id="{1D8BD707-D9CF-40AE-B4C6-C98DA3205C09}" type="datetimeFigureOut">
               <a:rPr lang="en-US" smtClean="0"/>
               <a:pPr/>
-              <a:t>5/30/2012</a:t>
+              <a:t>6/11/2012</a:t>
             </a:fld>
             <a:endParaRPr lang="en-US"/>
           </a:p>
@@ -8022,7 +8026,7 @@
             <a:fld id="{1D8BD707-D9CF-40AE-B4C6-C98DA3205C09}" type="datetimeFigureOut">
               <a:rPr lang="en-US" smtClean="0"/>
               <a:pPr/>
-              <a:t>5/30/2012</a:t>
+              <a:t>6/11/2012</a:t>
             </a:fld>
             <a:endParaRPr lang="en-US"/>
           </a:p>
@@ -8296,7 +8300,7 @@
             <a:fld id="{1D8BD707-D9CF-40AE-B4C6-C98DA3205C09}" type="datetimeFigureOut">
               <a:rPr lang="en-US" smtClean="0"/>
               <a:pPr/>
-              <a:t>5/30/2012</a:t>
+              <a:t>6/11/2012</a:t>
             </a:fld>
             <a:endParaRPr lang="en-US"/>
           </a:p>
@@ -8546,7 +8550,7 @@
             <a:fld id="{1D8BD707-D9CF-40AE-B4C6-C98DA3205C09}" type="datetimeFigureOut">
               <a:rPr lang="en-US" smtClean="0"/>
               <a:pPr/>
-              <a:t>5/30/2012</a:t>
+              <a:t>6/11/2012</a:t>
             </a:fld>
             <a:endParaRPr lang="en-US"/>
           </a:p>
@@ -8756,7 +8760,7 @@
             <a:fld id="{1D8BD707-D9CF-40AE-B4C6-C98DA3205C09}" type="datetimeFigureOut">
               <a:rPr lang="en-US" smtClean="0"/>
               <a:pPr/>
-              <a:t>5/30/2012</a:t>
+              <a:t>6/11/2012</a:t>
             </a:fld>
             <a:endParaRPr lang="en-US"/>
           </a:p>
@@ -23117,6 +23121,3540 @@
 </p:sld>
 </file>
 
+<file path=ppt/slides/slide28.xml><?xml version="1.0" encoding="utf-8"?>
+<p:sld xmlns:a="http://schemas.openxmlformats.org/drawingml/2006/main" xmlns:r="http://schemas.openxmlformats.org/officeDocument/2006/relationships" xmlns:p="http://schemas.openxmlformats.org/presentationml/2006/main">
+  <p:cSld>
+    <p:spTree>
+      <p:nvGrpSpPr>
+        <p:cNvPr id="1" name=""/>
+        <p:cNvGrpSpPr/>
+        <p:nvPr/>
+      </p:nvGrpSpPr>
+      <p:grpSpPr>
+        <a:xfrm>
+          <a:off x="0" y="0"/>
+          <a:ext cx="0" cy="0"/>
+          <a:chOff x="0" y="0"/>
+          <a:chExt cx="0" cy="0"/>
+        </a:xfrm>
+      </p:grpSpPr>
+      <p:sp>
+        <p:nvSpPr>
+          <p:cNvPr id="2" name="Title 1"/>
+          <p:cNvSpPr>
+            <a:spLocks noGrp="1"/>
+          </p:cNvSpPr>
+          <p:nvPr>
+            <p:ph type="title"/>
+          </p:nvPr>
+        </p:nvSpPr>
+        <p:spPr/>
+        <p:txBody>
+          <a:bodyPr/>
+          <a:lstStyle/>
+          <a:p>
+            <a:endParaRPr lang="en-US"/>
+          </a:p>
+        </p:txBody>
+      </p:sp>
+      <p:grpSp>
+        <p:nvGrpSpPr>
+          <p:cNvPr id="46" name="Group 45"/>
+          <p:cNvGrpSpPr/>
+          <p:nvPr/>
+        </p:nvGrpSpPr>
+        <p:grpSpPr>
+          <a:xfrm>
+            <a:off x="609600" y="1828800"/>
+            <a:ext cx="7391400" cy="950081"/>
+            <a:chOff x="609600" y="4142619"/>
+            <a:chExt cx="7391400" cy="950081"/>
+          </a:xfrm>
+        </p:grpSpPr>
+        <p:sp>
+          <p:nvSpPr>
+            <p:cNvPr id="4" name="Rectangle 3"/>
+            <p:cNvSpPr/>
+            <p:nvPr/>
+          </p:nvSpPr>
+          <p:spPr>
+            <a:xfrm>
+              <a:off x="6657600" y="4142619"/>
+              <a:ext cx="540000" cy="360000"/>
+            </a:xfrm>
+            <a:prstGeom prst="rect">
+              <a:avLst/>
+            </a:prstGeom>
+          </p:spPr>
+          <p:style>
+            <a:lnRef idx="2">
+              <a:schemeClr val="accent1">
+                <a:shade val="50000"/>
+              </a:schemeClr>
+            </a:lnRef>
+            <a:fillRef idx="1">
+              <a:schemeClr val="accent1"/>
+            </a:fillRef>
+            <a:effectRef idx="0">
+              <a:schemeClr val="accent1"/>
+            </a:effectRef>
+            <a:fontRef idx="minor">
+              <a:schemeClr val="lt1"/>
+            </a:fontRef>
+          </p:style>
+          <p:txBody>
+            <a:bodyPr rtlCol="0" anchor="ctr"/>
+            <a:lstStyle/>
+            <a:p>
+              <a:pPr algn="ctr"/>
+              <a:r>
+                <a:rPr lang="en-US" sz="900" dirty="0" smtClean="0"/>
+                <a:t>CP</a:t>
+              </a:r>
+              <a:endParaRPr lang="en-US" sz="900" dirty="0"/>
+            </a:p>
+          </p:txBody>
+        </p:sp>
+        <p:sp>
+          <p:nvSpPr>
+            <p:cNvPr id="5" name="Rectangle 4"/>
+            <p:cNvSpPr/>
+            <p:nvPr/>
+          </p:nvSpPr>
+          <p:spPr>
+            <a:xfrm>
+              <a:off x="6657600" y="4725636"/>
+              <a:ext cx="540000" cy="360000"/>
+            </a:xfrm>
+            <a:prstGeom prst="rect">
+              <a:avLst/>
+            </a:prstGeom>
+          </p:spPr>
+          <p:style>
+            <a:lnRef idx="2">
+              <a:schemeClr val="accent1">
+                <a:shade val="50000"/>
+              </a:schemeClr>
+            </a:lnRef>
+            <a:fillRef idx="1">
+              <a:schemeClr val="accent1"/>
+            </a:fillRef>
+            <a:effectRef idx="0">
+              <a:schemeClr val="accent1"/>
+            </a:effectRef>
+            <a:fontRef idx="minor">
+              <a:schemeClr val="lt1"/>
+            </a:fontRef>
+          </p:style>
+          <p:txBody>
+            <a:bodyPr rtlCol="0" anchor="ctr"/>
+            <a:lstStyle/>
+            <a:p>
+              <a:pPr algn="ctr"/>
+              <a:r>
+                <a:rPr lang="en-US" sz="900" dirty="0" smtClean="0"/>
+                <a:t>CSD</a:t>
+              </a:r>
+              <a:endParaRPr lang="en-US" sz="900" dirty="0"/>
+            </a:p>
+          </p:txBody>
+        </p:sp>
+        <p:sp>
+          <p:nvSpPr>
+            <p:cNvPr id="6" name="Rectangle 5"/>
+            <p:cNvSpPr/>
+            <p:nvPr/>
+          </p:nvSpPr>
+          <p:spPr>
+            <a:xfrm>
+              <a:off x="7461000" y="4725636"/>
+              <a:ext cx="540000" cy="360000"/>
+            </a:xfrm>
+            <a:prstGeom prst="rect">
+              <a:avLst/>
+            </a:prstGeom>
+          </p:spPr>
+          <p:style>
+            <a:lnRef idx="2">
+              <a:schemeClr val="accent1">
+                <a:shade val="50000"/>
+              </a:schemeClr>
+            </a:lnRef>
+            <a:fillRef idx="1">
+              <a:schemeClr val="accent1"/>
+            </a:fillRef>
+            <a:effectRef idx="0">
+              <a:schemeClr val="accent1"/>
+            </a:effectRef>
+            <a:fontRef idx="minor">
+              <a:schemeClr val="lt1"/>
+            </a:fontRef>
+          </p:style>
+          <p:txBody>
+            <a:bodyPr rtlCol="0" anchor="ctr"/>
+            <a:lstStyle/>
+            <a:p>
+              <a:pPr algn="ctr"/>
+              <a:r>
+                <a:rPr lang="en-US" sz="900" dirty="0" smtClean="0"/>
+                <a:t>CP</a:t>
+              </a:r>
+              <a:endParaRPr lang="en-US" sz="900" dirty="0"/>
+            </a:p>
+          </p:txBody>
+        </p:sp>
+        <p:sp>
+          <p:nvSpPr>
+            <p:cNvPr id="8" name="Rectangle 7"/>
+            <p:cNvSpPr/>
+            <p:nvPr/>
+          </p:nvSpPr>
+          <p:spPr>
+            <a:xfrm>
+              <a:off x="609600" y="4419698"/>
+              <a:ext cx="540000" cy="360000"/>
+            </a:xfrm>
+            <a:prstGeom prst="rect">
+              <a:avLst/>
+            </a:prstGeom>
+          </p:spPr>
+          <p:style>
+            <a:lnRef idx="2">
+              <a:schemeClr val="accent1">
+                <a:shade val="50000"/>
+              </a:schemeClr>
+            </a:lnRef>
+            <a:fillRef idx="1">
+              <a:schemeClr val="accent1"/>
+            </a:fillRef>
+            <a:effectRef idx="0">
+              <a:schemeClr val="accent1"/>
+            </a:effectRef>
+            <a:fontRef idx="minor">
+              <a:schemeClr val="lt1"/>
+            </a:fontRef>
+          </p:style>
+          <p:txBody>
+            <a:bodyPr rtlCol="0" anchor="ctr"/>
+            <a:lstStyle/>
+            <a:p>
+              <a:pPr algn="ctr"/>
+              <a:r>
+                <a:rPr lang="en-US" sz="900" dirty="0" smtClean="0"/>
+                <a:t>HT_DATA</a:t>
+              </a:r>
+              <a:endParaRPr lang="en-US" sz="900" dirty="0"/>
+            </a:p>
+          </p:txBody>
+        </p:sp>
+        <p:sp>
+          <p:nvSpPr>
+            <p:cNvPr id="10" name="Rectangle 9"/>
+            <p:cNvSpPr/>
+            <p:nvPr/>
+          </p:nvSpPr>
+          <p:spPr>
+            <a:xfrm>
+              <a:off x="3670578" y="4142619"/>
+              <a:ext cx="540000" cy="360000"/>
+            </a:xfrm>
+            <a:prstGeom prst="rect">
+              <a:avLst/>
+            </a:prstGeom>
+          </p:spPr>
+          <p:style>
+            <a:lnRef idx="2">
+              <a:schemeClr val="accent1">
+                <a:shade val="50000"/>
+              </a:schemeClr>
+            </a:lnRef>
+            <a:fillRef idx="1">
+              <a:schemeClr val="accent1"/>
+            </a:fillRef>
+            <a:effectRef idx="0">
+              <a:schemeClr val="accent1"/>
+            </a:effectRef>
+            <a:fontRef idx="minor">
+              <a:schemeClr val="lt1"/>
+            </a:fontRef>
+          </p:style>
+          <p:txBody>
+            <a:bodyPr rtlCol="0" anchor="ctr"/>
+            <a:lstStyle/>
+            <a:p>
+              <a:pPr algn="ctr"/>
+              <a:r>
+                <a:rPr lang="en-US" sz="900" dirty="0" err="1" smtClean="0"/>
+                <a:t>interlv</a:t>
+              </a:r>
+              <a:endParaRPr lang="en-US" sz="900" dirty="0"/>
+            </a:p>
+          </p:txBody>
+        </p:sp>
+        <p:sp>
+          <p:nvSpPr>
+            <p:cNvPr id="11" name="Rectangle 10"/>
+            <p:cNvSpPr/>
+            <p:nvPr/>
+          </p:nvSpPr>
+          <p:spPr>
+            <a:xfrm>
+              <a:off x="4406150" y="4142619"/>
+              <a:ext cx="540000" cy="360000"/>
+            </a:xfrm>
+            <a:prstGeom prst="rect">
+              <a:avLst/>
+            </a:prstGeom>
+          </p:spPr>
+          <p:style>
+            <a:lnRef idx="2">
+              <a:schemeClr val="accent1">
+                <a:shade val="50000"/>
+              </a:schemeClr>
+            </a:lnRef>
+            <a:fillRef idx="1">
+              <a:schemeClr val="accent1"/>
+            </a:fillRef>
+            <a:effectRef idx="0">
+              <a:schemeClr val="accent1"/>
+            </a:effectRef>
+            <a:fontRef idx="minor">
+              <a:schemeClr val="lt1"/>
+            </a:fontRef>
+          </p:style>
+          <p:txBody>
+            <a:bodyPr rtlCol="0" anchor="ctr"/>
+            <a:lstStyle/>
+            <a:p>
+              <a:pPr algn="ctr"/>
+              <a:r>
+                <a:rPr lang="en-US" sz="900" dirty="0" smtClean="0"/>
+                <a:t>map</a:t>
+              </a:r>
+              <a:endParaRPr lang="en-US" sz="900" dirty="0"/>
+            </a:p>
+          </p:txBody>
+        </p:sp>
+        <p:sp>
+          <p:nvSpPr>
+            <p:cNvPr id="13" name="Rectangle 12"/>
+            <p:cNvSpPr/>
+            <p:nvPr/>
+          </p:nvSpPr>
+          <p:spPr>
+            <a:xfrm>
+              <a:off x="3670578" y="4725636"/>
+              <a:ext cx="540000" cy="360000"/>
+            </a:xfrm>
+            <a:prstGeom prst="rect">
+              <a:avLst/>
+            </a:prstGeom>
+          </p:spPr>
+          <p:style>
+            <a:lnRef idx="2">
+              <a:schemeClr val="accent1">
+                <a:shade val="50000"/>
+              </a:schemeClr>
+            </a:lnRef>
+            <a:fillRef idx="1">
+              <a:schemeClr val="accent1"/>
+            </a:fillRef>
+            <a:effectRef idx="0">
+              <a:schemeClr val="accent1"/>
+            </a:effectRef>
+            <a:fontRef idx="minor">
+              <a:schemeClr val="lt1"/>
+            </a:fontRef>
+          </p:style>
+          <p:txBody>
+            <a:bodyPr rtlCol="0" anchor="ctr"/>
+            <a:lstStyle/>
+            <a:p>
+              <a:pPr algn="ctr"/>
+              <a:r>
+                <a:rPr lang="en-US" sz="900" dirty="0" err="1" smtClean="0"/>
+                <a:t>interlv</a:t>
+              </a:r>
+              <a:endParaRPr lang="en-US" sz="900" dirty="0"/>
+            </a:p>
+          </p:txBody>
+        </p:sp>
+        <p:sp>
+          <p:nvSpPr>
+            <p:cNvPr id="14" name="Rectangle 13"/>
+            <p:cNvSpPr/>
+            <p:nvPr/>
+          </p:nvSpPr>
+          <p:spPr>
+            <a:xfrm>
+              <a:off x="4406150" y="4725636"/>
+              <a:ext cx="540000" cy="360000"/>
+            </a:xfrm>
+            <a:prstGeom prst="rect">
+              <a:avLst/>
+            </a:prstGeom>
+          </p:spPr>
+          <p:style>
+            <a:lnRef idx="2">
+              <a:schemeClr val="accent1">
+                <a:shade val="50000"/>
+              </a:schemeClr>
+            </a:lnRef>
+            <a:fillRef idx="1">
+              <a:schemeClr val="accent1"/>
+            </a:fillRef>
+            <a:effectRef idx="0">
+              <a:schemeClr val="accent1"/>
+            </a:effectRef>
+            <a:fontRef idx="minor">
+              <a:schemeClr val="lt1"/>
+            </a:fontRef>
+          </p:style>
+          <p:txBody>
+            <a:bodyPr rtlCol="0" anchor="ctr"/>
+            <a:lstStyle/>
+            <a:p>
+              <a:pPr algn="ctr"/>
+              <a:r>
+                <a:rPr lang="en-US" sz="900" dirty="0" smtClean="0"/>
+                <a:t>map</a:t>
+              </a:r>
+              <a:endParaRPr lang="en-US" sz="900" dirty="0"/>
+            </a:p>
+          </p:txBody>
+        </p:sp>
+        <p:sp>
+          <p:nvSpPr>
+            <p:cNvPr id="15" name="Rectangle 14"/>
+            <p:cNvSpPr/>
+            <p:nvPr/>
+          </p:nvSpPr>
+          <p:spPr>
+            <a:xfrm>
+              <a:off x="5911100" y="4152537"/>
+              <a:ext cx="540000" cy="360000"/>
+            </a:xfrm>
+            <a:prstGeom prst="rect">
+              <a:avLst/>
+            </a:prstGeom>
+          </p:spPr>
+          <p:style>
+            <a:lnRef idx="2">
+              <a:schemeClr val="accent1">
+                <a:shade val="50000"/>
+              </a:schemeClr>
+            </a:lnRef>
+            <a:fillRef idx="1">
+              <a:schemeClr val="accent1"/>
+            </a:fillRef>
+            <a:effectRef idx="0">
+              <a:schemeClr val="accent1"/>
+            </a:effectRef>
+            <a:fontRef idx="minor">
+              <a:schemeClr val="lt1"/>
+            </a:fontRef>
+          </p:style>
+          <p:txBody>
+            <a:bodyPr rtlCol="0" anchor="ctr"/>
+            <a:lstStyle/>
+            <a:p>
+              <a:pPr algn="ctr"/>
+              <a:r>
+                <a:rPr lang="en-US" sz="900" dirty="0" smtClean="0"/>
+                <a:t>IFFT</a:t>
+              </a:r>
+              <a:endParaRPr lang="en-US" sz="900" dirty="0"/>
+            </a:p>
+          </p:txBody>
+        </p:sp>
+        <p:sp>
+          <p:nvSpPr>
+            <p:cNvPr id="16" name="Rectangle 15"/>
+            <p:cNvSpPr/>
+            <p:nvPr/>
+          </p:nvSpPr>
+          <p:spPr>
+            <a:xfrm>
+              <a:off x="5911100" y="4725636"/>
+              <a:ext cx="540000" cy="360000"/>
+            </a:xfrm>
+            <a:prstGeom prst="rect">
+              <a:avLst/>
+            </a:prstGeom>
+          </p:spPr>
+          <p:style>
+            <a:lnRef idx="2">
+              <a:schemeClr val="accent1">
+                <a:shade val="50000"/>
+              </a:schemeClr>
+            </a:lnRef>
+            <a:fillRef idx="1">
+              <a:schemeClr val="accent1"/>
+            </a:fillRef>
+            <a:effectRef idx="0">
+              <a:schemeClr val="accent1"/>
+            </a:effectRef>
+            <a:fontRef idx="minor">
+              <a:schemeClr val="lt1"/>
+            </a:fontRef>
+          </p:style>
+          <p:txBody>
+            <a:bodyPr rtlCol="0" anchor="ctr"/>
+            <a:lstStyle/>
+            <a:p>
+              <a:pPr algn="ctr"/>
+              <a:r>
+                <a:rPr lang="en-US" sz="900" dirty="0" smtClean="0"/>
+                <a:t>IFFT</a:t>
+              </a:r>
+              <a:endParaRPr lang="en-US" sz="900" dirty="0"/>
+            </a:p>
+          </p:txBody>
+        </p:sp>
+        <p:sp>
+          <p:nvSpPr>
+            <p:cNvPr id="17" name="Rectangle 16"/>
+            <p:cNvSpPr/>
+            <p:nvPr/>
+          </p:nvSpPr>
+          <p:spPr>
+            <a:xfrm>
+              <a:off x="5152150" y="4142619"/>
+              <a:ext cx="540000" cy="360000"/>
+            </a:xfrm>
+            <a:prstGeom prst="rect">
+              <a:avLst/>
+            </a:prstGeom>
+          </p:spPr>
+          <p:style>
+            <a:lnRef idx="2">
+              <a:schemeClr val="accent1">
+                <a:shade val="50000"/>
+              </a:schemeClr>
+            </a:lnRef>
+            <a:fillRef idx="1">
+              <a:schemeClr val="accent1"/>
+            </a:fillRef>
+            <a:effectRef idx="0">
+              <a:schemeClr val="accent1"/>
+            </a:effectRef>
+            <a:fontRef idx="minor">
+              <a:schemeClr val="lt1"/>
+            </a:fontRef>
+          </p:style>
+          <p:txBody>
+            <a:bodyPr rtlCol="0" anchor="ctr"/>
+            <a:lstStyle/>
+            <a:p>
+              <a:pPr algn="ctr"/>
+              <a:r>
+                <a:rPr lang="en-US" sz="900" dirty="0" smtClean="0"/>
+                <a:t>Pilot</a:t>
+              </a:r>
+              <a:endParaRPr lang="en-US" sz="900" dirty="0"/>
+            </a:p>
+          </p:txBody>
+        </p:sp>
+        <p:sp>
+          <p:nvSpPr>
+            <p:cNvPr id="18" name="Rectangle 17"/>
+            <p:cNvSpPr/>
+            <p:nvPr/>
+          </p:nvSpPr>
+          <p:spPr>
+            <a:xfrm>
+              <a:off x="5152150" y="4725636"/>
+              <a:ext cx="540000" cy="360000"/>
+            </a:xfrm>
+            <a:prstGeom prst="rect">
+              <a:avLst/>
+            </a:prstGeom>
+          </p:spPr>
+          <p:style>
+            <a:lnRef idx="2">
+              <a:schemeClr val="accent1">
+                <a:shade val="50000"/>
+              </a:schemeClr>
+            </a:lnRef>
+            <a:fillRef idx="1">
+              <a:schemeClr val="accent1"/>
+            </a:fillRef>
+            <a:effectRef idx="0">
+              <a:schemeClr val="accent1"/>
+            </a:effectRef>
+            <a:fontRef idx="minor">
+              <a:schemeClr val="lt1"/>
+            </a:fontRef>
+          </p:style>
+          <p:txBody>
+            <a:bodyPr rtlCol="0" anchor="ctr"/>
+            <a:lstStyle/>
+            <a:p>
+              <a:pPr algn="ctr"/>
+              <a:r>
+                <a:rPr lang="en-US" sz="900" dirty="0" smtClean="0"/>
+                <a:t>Pilot</a:t>
+              </a:r>
+              <a:endParaRPr lang="en-US" sz="900" dirty="0"/>
+            </a:p>
+          </p:txBody>
+        </p:sp>
+        <p:cxnSp>
+          <p:nvCxnSpPr>
+            <p:cNvPr id="22" name="Straight Arrow Connector 21"/>
+            <p:cNvCxnSpPr>
+              <a:stCxn id="10" idx="3"/>
+              <a:endCxn id="11" idx="1"/>
+            </p:cNvCxnSpPr>
+            <p:nvPr/>
+          </p:nvCxnSpPr>
+          <p:spPr>
+            <a:xfrm>
+              <a:off x="4210578" y="4322619"/>
+              <a:ext cx="195572" cy="0"/>
+            </a:xfrm>
+            <a:prstGeom prst="straightConnector1">
+              <a:avLst/>
+            </a:prstGeom>
+            <a:ln>
+              <a:tailEnd type="arrow"/>
+            </a:ln>
+          </p:spPr>
+          <p:style>
+            <a:lnRef idx="1">
+              <a:schemeClr val="accent1"/>
+            </a:lnRef>
+            <a:fillRef idx="0">
+              <a:schemeClr val="accent1"/>
+            </a:fillRef>
+            <a:effectRef idx="0">
+              <a:schemeClr val="accent1"/>
+            </a:effectRef>
+            <a:fontRef idx="minor">
+              <a:schemeClr val="tx1"/>
+            </a:fontRef>
+          </p:style>
+        </p:cxnSp>
+        <p:cxnSp>
+          <p:nvCxnSpPr>
+            <p:cNvPr id="23" name="Straight Arrow Connector 22"/>
+            <p:cNvCxnSpPr>
+              <a:stCxn id="13" idx="3"/>
+              <a:endCxn id="14" idx="1"/>
+            </p:cNvCxnSpPr>
+            <p:nvPr/>
+          </p:nvCxnSpPr>
+          <p:spPr>
+            <a:xfrm>
+              <a:off x="4210578" y="4905636"/>
+              <a:ext cx="195572" cy="0"/>
+            </a:xfrm>
+            <a:prstGeom prst="straightConnector1">
+              <a:avLst/>
+            </a:prstGeom>
+            <a:ln>
+              <a:tailEnd type="arrow"/>
+            </a:ln>
+          </p:spPr>
+          <p:style>
+            <a:lnRef idx="1">
+              <a:schemeClr val="accent1"/>
+            </a:lnRef>
+            <a:fillRef idx="0">
+              <a:schemeClr val="accent1"/>
+            </a:fillRef>
+            <a:effectRef idx="0">
+              <a:schemeClr val="accent1"/>
+            </a:effectRef>
+            <a:fontRef idx="minor">
+              <a:schemeClr val="tx1"/>
+            </a:fontRef>
+          </p:style>
+        </p:cxnSp>
+        <p:cxnSp>
+          <p:nvCxnSpPr>
+            <p:cNvPr id="24" name="Straight Arrow Connector 23"/>
+            <p:cNvCxnSpPr>
+              <a:stCxn id="11" idx="3"/>
+              <a:endCxn id="17" idx="1"/>
+            </p:cNvCxnSpPr>
+            <p:nvPr/>
+          </p:nvCxnSpPr>
+          <p:spPr>
+            <a:xfrm>
+              <a:off x="4946150" y="4322619"/>
+              <a:ext cx="206000" cy="0"/>
+            </a:xfrm>
+            <a:prstGeom prst="straightConnector1">
+              <a:avLst/>
+            </a:prstGeom>
+            <a:ln>
+              <a:tailEnd type="arrow"/>
+            </a:ln>
+          </p:spPr>
+          <p:style>
+            <a:lnRef idx="1">
+              <a:schemeClr val="accent1"/>
+            </a:lnRef>
+            <a:fillRef idx="0">
+              <a:schemeClr val="accent1"/>
+            </a:fillRef>
+            <a:effectRef idx="0">
+              <a:schemeClr val="accent1"/>
+            </a:effectRef>
+            <a:fontRef idx="minor">
+              <a:schemeClr val="tx1"/>
+            </a:fontRef>
+          </p:style>
+        </p:cxnSp>
+        <p:cxnSp>
+          <p:nvCxnSpPr>
+            <p:cNvPr id="25" name="Straight Arrow Connector 24"/>
+            <p:cNvCxnSpPr>
+              <a:stCxn id="14" idx="3"/>
+              <a:endCxn id="18" idx="1"/>
+            </p:cNvCxnSpPr>
+            <p:nvPr/>
+          </p:nvCxnSpPr>
+          <p:spPr>
+            <a:xfrm>
+              <a:off x="4946150" y="4905636"/>
+              <a:ext cx="206000" cy="0"/>
+            </a:xfrm>
+            <a:prstGeom prst="straightConnector1">
+              <a:avLst/>
+            </a:prstGeom>
+            <a:ln>
+              <a:tailEnd type="arrow"/>
+            </a:ln>
+          </p:spPr>
+          <p:style>
+            <a:lnRef idx="1">
+              <a:schemeClr val="accent1"/>
+            </a:lnRef>
+            <a:fillRef idx="0">
+              <a:schemeClr val="accent1"/>
+            </a:fillRef>
+            <a:effectRef idx="0">
+              <a:schemeClr val="accent1"/>
+            </a:effectRef>
+            <a:fontRef idx="minor">
+              <a:schemeClr val="tx1"/>
+            </a:fontRef>
+          </p:style>
+        </p:cxnSp>
+        <p:cxnSp>
+          <p:nvCxnSpPr>
+            <p:cNvPr id="26" name="Straight Arrow Connector 25"/>
+            <p:cNvCxnSpPr>
+              <a:stCxn id="17" idx="3"/>
+              <a:endCxn id="15" idx="1"/>
+            </p:cNvCxnSpPr>
+            <p:nvPr/>
+          </p:nvCxnSpPr>
+          <p:spPr>
+            <a:xfrm>
+              <a:off x="5692150" y="4322619"/>
+              <a:ext cx="218950" cy="9918"/>
+            </a:xfrm>
+            <a:prstGeom prst="straightConnector1">
+              <a:avLst/>
+            </a:prstGeom>
+            <a:ln>
+              <a:tailEnd type="arrow"/>
+            </a:ln>
+          </p:spPr>
+          <p:style>
+            <a:lnRef idx="1">
+              <a:schemeClr val="accent1"/>
+            </a:lnRef>
+            <a:fillRef idx="0">
+              <a:schemeClr val="accent1"/>
+            </a:fillRef>
+            <a:effectRef idx="0">
+              <a:schemeClr val="accent1"/>
+            </a:effectRef>
+            <a:fontRef idx="minor">
+              <a:schemeClr val="tx1"/>
+            </a:fontRef>
+          </p:style>
+        </p:cxnSp>
+        <p:cxnSp>
+          <p:nvCxnSpPr>
+            <p:cNvPr id="27" name="Straight Arrow Connector 26"/>
+            <p:cNvCxnSpPr>
+              <a:stCxn id="18" idx="3"/>
+              <a:endCxn id="16" idx="1"/>
+            </p:cNvCxnSpPr>
+            <p:nvPr/>
+          </p:nvCxnSpPr>
+          <p:spPr>
+            <a:xfrm>
+              <a:off x="5692150" y="4905636"/>
+              <a:ext cx="218950" cy="0"/>
+            </a:xfrm>
+            <a:prstGeom prst="straightConnector1">
+              <a:avLst/>
+            </a:prstGeom>
+            <a:ln>
+              <a:tailEnd type="arrow"/>
+            </a:ln>
+          </p:spPr>
+          <p:style>
+            <a:lnRef idx="1">
+              <a:schemeClr val="accent1"/>
+            </a:lnRef>
+            <a:fillRef idx="0">
+              <a:schemeClr val="accent1"/>
+            </a:fillRef>
+            <a:effectRef idx="0">
+              <a:schemeClr val="accent1"/>
+            </a:effectRef>
+            <a:fontRef idx="minor">
+              <a:schemeClr val="tx1"/>
+            </a:fontRef>
+          </p:style>
+        </p:cxnSp>
+        <p:cxnSp>
+          <p:nvCxnSpPr>
+            <p:cNvPr id="28" name="Straight Arrow Connector 27"/>
+            <p:cNvCxnSpPr>
+              <a:stCxn id="16" idx="3"/>
+              <a:endCxn id="5" idx="1"/>
+            </p:cNvCxnSpPr>
+            <p:nvPr/>
+          </p:nvCxnSpPr>
+          <p:spPr>
+            <a:xfrm>
+              <a:off x="6451100" y="4905636"/>
+              <a:ext cx="206500" cy="0"/>
+            </a:xfrm>
+            <a:prstGeom prst="straightConnector1">
+              <a:avLst/>
+            </a:prstGeom>
+            <a:ln>
+              <a:tailEnd type="arrow"/>
+            </a:ln>
+          </p:spPr>
+          <p:style>
+            <a:lnRef idx="1">
+              <a:schemeClr val="accent1"/>
+            </a:lnRef>
+            <a:fillRef idx="0">
+              <a:schemeClr val="accent1"/>
+            </a:fillRef>
+            <a:effectRef idx="0">
+              <a:schemeClr val="accent1"/>
+            </a:effectRef>
+            <a:fontRef idx="minor">
+              <a:schemeClr val="tx1"/>
+            </a:fontRef>
+          </p:style>
+        </p:cxnSp>
+        <p:cxnSp>
+          <p:nvCxnSpPr>
+            <p:cNvPr id="29" name="Straight Arrow Connector 28"/>
+            <p:cNvCxnSpPr>
+              <a:stCxn id="15" idx="3"/>
+              <a:endCxn id="4" idx="1"/>
+            </p:cNvCxnSpPr>
+            <p:nvPr/>
+          </p:nvCxnSpPr>
+          <p:spPr>
+            <a:xfrm flipV="1">
+              <a:off x="6451100" y="4322619"/>
+              <a:ext cx="206500" cy="9918"/>
+            </a:xfrm>
+            <a:prstGeom prst="straightConnector1">
+              <a:avLst/>
+            </a:prstGeom>
+            <a:ln>
+              <a:tailEnd type="arrow"/>
+            </a:ln>
+          </p:spPr>
+          <p:style>
+            <a:lnRef idx="1">
+              <a:schemeClr val="accent1"/>
+            </a:lnRef>
+            <a:fillRef idx="0">
+              <a:schemeClr val="accent1"/>
+            </a:fillRef>
+            <a:effectRef idx="0">
+              <a:schemeClr val="accent1"/>
+            </a:effectRef>
+            <a:fontRef idx="minor">
+              <a:schemeClr val="tx1"/>
+            </a:fontRef>
+          </p:style>
+        </p:cxnSp>
+        <p:cxnSp>
+          <p:nvCxnSpPr>
+            <p:cNvPr id="30" name="Straight Arrow Connector 29"/>
+            <p:cNvCxnSpPr>
+              <a:stCxn id="5" idx="3"/>
+              <a:endCxn id="6" idx="1"/>
+            </p:cNvCxnSpPr>
+            <p:nvPr/>
+          </p:nvCxnSpPr>
+          <p:spPr>
+            <a:xfrm>
+              <a:off x="7197600" y="4905636"/>
+              <a:ext cx="263400" cy="0"/>
+            </a:xfrm>
+            <a:prstGeom prst="straightConnector1">
+              <a:avLst/>
+            </a:prstGeom>
+            <a:ln>
+              <a:tailEnd type="arrow"/>
+            </a:ln>
+          </p:spPr>
+          <p:style>
+            <a:lnRef idx="1">
+              <a:schemeClr val="accent1"/>
+            </a:lnRef>
+            <a:fillRef idx="0">
+              <a:schemeClr val="accent1"/>
+            </a:fillRef>
+            <a:effectRef idx="0">
+              <a:schemeClr val="accent1"/>
+            </a:effectRef>
+            <a:fontRef idx="minor">
+              <a:schemeClr val="tx1"/>
+            </a:fontRef>
+          </p:style>
+        </p:cxnSp>
+        <p:sp>
+          <p:nvSpPr>
+            <p:cNvPr id="31" name="Rectangle 30"/>
+            <p:cNvSpPr/>
+            <p:nvPr/>
+          </p:nvSpPr>
+          <p:spPr>
+            <a:xfrm>
+              <a:off x="1981200" y="4142619"/>
+              <a:ext cx="609600" cy="360000"/>
+            </a:xfrm>
+            <a:prstGeom prst="rect">
+              <a:avLst/>
+            </a:prstGeom>
+          </p:spPr>
+          <p:style>
+            <a:lnRef idx="2">
+              <a:schemeClr val="accent1">
+                <a:shade val="50000"/>
+              </a:schemeClr>
+            </a:lnRef>
+            <a:fillRef idx="1">
+              <a:schemeClr val="accent1"/>
+            </a:fillRef>
+            <a:effectRef idx="0">
+              <a:schemeClr val="accent1"/>
+            </a:effectRef>
+            <a:fontRef idx="minor">
+              <a:schemeClr val="lt1"/>
+            </a:fontRef>
+          </p:style>
+          <p:txBody>
+            <a:bodyPr rtlCol="0" anchor="ctr"/>
+            <a:lstStyle/>
+            <a:p>
+              <a:pPr algn="ctr"/>
+              <a:r>
+                <a:rPr lang="en-US" sz="900" dirty="0" smtClean="0"/>
+                <a:t>scramble</a:t>
+              </a:r>
+              <a:endParaRPr lang="en-US" sz="900" dirty="0"/>
+            </a:p>
+          </p:txBody>
+        </p:sp>
+        <p:cxnSp>
+          <p:nvCxnSpPr>
+            <p:cNvPr id="33" name="Elbow Connector 32"/>
+            <p:cNvCxnSpPr>
+              <a:stCxn id="8" idx="3"/>
+              <a:endCxn id="31" idx="1"/>
+            </p:cNvCxnSpPr>
+            <p:nvPr/>
+          </p:nvCxnSpPr>
+          <p:spPr>
+            <a:xfrm flipV="1">
+              <a:off x="1149600" y="4322619"/>
+              <a:ext cx="831600" cy="277079"/>
+            </a:xfrm>
+            <a:prstGeom prst="bentConnector3">
+              <a:avLst/>
+            </a:prstGeom>
+            <a:ln>
+              <a:tailEnd type="arrow"/>
+            </a:ln>
+          </p:spPr>
+          <p:style>
+            <a:lnRef idx="1">
+              <a:schemeClr val="accent1"/>
+            </a:lnRef>
+            <a:fillRef idx="0">
+              <a:schemeClr val="accent1"/>
+            </a:fillRef>
+            <a:effectRef idx="0">
+              <a:schemeClr val="accent1"/>
+            </a:effectRef>
+            <a:fontRef idx="minor">
+              <a:schemeClr val="tx1"/>
+            </a:fontRef>
+          </p:style>
+        </p:cxnSp>
+        <p:sp>
+          <p:nvSpPr>
+            <p:cNvPr id="36" name="Rectangle 35"/>
+            <p:cNvSpPr/>
+            <p:nvPr/>
+          </p:nvSpPr>
+          <p:spPr>
+            <a:xfrm>
+              <a:off x="2895600" y="4142619"/>
+              <a:ext cx="540000" cy="360000"/>
+            </a:xfrm>
+            <a:prstGeom prst="rect">
+              <a:avLst/>
+            </a:prstGeom>
+          </p:spPr>
+          <p:style>
+            <a:lnRef idx="2">
+              <a:schemeClr val="accent1">
+                <a:shade val="50000"/>
+              </a:schemeClr>
+            </a:lnRef>
+            <a:fillRef idx="1">
+              <a:schemeClr val="accent1"/>
+            </a:fillRef>
+            <a:effectRef idx="0">
+              <a:schemeClr val="accent1"/>
+            </a:effectRef>
+            <a:fontRef idx="minor">
+              <a:schemeClr val="lt1"/>
+            </a:fontRef>
+          </p:style>
+          <p:txBody>
+            <a:bodyPr rtlCol="0" anchor="ctr"/>
+            <a:lstStyle/>
+            <a:p>
+              <a:pPr algn="ctr"/>
+              <a:r>
+                <a:rPr lang="en-US" sz="900" dirty="0" err="1" smtClean="0"/>
+                <a:t>conv</a:t>
+              </a:r>
+              <a:endParaRPr lang="en-US" sz="900" dirty="0"/>
+            </a:p>
+          </p:txBody>
+        </p:sp>
+        <p:sp>
+          <p:nvSpPr>
+            <p:cNvPr id="37" name="Rectangle 36"/>
+            <p:cNvSpPr/>
+            <p:nvPr/>
+          </p:nvSpPr>
+          <p:spPr>
+            <a:xfrm>
+              <a:off x="2895600" y="4732700"/>
+              <a:ext cx="540000" cy="360000"/>
+            </a:xfrm>
+            <a:prstGeom prst="rect">
+              <a:avLst/>
+            </a:prstGeom>
+          </p:spPr>
+          <p:style>
+            <a:lnRef idx="2">
+              <a:schemeClr val="accent1">
+                <a:shade val="50000"/>
+              </a:schemeClr>
+            </a:lnRef>
+            <a:fillRef idx="1">
+              <a:schemeClr val="accent1"/>
+            </a:fillRef>
+            <a:effectRef idx="0">
+              <a:schemeClr val="accent1"/>
+            </a:effectRef>
+            <a:fontRef idx="minor">
+              <a:schemeClr val="lt1"/>
+            </a:fontRef>
+          </p:style>
+          <p:txBody>
+            <a:bodyPr rtlCol="0" anchor="ctr"/>
+            <a:lstStyle/>
+            <a:p>
+              <a:pPr algn="ctr"/>
+              <a:r>
+                <a:rPr lang="en-US" sz="900" dirty="0" err="1" smtClean="0"/>
+                <a:t>conv</a:t>
+              </a:r>
+              <a:endParaRPr lang="en-US" sz="900" dirty="0"/>
+            </a:p>
+          </p:txBody>
+        </p:sp>
+        <p:cxnSp>
+          <p:nvCxnSpPr>
+            <p:cNvPr id="43" name="Straight Arrow Connector 42"/>
+            <p:cNvCxnSpPr>
+              <a:stCxn id="36" idx="3"/>
+              <a:endCxn id="10" idx="1"/>
+            </p:cNvCxnSpPr>
+            <p:nvPr/>
+          </p:nvCxnSpPr>
+          <p:spPr>
+            <a:xfrm>
+              <a:off x="3435600" y="4322619"/>
+              <a:ext cx="234978" cy="0"/>
+            </a:xfrm>
+            <a:prstGeom prst="straightConnector1">
+              <a:avLst/>
+            </a:prstGeom>
+            <a:ln>
+              <a:tailEnd type="arrow"/>
+            </a:ln>
+          </p:spPr>
+          <p:style>
+            <a:lnRef idx="1">
+              <a:schemeClr val="accent1"/>
+            </a:lnRef>
+            <a:fillRef idx="0">
+              <a:schemeClr val="accent1"/>
+            </a:fillRef>
+            <a:effectRef idx="0">
+              <a:schemeClr val="accent1"/>
+            </a:effectRef>
+            <a:fontRef idx="minor">
+              <a:schemeClr val="tx1"/>
+            </a:fontRef>
+          </p:style>
+        </p:cxnSp>
+        <p:cxnSp>
+          <p:nvCxnSpPr>
+            <p:cNvPr id="45" name="Straight Arrow Connector 44"/>
+            <p:cNvCxnSpPr>
+              <a:stCxn id="37" idx="3"/>
+              <a:endCxn id="13" idx="1"/>
+            </p:cNvCxnSpPr>
+            <p:nvPr/>
+          </p:nvCxnSpPr>
+          <p:spPr>
+            <a:xfrm flipV="1">
+              <a:off x="3435600" y="4905636"/>
+              <a:ext cx="234978" cy="7064"/>
+            </a:xfrm>
+            <a:prstGeom prst="straightConnector1">
+              <a:avLst/>
+            </a:prstGeom>
+            <a:ln>
+              <a:tailEnd type="arrow"/>
+            </a:ln>
+          </p:spPr>
+          <p:style>
+            <a:lnRef idx="1">
+              <a:schemeClr val="accent1"/>
+            </a:lnRef>
+            <a:fillRef idx="0">
+              <a:schemeClr val="accent1"/>
+            </a:fillRef>
+            <a:effectRef idx="0">
+              <a:schemeClr val="accent1"/>
+            </a:effectRef>
+            <a:fontRef idx="minor">
+              <a:schemeClr val="tx1"/>
+            </a:fontRef>
+          </p:style>
+        </p:cxnSp>
+        <p:sp>
+          <p:nvSpPr>
+            <p:cNvPr id="50" name="Rectangle 49"/>
+            <p:cNvSpPr/>
+            <p:nvPr/>
+          </p:nvSpPr>
+          <p:spPr>
+            <a:xfrm>
+              <a:off x="1981200" y="4725636"/>
+              <a:ext cx="609600" cy="360000"/>
+            </a:xfrm>
+            <a:prstGeom prst="rect">
+              <a:avLst/>
+            </a:prstGeom>
+          </p:spPr>
+          <p:style>
+            <a:lnRef idx="2">
+              <a:schemeClr val="accent1">
+                <a:shade val="50000"/>
+              </a:schemeClr>
+            </a:lnRef>
+            <a:fillRef idx="1">
+              <a:schemeClr val="accent1"/>
+            </a:fillRef>
+            <a:effectRef idx="0">
+              <a:schemeClr val="accent1"/>
+            </a:effectRef>
+            <a:fontRef idx="minor">
+              <a:schemeClr val="lt1"/>
+            </a:fontRef>
+          </p:style>
+          <p:txBody>
+            <a:bodyPr rtlCol="0" anchor="ctr"/>
+            <a:lstStyle/>
+            <a:p>
+              <a:pPr algn="ctr"/>
+              <a:r>
+                <a:rPr lang="en-US" sz="900" dirty="0" smtClean="0"/>
+                <a:t>scramble</a:t>
+              </a:r>
+              <a:endParaRPr lang="en-US" sz="900" dirty="0"/>
+            </a:p>
+          </p:txBody>
+        </p:sp>
+      </p:grpSp>
+      <p:graphicFrame>
+        <p:nvGraphicFramePr>
+          <p:cNvPr id="47" name="Table 46"/>
+          <p:cNvGraphicFramePr>
+            <a:graphicFrameLocks noGrp="1"/>
+          </p:cNvGraphicFramePr>
+          <p:nvPr>
+            <p:extLst>
+              <p:ext uri="{D42A27DB-BD31-4B8C-83A1-F6EECF244321}">
+                <p14:modId xmlns:p14="http://schemas.microsoft.com/office/powerpoint/2010/main" val="2578762788"/>
+              </p:ext>
+            </p:extLst>
+          </p:nvPr>
+        </p:nvGraphicFramePr>
+        <p:xfrm>
+          <a:off x="561600" y="3048000"/>
+          <a:ext cx="6601200" cy="2966720"/>
+        </p:xfrm>
+        <a:graphic>
+          <a:graphicData uri="http://schemas.openxmlformats.org/drawingml/2006/table">
+            <a:tbl>
+              <a:tblPr firstRow="1" bandRow="1">
+                <a:tableStyleId>{5C22544A-7EE6-4342-B048-85BDC9FD1C3A}</a:tableStyleId>
+              </a:tblPr>
+              <a:tblGrid>
+                <a:gridCol w="2257800"/>
+                <a:gridCol w="1123800"/>
+                <a:gridCol w="1609800"/>
+                <a:gridCol w="1609800"/>
+              </a:tblGrid>
+              <a:tr h="370840">
+                <a:tc>
+                  <a:txBody>
+                    <a:bodyPr/>
+                    <a:lstStyle/>
+                    <a:p>
+                      <a:r>
+                        <a:rPr lang="en-US" dirty="0" smtClean="0"/>
+                        <a:t>MCS</a:t>
+                      </a:r>
+                      <a:endParaRPr lang="en-US" dirty="0"/>
+                    </a:p>
+                  </a:txBody>
+                  <a:tcPr/>
+                </a:tc>
+                <a:tc>
+                  <a:txBody>
+                    <a:bodyPr/>
+                    <a:lstStyle/>
+                    <a:p>
+                      <a:r>
+                        <a:rPr lang="en-US" dirty="0" smtClean="0"/>
+                        <a:t>CONV</a:t>
+                      </a:r>
+                      <a:endParaRPr lang="en-US" dirty="0"/>
+                    </a:p>
+                  </a:txBody>
+                  <a:tcPr/>
+                </a:tc>
+                <a:tc>
+                  <a:txBody>
+                    <a:bodyPr/>
+                    <a:lstStyle/>
+                    <a:p>
+                      <a:r>
+                        <a:rPr lang="en-US" dirty="0" smtClean="0"/>
+                        <a:t>INTERLV</a:t>
+                      </a:r>
+                      <a:endParaRPr lang="en-US" dirty="0"/>
+                    </a:p>
+                  </a:txBody>
+                  <a:tcPr/>
+                </a:tc>
+                <a:tc>
+                  <a:txBody>
+                    <a:bodyPr/>
+                    <a:lstStyle/>
+                    <a:p>
+                      <a:r>
+                        <a:rPr lang="en-US" dirty="0" smtClean="0"/>
+                        <a:t>Rate</a:t>
+                      </a:r>
+                      <a:r>
+                        <a:rPr lang="en-US" baseline="0" dirty="0" smtClean="0"/>
+                        <a:t> Match</a:t>
+                      </a:r>
+                      <a:endParaRPr lang="en-US" dirty="0"/>
+                    </a:p>
+                  </a:txBody>
+                  <a:tcPr/>
+                </a:tc>
+              </a:tr>
+              <a:tr h="370840">
+                <a:tc>
+                  <a:txBody>
+                    <a:bodyPr/>
+                    <a:lstStyle/>
+                    <a:p>
+                      <a:r>
+                        <a:rPr lang="en-US" dirty="0" smtClean="0"/>
+                        <a:t>8(BPSK, 1/2)</a:t>
+                      </a:r>
+                      <a:endParaRPr lang="en-US" dirty="0"/>
+                    </a:p>
+                  </a:txBody>
+                  <a:tcPr/>
+                </a:tc>
+                <a:tc>
+                  <a:txBody>
+                    <a:bodyPr/>
+                    <a:lstStyle/>
+                    <a:p>
+                      <a:endParaRPr lang="en-US" dirty="0"/>
+                    </a:p>
+                  </a:txBody>
+                  <a:tcPr/>
+                </a:tc>
+                <a:tc>
+                  <a:txBody>
+                    <a:bodyPr/>
+                    <a:lstStyle/>
+                    <a:p>
+                      <a:r>
+                        <a:rPr lang="en-US" dirty="0" smtClean="0"/>
+                        <a:t>6.5 (Re Imp.)</a:t>
+                      </a:r>
+                      <a:endParaRPr lang="en-US" dirty="0"/>
+                    </a:p>
+                  </a:txBody>
+                  <a:tcPr/>
+                </a:tc>
+                <a:tc>
+                  <a:txBody>
+                    <a:bodyPr/>
+                    <a:lstStyle/>
+                    <a:p>
+                      <a:r>
+                        <a:rPr lang="en-US" dirty="0" smtClean="0"/>
+                        <a:t>13</a:t>
+                      </a:r>
+                      <a:endParaRPr lang="en-US" dirty="0"/>
+                    </a:p>
+                  </a:txBody>
+                  <a:tcPr/>
+                </a:tc>
+              </a:tr>
+              <a:tr h="370840">
+                <a:tc>
+                  <a:txBody>
+                    <a:bodyPr/>
+                    <a:lstStyle/>
+                    <a:p>
+                      <a:r>
+                        <a:rPr lang="en-US" dirty="0" smtClean="0"/>
+                        <a:t>9(QPSK, 1/2)</a:t>
+                      </a:r>
+                      <a:endParaRPr lang="en-US" dirty="0"/>
+                    </a:p>
+                  </a:txBody>
+                  <a:tcPr/>
+                </a:tc>
+                <a:tc>
+                  <a:txBody>
+                    <a:bodyPr/>
+                    <a:lstStyle/>
+                    <a:p>
+                      <a:endParaRPr lang="en-US" dirty="0"/>
+                    </a:p>
+                  </a:txBody>
+                  <a:tcPr/>
+                </a:tc>
+                <a:tc>
+                  <a:txBody>
+                    <a:bodyPr/>
+                    <a:lstStyle/>
+                    <a:p>
+                      <a:r>
+                        <a:rPr lang="en-US" dirty="0" smtClean="0"/>
+                        <a:t>13</a:t>
+                      </a:r>
+                      <a:endParaRPr lang="en-US" dirty="0"/>
+                    </a:p>
+                  </a:txBody>
+                  <a:tcPr/>
+                </a:tc>
+                <a:tc>
+                  <a:txBody>
+                    <a:bodyPr/>
+                    <a:lstStyle/>
+                    <a:p>
+                      <a:r>
+                        <a:rPr lang="en-US" dirty="0" smtClean="0"/>
+                        <a:t>26</a:t>
+                      </a:r>
+                      <a:endParaRPr lang="en-US" dirty="0"/>
+                    </a:p>
+                  </a:txBody>
+                  <a:tcPr/>
+                </a:tc>
+              </a:tr>
+              <a:tr h="370840">
+                <a:tc>
+                  <a:txBody>
+                    <a:bodyPr/>
+                    <a:lstStyle/>
+                    <a:p>
+                      <a:r>
+                        <a:rPr lang="en-US" dirty="0" smtClean="0"/>
+                        <a:t>10</a:t>
+                      </a:r>
+                      <a:r>
+                        <a:rPr lang="en-US" dirty="0" smtClean="0"/>
+                        <a:t>(QPSK, 3/4)</a:t>
+                      </a:r>
+                      <a:endParaRPr lang="en-US" dirty="0"/>
+                    </a:p>
+                  </a:txBody>
+                  <a:tcPr/>
+                </a:tc>
+                <a:tc>
+                  <a:txBody>
+                    <a:bodyPr/>
+                    <a:lstStyle/>
+                    <a:p>
+                      <a:endParaRPr lang="en-US" dirty="0"/>
+                    </a:p>
+                  </a:txBody>
+                  <a:tcPr/>
+                </a:tc>
+                <a:tc>
+                  <a:txBody>
+                    <a:bodyPr/>
+                    <a:lstStyle/>
+                    <a:p>
+                      <a:r>
+                        <a:rPr lang="en-US" dirty="0" smtClean="0"/>
+                        <a:t>13</a:t>
+                      </a:r>
+                      <a:endParaRPr lang="en-US" dirty="0"/>
+                    </a:p>
+                  </a:txBody>
+                  <a:tcPr/>
+                </a:tc>
+                <a:tc>
+                  <a:txBody>
+                    <a:bodyPr/>
+                    <a:lstStyle/>
+                    <a:p>
+                      <a:r>
+                        <a:rPr lang="en-US" dirty="0" smtClean="0"/>
+                        <a:t>39</a:t>
+                      </a:r>
+                      <a:endParaRPr lang="en-US" dirty="0"/>
+                    </a:p>
+                  </a:txBody>
+                  <a:tcPr/>
+                </a:tc>
+              </a:tr>
+              <a:tr h="370840">
+                <a:tc>
+                  <a:txBody>
+                    <a:bodyPr/>
+                    <a:lstStyle/>
+                    <a:p>
+                      <a:r>
+                        <a:rPr lang="en-US" dirty="0" smtClean="0"/>
+                        <a:t>11</a:t>
+                      </a:r>
+                      <a:r>
+                        <a:rPr lang="en-US" dirty="0" smtClean="0"/>
+                        <a:t>(16QAM, 1/2)</a:t>
+                      </a:r>
+                      <a:endParaRPr lang="en-US" dirty="0"/>
+                    </a:p>
+                  </a:txBody>
+                  <a:tcPr/>
+                </a:tc>
+                <a:tc>
+                  <a:txBody>
+                    <a:bodyPr/>
+                    <a:lstStyle/>
+                    <a:p>
+                      <a:endParaRPr lang="en-US" dirty="0"/>
+                    </a:p>
+                  </a:txBody>
+                  <a:tcPr/>
+                </a:tc>
+                <a:tc>
+                  <a:txBody>
+                    <a:bodyPr/>
+                    <a:lstStyle/>
+                    <a:p>
+                      <a:r>
+                        <a:rPr lang="en-US" dirty="0" smtClean="0"/>
+                        <a:t>26</a:t>
+                      </a:r>
+                      <a:endParaRPr lang="en-US" dirty="0"/>
+                    </a:p>
+                  </a:txBody>
+                  <a:tcPr/>
+                </a:tc>
+                <a:tc>
+                  <a:txBody>
+                    <a:bodyPr/>
+                    <a:lstStyle/>
+                    <a:p>
+                      <a:endParaRPr lang="en-US" dirty="0"/>
+                    </a:p>
+                  </a:txBody>
+                  <a:tcPr/>
+                </a:tc>
+              </a:tr>
+              <a:tr h="370840">
+                <a:tc>
+                  <a:txBody>
+                    <a:bodyPr/>
+                    <a:lstStyle/>
+                    <a:p>
+                      <a:r>
+                        <a:rPr lang="en-US" dirty="0" smtClean="0"/>
+                        <a:t>12</a:t>
+                      </a:r>
+                      <a:r>
+                        <a:rPr lang="en-US" dirty="0" smtClean="0"/>
+                        <a:t>(16QAM, 3/4)</a:t>
+                      </a:r>
+                      <a:endParaRPr lang="en-US" dirty="0"/>
+                    </a:p>
+                  </a:txBody>
+                  <a:tcPr/>
+                </a:tc>
+                <a:tc>
+                  <a:txBody>
+                    <a:bodyPr/>
+                    <a:lstStyle/>
+                    <a:p>
+                      <a:endParaRPr lang="en-US" dirty="0"/>
+                    </a:p>
+                  </a:txBody>
+                  <a:tcPr/>
+                </a:tc>
+                <a:tc>
+                  <a:txBody>
+                    <a:bodyPr/>
+                    <a:lstStyle/>
+                    <a:p>
+                      <a:r>
+                        <a:rPr lang="en-US" dirty="0" smtClean="0"/>
+                        <a:t>26</a:t>
+                      </a:r>
+                      <a:endParaRPr lang="en-US" dirty="0"/>
+                    </a:p>
+                  </a:txBody>
+                  <a:tcPr/>
+                </a:tc>
+                <a:tc>
+                  <a:txBody>
+                    <a:bodyPr/>
+                    <a:lstStyle/>
+                    <a:p>
+                      <a:endParaRPr lang="en-US"/>
+                    </a:p>
+                  </a:txBody>
+                  <a:tcPr/>
+                </a:tc>
+              </a:tr>
+              <a:tr h="370840">
+                <a:tc>
+                  <a:txBody>
+                    <a:bodyPr/>
+                    <a:lstStyle/>
+                    <a:p>
+                      <a:r>
+                        <a:rPr lang="en-US" dirty="0" smtClean="0"/>
+                        <a:t>13</a:t>
+                      </a:r>
+                      <a:r>
+                        <a:rPr lang="en-US" dirty="0" smtClean="0"/>
+                        <a:t>(64QAM, 2/3)</a:t>
+                      </a:r>
+                      <a:endParaRPr lang="en-US" dirty="0"/>
+                    </a:p>
+                  </a:txBody>
+                  <a:tcPr/>
+                </a:tc>
+                <a:tc>
+                  <a:txBody>
+                    <a:bodyPr/>
+                    <a:lstStyle/>
+                    <a:p>
+                      <a:endParaRPr lang="en-US" dirty="0"/>
+                    </a:p>
+                  </a:txBody>
+                  <a:tcPr/>
+                </a:tc>
+                <a:tc>
+                  <a:txBody>
+                    <a:bodyPr/>
+                    <a:lstStyle/>
+                    <a:p>
+                      <a:r>
+                        <a:rPr lang="en-US" dirty="0" smtClean="0"/>
+                        <a:t>39</a:t>
+                      </a:r>
+                      <a:endParaRPr lang="en-US" dirty="0"/>
+                    </a:p>
+                  </a:txBody>
+                  <a:tcPr/>
+                </a:tc>
+                <a:tc>
+                  <a:txBody>
+                    <a:bodyPr/>
+                    <a:lstStyle/>
+                    <a:p>
+                      <a:endParaRPr lang="en-US"/>
+                    </a:p>
+                  </a:txBody>
+                  <a:tcPr/>
+                </a:tc>
+              </a:tr>
+              <a:tr h="370840">
+                <a:tc>
+                  <a:txBody>
+                    <a:bodyPr/>
+                    <a:lstStyle/>
+                    <a:p>
+                      <a:r>
+                        <a:rPr lang="en-US" dirty="0" smtClean="0"/>
+                        <a:t>14</a:t>
+                      </a:r>
+                      <a:r>
+                        <a:rPr lang="en-US" dirty="0" smtClean="0"/>
+                        <a:t>(64QAM, 3/4)</a:t>
+                      </a:r>
+                      <a:endParaRPr lang="en-US" dirty="0"/>
+                    </a:p>
+                  </a:txBody>
+                  <a:tcPr/>
+                </a:tc>
+                <a:tc>
+                  <a:txBody>
+                    <a:bodyPr/>
+                    <a:lstStyle/>
+                    <a:p>
+                      <a:endParaRPr lang="en-US" dirty="0"/>
+                    </a:p>
+                  </a:txBody>
+                  <a:tcPr/>
+                </a:tc>
+                <a:tc>
+                  <a:txBody>
+                    <a:bodyPr/>
+                    <a:lstStyle/>
+                    <a:p>
+                      <a:r>
+                        <a:rPr lang="en-US" dirty="0" smtClean="0"/>
+                        <a:t>39</a:t>
+                      </a:r>
+                      <a:endParaRPr lang="en-US" dirty="0"/>
+                    </a:p>
+                  </a:txBody>
+                  <a:tcPr/>
+                </a:tc>
+                <a:tc>
+                  <a:txBody>
+                    <a:bodyPr/>
+                    <a:lstStyle/>
+                    <a:p>
+                      <a:endParaRPr lang="en-US" dirty="0"/>
+                    </a:p>
+                  </a:txBody>
+                  <a:tcPr/>
+                </a:tc>
+              </a:tr>
+            </a:tbl>
+          </a:graphicData>
+        </a:graphic>
+      </p:graphicFrame>
+      <p:cxnSp>
+        <p:nvCxnSpPr>
+          <p:cNvPr id="54" name="Elbow Connector 53"/>
+          <p:cNvCxnSpPr>
+            <a:stCxn id="8" idx="3"/>
+            <a:endCxn id="50" idx="1"/>
+          </p:cNvCxnSpPr>
+          <p:nvPr/>
+        </p:nvCxnSpPr>
+        <p:spPr>
+          <a:xfrm>
+            <a:off x="1149600" y="2285879"/>
+            <a:ext cx="831600" cy="305938"/>
+          </a:xfrm>
+          <a:prstGeom prst="bentConnector3">
+            <a:avLst/>
+          </a:prstGeom>
+          <a:ln>
+            <a:tailEnd type="arrow"/>
+          </a:ln>
+        </p:spPr>
+        <p:style>
+          <a:lnRef idx="1">
+            <a:schemeClr val="accent1"/>
+          </a:lnRef>
+          <a:fillRef idx="0">
+            <a:schemeClr val="accent1"/>
+          </a:fillRef>
+          <a:effectRef idx="0">
+            <a:schemeClr val="accent1"/>
+          </a:effectRef>
+          <a:fontRef idx="minor">
+            <a:schemeClr val="tx1"/>
+          </a:fontRef>
+        </p:style>
+      </p:cxnSp>
+      <p:cxnSp>
+        <p:nvCxnSpPr>
+          <p:cNvPr id="58" name="Straight Arrow Connector 57"/>
+          <p:cNvCxnSpPr>
+            <a:stCxn id="31" idx="3"/>
+            <a:endCxn id="36" idx="1"/>
+          </p:cNvCxnSpPr>
+          <p:nvPr/>
+        </p:nvCxnSpPr>
+        <p:spPr>
+          <a:xfrm>
+            <a:off x="2590800" y="2008800"/>
+            <a:ext cx="304800" cy="0"/>
+          </a:xfrm>
+          <a:prstGeom prst="straightConnector1">
+            <a:avLst/>
+          </a:prstGeom>
+          <a:ln>
+            <a:tailEnd type="arrow"/>
+          </a:ln>
+        </p:spPr>
+        <p:style>
+          <a:lnRef idx="1">
+            <a:schemeClr val="accent1"/>
+          </a:lnRef>
+          <a:fillRef idx="0">
+            <a:schemeClr val="accent1"/>
+          </a:fillRef>
+          <a:effectRef idx="0">
+            <a:schemeClr val="accent1"/>
+          </a:effectRef>
+          <a:fontRef idx="minor">
+            <a:schemeClr val="tx1"/>
+          </a:fontRef>
+        </p:style>
+      </p:cxnSp>
+      <p:cxnSp>
+        <p:nvCxnSpPr>
+          <p:cNvPr id="60" name="Straight Arrow Connector 59"/>
+          <p:cNvCxnSpPr>
+            <a:stCxn id="50" idx="3"/>
+            <a:endCxn id="37" idx="1"/>
+          </p:cNvCxnSpPr>
+          <p:nvPr/>
+        </p:nvCxnSpPr>
+        <p:spPr>
+          <a:xfrm>
+            <a:off x="2590800" y="2591817"/>
+            <a:ext cx="304800" cy="7064"/>
+          </a:xfrm>
+          <a:prstGeom prst="straightConnector1">
+            <a:avLst/>
+          </a:prstGeom>
+          <a:ln>
+            <a:tailEnd type="arrow"/>
+          </a:ln>
+        </p:spPr>
+        <p:style>
+          <a:lnRef idx="1">
+            <a:schemeClr val="accent1"/>
+          </a:lnRef>
+          <a:fillRef idx="0">
+            <a:schemeClr val="accent1"/>
+          </a:fillRef>
+          <a:effectRef idx="0">
+            <a:schemeClr val="accent1"/>
+          </a:effectRef>
+          <a:fontRef idx="minor">
+            <a:schemeClr val="tx1"/>
+          </a:fontRef>
+        </p:style>
+      </p:cxnSp>
+    </p:spTree>
+    <p:extLst>
+      <p:ext uri="{BB962C8B-B14F-4D97-AF65-F5344CB8AC3E}">
+        <p14:creationId xmlns:p14="http://schemas.microsoft.com/office/powerpoint/2010/main" val="738917439"/>
+      </p:ext>
+    </p:extLst>
+  </p:cSld>
+  <p:clrMapOvr>
+    <a:masterClrMapping/>
+  </p:clrMapOvr>
+</p:sld>
+</file>
+
+<file path=ppt/slides/slide29.xml><?xml version="1.0" encoding="utf-8"?>
+<p:sld xmlns:a="http://schemas.openxmlformats.org/drawingml/2006/main" xmlns:r="http://schemas.openxmlformats.org/officeDocument/2006/relationships" xmlns:p="http://schemas.openxmlformats.org/presentationml/2006/main">
+  <p:cSld>
+    <p:spTree>
+      <p:nvGrpSpPr>
+        <p:cNvPr id="1" name=""/>
+        <p:cNvGrpSpPr/>
+        <p:nvPr/>
+      </p:nvGrpSpPr>
+      <p:grpSpPr>
+        <a:xfrm>
+          <a:off x="0" y="0"/>
+          <a:ext cx="0" cy="0"/>
+          <a:chOff x="0" y="0"/>
+          <a:chExt cx="0" cy="0"/>
+        </a:xfrm>
+      </p:grpSpPr>
+      <p:sp>
+        <p:nvSpPr>
+          <p:cNvPr id="2" name="Title 1"/>
+          <p:cNvSpPr>
+            <a:spLocks noGrp="1"/>
+          </p:cNvSpPr>
+          <p:nvPr>
+            <p:ph type="title"/>
+          </p:nvPr>
+        </p:nvSpPr>
+        <p:spPr/>
+        <p:txBody>
+          <a:bodyPr/>
+          <a:lstStyle/>
+          <a:p>
+            <a:endParaRPr lang="en-US"/>
+          </a:p>
+        </p:txBody>
+      </p:sp>
+      <p:grpSp>
+        <p:nvGrpSpPr>
+          <p:cNvPr id="4" name="Group 3"/>
+          <p:cNvGrpSpPr/>
+          <p:nvPr/>
+        </p:nvGrpSpPr>
+        <p:grpSpPr>
+          <a:xfrm>
+            <a:off x="609600" y="1828800"/>
+            <a:ext cx="7391400" cy="950081"/>
+            <a:chOff x="609600" y="4142619"/>
+            <a:chExt cx="7391400" cy="950081"/>
+          </a:xfrm>
+        </p:grpSpPr>
+        <p:sp>
+          <p:nvSpPr>
+            <p:cNvPr id="5" name="Rectangle 4"/>
+            <p:cNvSpPr/>
+            <p:nvPr/>
+          </p:nvSpPr>
+          <p:spPr>
+            <a:xfrm>
+              <a:off x="6657600" y="4142619"/>
+              <a:ext cx="540000" cy="360000"/>
+            </a:xfrm>
+            <a:prstGeom prst="rect">
+              <a:avLst/>
+            </a:prstGeom>
+          </p:spPr>
+          <p:style>
+            <a:lnRef idx="2">
+              <a:schemeClr val="accent1">
+                <a:shade val="50000"/>
+              </a:schemeClr>
+            </a:lnRef>
+            <a:fillRef idx="1">
+              <a:schemeClr val="accent1"/>
+            </a:fillRef>
+            <a:effectRef idx="0">
+              <a:schemeClr val="accent1"/>
+            </a:effectRef>
+            <a:fontRef idx="minor">
+              <a:schemeClr val="lt1"/>
+            </a:fontRef>
+          </p:style>
+          <p:txBody>
+            <a:bodyPr rtlCol="0" anchor="ctr"/>
+            <a:lstStyle/>
+            <a:p>
+              <a:pPr algn="ctr"/>
+              <a:r>
+                <a:rPr lang="en-US" sz="900" dirty="0" smtClean="0"/>
+                <a:t>CP</a:t>
+              </a:r>
+              <a:endParaRPr lang="en-US" sz="900" dirty="0"/>
+            </a:p>
+          </p:txBody>
+        </p:sp>
+        <p:sp>
+          <p:nvSpPr>
+            <p:cNvPr id="6" name="Rectangle 5"/>
+            <p:cNvSpPr/>
+            <p:nvPr/>
+          </p:nvSpPr>
+          <p:spPr>
+            <a:xfrm>
+              <a:off x="6657600" y="4725636"/>
+              <a:ext cx="540000" cy="360000"/>
+            </a:xfrm>
+            <a:prstGeom prst="rect">
+              <a:avLst/>
+            </a:prstGeom>
+          </p:spPr>
+          <p:style>
+            <a:lnRef idx="2">
+              <a:schemeClr val="accent1">
+                <a:shade val="50000"/>
+              </a:schemeClr>
+            </a:lnRef>
+            <a:fillRef idx="1">
+              <a:schemeClr val="accent1"/>
+            </a:fillRef>
+            <a:effectRef idx="0">
+              <a:schemeClr val="accent1"/>
+            </a:effectRef>
+            <a:fontRef idx="minor">
+              <a:schemeClr val="lt1"/>
+            </a:fontRef>
+          </p:style>
+          <p:txBody>
+            <a:bodyPr rtlCol="0" anchor="ctr"/>
+            <a:lstStyle/>
+            <a:p>
+              <a:pPr algn="ctr"/>
+              <a:r>
+                <a:rPr lang="en-US" sz="900" dirty="0" smtClean="0"/>
+                <a:t>CSD</a:t>
+              </a:r>
+              <a:endParaRPr lang="en-US" sz="900" dirty="0"/>
+            </a:p>
+          </p:txBody>
+        </p:sp>
+        <p:sp>
+          <p:nvSpPr>
+            <p:cNvPr id="7" name="Rectangle 6"/>
+            <p:cNvSpPr/>
+            <p:nvPr/>
+          </p:nvSpPr>
+          <p:spPr>
+            <a:xfrm>
+              <a:off x="7461000" y="4725636"/>
+              <a:ext cx="540000" cy="360000"/>
+            </a:xfrm>
+            <a:prstGeom prst="rect">
+              <a:avLst/>
+            </a:prstGeom>
+          </p:spPr>
+          <p:style>
+            <a:lnRef idx="2">
+              <a:schemeClr val="accent1">
+                <a:shade val="50000"/>
+              </a:schemeClr>
+            </a:lnRef>
+            <a:fillRef idx="1">
+              <a:schemeClr val="accent1"/>
+            </a:fillRef>
+            <a:effectRef idx="0">
+              <a:schemeClr val="accent1"/>
+            </a:effectRef>
+            <a:fontRef idx="minor">
+              <a:schemeClr val="lt1"/>
+            </a:fontRef>
+          </p:style>
+          <p:txBody>
+            <a:bodyPr rtlCol="0" anchor="ctr"/>
+            <a:lstStyle/>
+            <a:p>
+              <a:pPr algn="ctr"/>
+              <a:r>
+                <a:rPr lang="en-US" sz="900" dirty="0" smtClean="0"/>
+                <a:t>CP</a:t>
+              </a:r>
+              <a:endParaRPr lang="en-US" sz="900" dirty="0"/>
+            </a:p>
+          </p:txBody>
+        </p:sp>
+        <p:sp>
+          <p:nvSpPr>
+            <p:cNvPr id="8" name="Rectangle 7"/>
+            <p:cNvSpPr/>
+            <p:nvPr/>
+          </p:nvSpPr>
+          <p:spPr>
+            <a:xfrm>
+              <a:off x="609600" y="4419698"/>
+              <a:ext cx="540000" cy="360000"/>
+            </a:xfrm>
+            <a:prstGeom prst="rect">
+              <a:avLst/>
+            </a:prstGeom>
+          </p:spPr>
+          <p:style>
+            <a:lnRef idx="2">
+              <a:schemeClr val="accent1">
+                <a:shade val="50000"/>
+              </a:schemeClr>
+            </a:lnRef>
+            <a:fillRef idx="1">
+              <a:schemeClr val="accent1"/>
+            </a:fillRef>
+            <a:effectRef idx="0">
+              <a:schemeClr val="accent1"/>
+            </a:effectRef>
+            <a:fontRef idx="minor">
+              <a:schemeClr val="lt1"/>
+            </a:fontRef>
+          </p:style>
+          <p:txBody>
+            <a:bodyPr rtlCol="0" anchor="ctr"/>
+            <a:lstStyle/>
+            <a:p>
+              <a:pPr algn="ctr"/>
+              <a:r>
+                <a:rPr lang="en-US" sz="900" dirty="0" smtClean="0"/>
+                <a:t>HT_DATA</a:t>
+              </a:r>
+              <a:endParaRPr lang="en-US" sz="900" dirty="0"/>
+            </a:p>
+          </p:txBody>
+        </p:sp>
+        <p:sp>
+          <p:nvSpPr>
+            <p:cNvPr id="9" name="Rectangle 8"/>
+            <p:cNvSpPr/>
+            <p:nvPr/>
+          </p:nvSpPr>
+          <p:spPr>
+            <a:xfrm>
+              <a:off x="3670578" y="4142619"/>
+              <a:ext cx="540000" cy="360000"/>
+            </a:xfrm>
+            <a:prstGeom prst="rect">
+              <a:avLst/>
+            </a:prstGeom>
+          </p:spPr>
+          <p:style>
+            <a:lnRef idx="2">
+              <a:schemeClr val="accent1">
+                <a:shade val="50000"/>
+              </a:schemeClr>
+            </a:lnRef>
+            <a:fillRef idx="1">
+              <a:schemeClr val="accent1"/>
+            </a:fillRef>
+            <a:effectRef idx="0">
+              <a:schemeClr val="accent1"/>
+            </a:effectRef>
+            <a:fontRef idx="minor">
+              <a:schemeClr val="lt1"/>
+            </a:fontRef>
+          </p:style>
+          <p:txBody>
+            <a:bodyPr rtlCol="0" anchor="ctr"/>
+            <a:lstStyle/>
+            <a:p>
+              <a:pPr algn="ctr"/>
+              <a:r>
+                <a:rPr lang="en-US" sz="900" dirty="0" err="1" smtClean="0"/>
+                <a:t>interlv</a:t>
+              </a:r>
+              <a:endParaRPr lang="en-US" sz="900" dirty="0"/>
+            </a:p>
+          </p:txBody>
+        </p:sp>
+        <p:sp>
+          <p:nvSpPr>
+            <p:cNvPr id="10" name="Rectangle 9"/>
+            <p:cNvSpPr/>
+            <p:nvPr/>
+          </p:nvSpPr>
+          <p:spPr>
+            <a:xfrm>
+              <a:off x="4406150" y="4142619"/>
+              <a:ext cx="540000" cy="360000"/>
+            </a:xfrm>
+            <a:prstGeom prst="rect">
+              <a:avLst/>
+            </a:prstGeom>
+          </p:spPr>
+          <p:style>
+            <a:lnRef idx="2">
+              <a:schemeClr val="accent1">
+                <a:shade val="50000"/>
+              </a:schemeClr>
+            </a:lnRef>
+            <a:fillRef idx="1">
+              <a:schemeClr val="accent1"/>
+            </a:fillRef>
+            <a:effectRef idx="0">
+              <a:schemeClr val="accent1"/>
+            </a:effectRef>
+            <a:fontRef idx="minor">
+              <a:schemeClr val="lt1"/>
+            </a:fontRef>
+          </p:style>
+          <p:txBody>
+            <a:bodyPr rtlCol="0" anchor="ctr"/>
+            <a:lstStyle/>
+            <a:p>
+              <a:pPr algn="ctr"/>
+              <a:r>
+                <a:rPr lang="en-US" sz="900" dirty="0" smtClean="0"/>
+                <a:t>map</a:t>
+              </a:r>
+              <a:endParaRPr lang="en-US" sz="900" dirty="0"/>
+            </a:p>
+          </p:txBody>
+        </p:sp>
+        <p:sp>
+          <p:nvSpPr>
+            <p:cNvPr id="11" name="Rectangle 10"/>
+            <p:cNvSpPr/>
+            <p:nvPr/>
+          </p:nvSpPr>
+          <p:spPr>
+            <a:xfrm>
+              <a:off x="3670578" y="4725636"/>
+              <a:ext cx="540000" cy="360000"/>
+            </a:xfrm>
+            <a:prstGeom prst="rect">
+              <a:avLst/>
+            </a:prstGeom>
+          </p:spPr>
+          <p:style>
+            <a:lnRef idx="2">
+              <a:schemeClr val="accent1">
+                <a:shade val="50000"/>
+              </a:schemeClr>
+            </a:lnRef>
+            <a:fillRef idx="1">
+              <a:schemeClr val="accent1"/>
+            </a:fillRef>
+            <a:effectRef idx="0">
+              <a:schemeClr val="accent1"/>
+            </a:effectRef>
+            <a:fontRef idx="minor">
+              <a:schemeClr val="lt1"/>
+            </a:fontRef>
+          </p:style>
+          <p:txBody>
+            <a:bodyPr rtlCol="0" anchor="ctr"/>
+            <a:lstStyle/>
+            <a:p>
+              <a:pPr algn="ctr"/>
+              <a:r>
+                <a:rPr lang="en-US" sz="900" dirty="0" err="1" smtClean="0"/>
+                <a:t>interlv</a:t>
+              </a:r>
+              <a:endParaRPr lang="en-US" sz="900" dirty="0"/>
+            </a:p>
+          </p:txBody>
+        </p:sp>
+        <p:sp>
+          <p:nvSpPr>
+            <p:cNvPr id="12" name="Rectangle 11"/>
+            <p:cNvSpPr/>
+            <p:nvPr/>
+          </p:nvSpPr>
+          <p:spPr>
+            <a:xfrm>
+              <a:off x="4406150" y="4725636"/>
+              <a:ext cx="540000" cy="360000"/>
+            </a:xfrm>
+            <a:prstGeom prst="rect">
+              <a:avLst/>
+            </a:prstGeom>
+          </p:spPr>
+          <p:style>
+            <a:lnRef idx="2">
+              <a:schemeClr val="accent1">
+                <a:shade val="50000"/>
+              </a:schemeClr>
+            </a:lnRef>
+            <a:fillRef idx="1">
+              <a:schemeClr val="accent1"/>
+            </a:fillRef>
+            <a:effectRef idx="0">
+              <a:schemeClr val="accent1"/>
+            </a:effectRef>
+            <a:fontRef idx="minor">
+              <a:schemeClr val="lt1"/>
+            </a:fontRef>
+          </p:style>
+          <p:txBody>
+            <a:bodyPr rtlCol="0" anchor="ctr"/>
+            <a:lstStyle/>
+            <a:p>
+              <a:pPr algn="ctr"/>
+              <a:r>
+                <a:rPr lang="en-US" sz="900" dirty="0" smtClean="0"/>
+                <a:t>map</a:t>
+              </a:r>
+              <a:endParaRPr lang="en-US" sz="900" dirty="0"/>
+            </a:p>
+          </p:txBody>
+        </p:sp>
+        <p:sp>
+          <p:nvSpPr>
+            <p:cNvPr id="13" name="Rectangle 12"/>
+            <p:cNvSpPr/>
+            <p:nvPr/>
+          </p:nvSpPr>
+          <p:spPr>
+            <a:xfrm>
+              <a:off x="5911100" y="4152537"/>
+              <a:ext cx="540000" cy="360000"/>
+            </a:xfrm>
+            <a:prstGeom prst="rect">
+              <a:avLst/>
+            </a:prstGeom>
+          </p:spPr>
+          <p:style>
+            <a:lnRef idx="2">
+              <a:schemeClr val="accent1">
+                <a:shade val="50000"/>
+              </a:schemeClr>
+            </a:lnRef>
+            <a:fillRef idx="1">
+              <a:schemeClr val="accent1"/>
+            </a:fillRef>
+            <a:effectRef idx="0">
+              <a:schemeClr val="accent1"/>
+            </a:effectRef>
+            <a:fontRef idx="minor">
+              <a:schemeClr val="lt1"/>
+            </a:fontRef>
+          </p:style>
+          <p:txBody>
+            <a:bodyPr rtlCol="0" anchor="ctr"/>
+            <a:lstStyle/>
+            <a:p>
+              <a:pPr algn="ctr"/>
+              <a:r>
+                <a:rPr lang="en-US" sz="900" dirty="0" smtClean="0"/>
+                <a:t>IFFT</a:t>
+              </a:r>
+              <a:endParaRPr lang="en-US" sz="900" dirty="0"/>
+            </a:p>
+          </p:txBody>
+        </p:sp>
+        <p:sp>
+          <p:nvSpPr>
+            <p:cNvPr id="14" name="Rectangle 13"/>
+            <p:cNvSpPr/>
+            <p:nvPr/>
+          </p:nvSpPr>
+          <p:spPr>
+            <a:xfrm>
+              <a:off x="5911100" y="4725636"/>
+              <a:ext cx="540000" cy="360000"/>
+            </a:xfrm>
+            <a:prstGeom prst="rect">
+              <a:avLst/>
+            </a:prstGeom>
+          </p:spPr>
+          <p:style>
+            <a:lnRef idx="2">
+              <a:schemeClr val="accent1">
+                <a:shade val="50000"/>
+              </a:schemeClr>
+            </a:lnRef>
+            <a:fillRef idx="1">
+              <a:schemeClr val="accent1"/>
+            </a:fillRef>
+            <a:effectRef idx="0">
+              <a:schemeClr val="accent1"/>
+            </a:effectRef>
+            <a:fontRef idx="minor">
+              <a:schemeClr val="lt1"/>
+            </a:fontRef>
+          </p:style>
+          <p:txBody>
+            <a:bodyPr rtlCol="0" anchor="ctr"/>
+            <a:lstStyle/>
+            <a:p>
+              <a:pPr algn="ctr"/>
+              <a:r>
+                <a:rPr lang="en-US" sz="900" dirty="0" smtClean="0"/>
+                <a:t>IFFT</a:t>
+              </a:r>
+              <a:endParaRPr lang="en-US" sz="900" dirty="0"/>
+            </a:p>
+          </p:txBody>
+        </p:sp>
+        <p:sp>
+          <p:nvSpPr>
+            <p:cNvPr id="15" name="Rectangle 14"/>
+            <p:cNvSpPr/>
+            <p:nvPr/>
+          </p:nvSpPr>
+          <p:spPr>
+            <a:xfrm>
+              <a:off x="5152150" y="4142619"/>
+              <a:ext cx="540000" cy="360000"/>
+            </a:xfrm>
+            <a:prstGeom prst="rect">
+              <a:avLst/>
+            </a:prstGeom>
+          </p:spPr>
+          <p:style>
+            <a:lnRef idx="2">
+              <a:schemeClr val="accent1">
+                <a:shade val="50000"/>
+              </a:schemeClr>
+            </a:lnRef>
+            <a:fillRef idx="1">
+              <a:schemeClr val="accent1"/>
+            </a:fillRef>
+            <a:effectRef idx="0">
+              <a:schemeClr val="accent1"/>
+            </a:effectRef>
+            <a:fontRef idx="minor">
+              <a:schemeClr val="lt1"/>
+            </a:fontRef>
+          </p:style>
+          <p:txBody>
+            <a:bodyPr rtlCol="0" anchor="ctr"/>
+            <a:lstStyle/>
+            <a:p>
+              <a:pPr algn="ctr"/>
+              <a:r>
+                <a:rPr lang="en-US" sz="900" dirty="0" smtClean="0"/>
+                <a:t>Pilot</a:t>
+              </a:r>
+              <a:endParaRPr lang="en-US" sz="900" dirty="0"/>
+            </a:p>
+          </p:txBody>
+        </p:sp>
+        <p:sp>
+          <p:nvSpPr>
+            <p:cNvPr id="16" name="Rectangle 15"/>
+            <p:cNvSpPr/>
+            <p:nvPr/>
+          </p:nvSpPr>
+          <p:spPr>
+            <a:xfrm>
+              <a:off x="5152150" y="4725636"/>
+              <a:ext cx="540000" cy="360000"/>
+            </a:xfrm>
+            <a:prstGeom prst="rect">
+              <a:avLst/>
+            </a:prstGeom>
+          </p:spPr>
+          <p:style>
+            <a:lnRef idx="2">
+              <a:schemeClr val="accent1">
+                <a:shade val="50000"/>
+              </a:schemeClr>
+            </a:lnRef>
+            <a:fillRef idx="1">
+              <a:schemeClr val="accent1"/>
+            </a:fillRef>
+            <a:effectRef idx="0">
+              <a:schemeClr val="accent1"/>
+            </a:effectRef>
+            <a:fontRef idx="minor">
+              <a:schemeClr val="lt1"/>
+            </a:fontRef>
+          </p:style>
+          <p:txBody>
+            <a:bodyPr rtlCol="0" anchor="ctr"/>
+            <a:lstStyle/>
+            <a:p>
+              <a:pPr algn="ctr"/>
+              <a:r>
+                <a:rPr lang="en-US" sz="900" dirty="0" smtClean="0"/>
+                <a:t>Pilot</a:t>
+              </a:r>
+              <a:endParaRPr lang="en-US" sz="900" dirty="0"/>
+            </a:p>
+          </p:txBody>
+        </p:sp>
+        <p:cxnSp>
+          <p:nvCxnSpPr>
+            <p:cNvPr id="17" name="Straight Arrow Connector 16"/>
+            <p:cNvCxnSpPr>
+              <a:stCxn id="9" idx="3"/>
+              <a:endCxn id="10" idx="1"/>
+            </p:cNvCxnSpPr>
+            <p:nvPr/>
+          </p:nvCxnSpPr>
+          <p:spPr>
+            <a:xfrm>
+              <a:off x="4210578" y="4322619"/>
+              <a:ext cx="195572" cy="0"/>
+            </a:xfrm>
+            <a:prstGeom prst="straightConnector1">
+              <a:avLst/>
+            </a:prstGeom>
+            <a:ln>
+              <a:tailEnd type="arrow"/>
+            </a:ln>
+          </p:spPr>
+          <p:style>
+            <a:lnRef idx="1">
+              <a:schemeClr val="accent1"/>
+            </a:lnRef>
+            <a:fillRef idx="0">
+              <a:schemeClr val="accent1"/>
+            </a:fillRef>
+            <a:effectRef idx="0">
+              <a:schemeClr val="accent1"/>
+            </a:effectRef>
+            <a:fontRef idx="minor">
+              <a:schemeClr val="tx1"/>
+            </a:fontRef>
+          </p:style>
+        </p:cxnSp>
+        <p:cxnSp>
+          <p:nvCxnSpPr>
+            <p:cNvPr id="18" name="Straight Arrow Connector 17"/>
+            <p:cNvCxnSpPr>
+              <a:stCxn id="11" idx="3"/>
+              <a:endCxn id="12" idx="1"/>
+            </p:cNvCxnSpPr>
+            <p:nvPr/>
+          </p:nvCxnSpPr>
+          <p:spPr>
+            <a:xfrm>
+              <a:off x="4210578" y="4905636"/>
+              <a:ext cx="195572" cy="0"/>
+            </a:xfrm>
+            <a:prstGeom prst="straightConnector1">
+              <a:avLst/>
+            </a:prstGeom>
+            <a:ln>
+              <a:tailEnd type="arrow"/>
+            </a:ln>
+          </p:spPr>
+          <p:style>
+            <a:lnRef idx="1">
+              <a:schemeClr val="accent1"/>
+            </a:lnRef>
+            <a:fillRef idx="0">
+              <a:schemeClr val="accent1"/>
+            </a:fillRef>
+            <a:effectRef idx="0">
+              <a:schemeClr val="accent1"/>
+            </a:effectRef>
+            <a:fontRef idx="minor">
+              <a:schemeClr val="tx1"/>
+            </a:fontRef>
+          </p:style>
+        </p:cxnSp>
+        <p:cxnSp>
+          <p:nvCxnSpPr>
+            <p:cNvPr id="19" name="Straight Arrow Connector 18"/>
+            <p:cNvCxnSpPr>
+              <a:stCxn id="10" idx="3"/>
+              <a:endCxn id="15" idx="1"/>
+            </p:cNvCxnSpPr>
+            <p:nvPr/>
+          </p:nvCxnSpPr>
+          <p:spPr>
+            <a:xfrm>
+              <a:off x="4946150" y="4322619"/>
+              <a:ext cx="206000" cy="0"/>
+            </a:xfrm>
+            <a:prstGeom prst="straightConnector1">
+              <a:avLst/>
+            </a:prstGeom>
+            <a:ln>
+              <a:tailEnd type="arrow"/>
+            </a:ln>
+          </p:spPr>
+          <p:style>
+            <a:lnRef idx="1">
+              <a:schemeClr val="accent1"/>
+            </a:lnRef>
+            <a:fillRef idx="0">
+              <a:schemeClr val="accent1"/>
+            </a:fillRef>
+            <a:effectRef idx="0">
+              <a:schemeClr val="accent1"/>
+            </a:effectRef>
+            <a:fontRef idx="minor">
+              <a:schemeClr val="tx1"/>
+            </a:fontRef>
+          </p:style>
+        </p:cxnSp>
+        <p:cxnSp>
+          <p:nvCxnSpPr>
+            <p:cNvPr id="20" name="Straight Arrow Connector 19"/>
+            <p:cNvCxnSpPr>
+              <a:stCxn id="12" idx="3"/>
+              <a:endCxn id="16" idx="1"/>
+            </p:cNvCxnSpPr>
+            <p:nvPr/>
+          </p:nvCxnSpPr>
+          <p:spPr>
+            <a:xfrm>
+              <a:off x="4946150" y="4905636"/>
+              <a:ext cx="206000" cy="0"/>
+            </a:xfrm>
+            <a:prstGeom prst="straightConnector1">
+              <a:avLst/>
+            </a:prstGeom>
+            <a:ln>
+              <a:tailEnd type="arrow"/>
+            </a:ln>
+          </p:spPr>
+          <p:style>
+            <a:lnRef idx="1">
+              <a:schemeClr val="accent1"/>
+            </a:lnRef>
+            <a:fillRef idx="0">
+              <a:schemeClr val="accent1"/>
+            </a:fillRef>
+            <a:effectRef idx="0">
+              <a:schemeClr val="accent1"/>
+            </a:effectRef>
+            <a:fontRef idx="minor">
+              <a:schemeClr val="tx1"/>
+            </a:fontRef>
+          </p:style>
+        </p:cxnSp>
+        <p:cxnSp>
+          <p:nvCxnSpPr>
+            <p:cNvPr id="21" name="Straight Arrow Connector 20"/>
+            <p:cNvCxnSpPr>
+              <a:stCxn id="15" idx="3"/>
+              <a:endCxn id="13" idx="1"/>
+            </p:cNvCxnSpPr>
+            <p:nvPr/>
+          </p:nvCxnSpPr>
+          <p:spPr>
+            <a:xfrm>
+              <a:off x="5692150" y="4322619"/>
+              <a:ext cx="218950" cy="9918"/>
+            </a:xfrm>
+            <a:prstGeom prst="straightConnector1">
+              <a:avLst/>
+            </a:prstGeom>
+            <a:ln>
+              <a:tailEnd type="arrow"/>
+            </a:ln>
+          </p:spPr>
+          <p:style>
+            <a:lnRef idx="1">
+              <a:schemeClr val="accent1"/>
+            </a:lnRef>
+            <a:fillRef idx="0">
+              <a:schemeClr val="accent1"/>
+            </a:fillRef>
+            <a:effectRef idx="0">
+              <a:schemeClr val="accent1"/>
+            </a:effectRef>
+            <a:fontRef idx="minor">
+              <a:schemeClr val="tx1"/>
+            </a:fontRef>
+          </p:style>
+        </p:cxnSp>
+        <p:cxnSp>
+          <p:nvCxnSpPr>
+            <p:cNvPr id="22" name="Straight Arrow Connector 21"/>
+            <p:cNvCxnSpPr>
+              <a:stCxn id="16" idx="3"/>
+              <a:endCxn id="14" idx="1"/>
+            </p:cNvCxnSpPr>
+            <p:nvPr/>
+          </p:nvCxnSpPr>
+          <p:spPr>
+            <a:xfrm>
+              <a:off x="5692150" y="4905636"/>
+              <a:ext cx="218950" cy="0"/>
+            </a:xfrm>
+            <a:prstGeom prst="straightConnector1">
+              <a:avLst/>
+            </a:prstGeom>
+            <a:ln>
+              <a:tailEnd type="arrow"/>
+            </a:ln>
+          </p:spPr>
+          <p:style>
+            <a:lnRef idx="1">
+              <a:schemeClr val="accent1"/>
+            </a:lnRef>
+            <a:fillRef idx="0">
+              <a:schemeClr val="accent1"/>
+            </a:fillRef>
+            <a:effectRef idx="0">
+              <a:schemeClr val="accent1"/>
+            </a:effectRef>
+            <a:fontRef idx="minor">
+              <a:schemeClr val="tx1"/>
+            </a:fontRef>
+          </p:style>
+        </p:cxnSp>
+        <p:cxnSp>
+          <p:nvCxnSpPr>
+            <p:cNvPr id="23" name="Straight Arrow Connector 22"/>
+            <p:cNvCxnSpPr>
+              <a:stCxn id="14" idx="3"/>
+              <a:endCxn id="6" idx="1"/>
+            </p:cNvCxnSpPr>
+            <p:nvPr/>
+          </p:nvCxnSpPr>
+          <p:spPr>
+            <a:xfrm>
+              <a:off x="6451100" y="4905636"/>
+              <a:ext cx="206500" cy="0"/>
+            </a:xfrm>
+            <a:prstGeom prst="straightConnector1">
+              <a:avLst/>
+            </a:prstGeom>
+            <a:ln>
+              <a:tailEnd type="arrow"/>
+            </a:ln>
+          </p:spPr>
+          <p:style>
+            <a:lnRef idx="1">
+              <a:schemeClr val="accent1"/>
+            </a:lnRef>
+            <a:fillRef idx="0">
+              <a:schemeClr val="accent1"/>
+            </a:fillRef>
+            <a:effectRef idx="0">
+              <a:schemeClr val="accent1"/>
+            </a:effectRef>
+            <a:fontRef idx="minor">
+              <a:schemeClr val="tx1"/>
+            </a:fontRef>
+          </p:style>
+        </p:cxnSp>
+        <p:cxnSp>
+          <p:nvCxnSpPr>
+            <p:cNvPr id="24" name="Straight Arrow Connector 23"/>
+            <p:cNvCxnSpPr>
+              <a:stCxn id="13" idx="3"/>
+              <a:endCxn id="5" idx="1"/>
+            </p:cNvCxnSpPr>
+            <p:nvPr/>
+          </p:nvCxnSpPr>
+          <p:spPr>
+            <a:xfrm flipV="1">
+              <a:off x="6451100" y="4322619"/>
+              <a:ext cx="206500" cy="9918"/>
+            </a:xfrm>
+            <a:prstGeom prst="straightConnector1">
+              <a:avLst/>
+            </a:prstGeom>
+            <a:ln>
+              <a:tailEnd type="arrow"/>
+            </a:ln>
+          </p:spPr>
+          <p:style>
+            <a:lnRef idx="1">
+              <a:schemeClr val="accent1"/>
+            </a:lnRef>
+            <a:fillRef idx="0">
+              <a:schemeClr val="accent1"/>
+            </a:fillRef>
+            <a:effectRef idx="0">
+              <a:schemeClr val="accent1"/>
+            </a:effectRef>
+            <a:fontRef idx="minor">
+              <a:schemeClr val="tx1"/>
+            </a:fontRef>
+          </p:style>
+        </p:cxnSp>
+        <p:cxnSp>
+          <p:nvCxnSpPr>
+            <p:cNvPr id="25" name="Straight Arrow Connector 24"/>
+            <p:cNvCxnSpPr>
+              <a:stCxn id="6" idx="3"/>
+              <a:endCxn id="7" idx="1"/>
+            </p:cNvCxnSpPr>
+            <p:nvPr/>
+          </p:nvCxnSpPr>
+          <p:spPr>
+            <a:xfrm>
+              <a:off x="7197600" y="4905636"/>
+              <a:ext cx="263400" cy="0"/>
+            </a:xfrm>
+            <a:prstGeom prst="straightConnector1">
+              <a:avLst/>
+            </a:prstGeom>
+            <a:ln>
+              <a:tailEnd type="arrow"/>
+            </a:ln>
+          </p:spPr>
+          <p:style>
+            <a:lnRef idx="1">
+              <a:schemeClr val="accent1"/>
+            </a:lnRef>
+            <a:fillRef idx="0">
+              <a:schemeClr val="accent1"/>
+            </a:fillRef>
+            <a:effectRef idx="0">
+              <a:schemeClr val="accent1"/>
+            </a:effectRef>
+            <a:fontRef idx="minor">
+              <a:schemeClr val="tx1"/>
+            </a:fontRef>
+          </p:style>
+        </p:cxnSp>
+        <p:sp>
+          <p:nvSpPr>
+            <p:cNvPr id="26" name="Rectangle 25"/>
+            <p:cNvSpPr/>
+            <p:nvPr/>
+          </p:nvSpPr>
+          <p:spPr>
+            <a:xfrm>
+              <a:off x="1981200" y="4142619"/>
+              <a:ext cx="609600" cy="360000"/>
+            </a:xfrm>
+            <a:prstGeom prst="rect">
+              <a:avLst/>
+            </a:prstGeom>
+          </p:spPr>
+          <p:style>
+            <a:lnRef idx="2">
+              <a:schemeClr val="accent1">
+                <a:shade val="50000"/>
+              </a:schemeClr>
+            </a:lnRef>
+            <a:fillRef idx="1">
+              <a:schemeClr val="accent1"/>
+            </a:fillRef>
+            <a:effectRef idx="0">
+              <a:schemeClr val="accent1"/>
+            </a:effectRef>
+            <a:fontRef idx="minor">
+              <a:schemeClr val="lt1"/>
+            </a:fontRef>
+          </p:style>
+          <p:txBody>
+            <a:bodyPr rtlCol="0" anchor="ctr"/>
+            <a:lstStyle/>
+            <a:p>
+              <a:pPr algn="ctr"/>
+              <a:r>
+                <a:rPr lang="en-US" sz="900" dirty="0" smtClean="0"/>
+                <a:t>scramble</a:t>
+              </a:r>
+              <a:endParaRPr lang="en-US" sz="900" dirty="0"/>
+            </a:p>
+          </p:txBody>
+        </p:sp>
+        <p:cxnSp>
+          <p:nvCxnSpPr>
+            <p:cNvPr id="27" name="Elbow Connector 26"/>
+            <p:cNvCxnSpPr>
+              <a:stCxn id="8" idx="3"/>
+              <a:endCxn id="26" idx="1"/>
+            </p:cNvCxnSpPr>
+            <p:nvPr/>
+          </p:nvCxnSpPr>
+          <p:spPr>
+            <a:xfrm flipV="1">
+              <a:off x="1149600" y="4322619"/>
+              <a:ext cx="831600" cy="277079"/>
+            </a:xfrm>
+            <a:prstGeom prst="bentConnector3">
+              <a:avLst/>
+            </a:prstGeom>
+            <a:ln>
+              <a:tailEnd type="arrow"/>
+            </a:ln>
+          </p:spPr>
+          <p:style>
+            <a:lnRef idx="1">
+              <a:schemeClr val="accent1"/>
+            </a:lnRef>
+            <a:fillRef idx="0">
+              <a:schemeClr val="accent1"/>
+            </a:fillRef>
+            <a:effectRef idx="0">
+              <a:schemeClr val="accent1"/>
+            </a:effectRef>
+            <a:fontRef idx="minor">
+              <a:schemeClr val="tx1"/>
+            </a:fontRef>
+          </p:style>
+        </p:cxnSp>
+        <p:sp>
+          <p:nvSpPr>
+            <p:cNvPr id="28" name="Rectangle 27"/>
+            <p:cNvSpPr/>
+            <p:nvPr/>
+          </p:nvSpPr>
+          <p:spPr>
+            <a:xfrm>
+              <a:off x="2895600" y="4142619"/>
+              <a:ext cx="540000" cy="360000"/>
+            </a:xfrm>
+            <a:prstGeom prst="rect">
+              <a:avLst/>
+            </a:prstGeom>
+          </p:spPr>
+          <p:style>
+            <a:lnRef idx="2">
+              <a:schemeClr val="accent1">
+                <a:shade val="50000"/>
+              </a:schemeClr>
+            </a:lnRef>
+            <a:fillRef idx="1">
+              <a:schemeClr val="accent1"/>
+            </a:fillRef>
+            <a:effectRef idx="0">
+              <a:schemeClr val="accent1"/>
+            </a:effectRef>
+            <a:fontRef idx="minor">
+              <a:schemeClr val="lt1"/>
+            </a:fontRef>
+          </p:style>
+          <p:txBody>
+            <a:bodyPr rtlCol="0" anchor="ctr"/>
+            <a:lstStyle/>
+            <a:p>
+              <a:pPr algn="ctr"/>
+              <a:r>
+                <a:rPr lang="en-US" sz="900" dirty="0" err="1" smtClean="0"/>
+                <a:t>conv</a:t>
+              </a:r>
+              <a:endParaRPr lang="en-US" sz="900" dirty="0"/>
+            </a:p>
+          </p:txBody>
+        </p:sp>
+        <p:sp>
+          <p:nvSpPr>
+            <p:cNvPr id="29" name="Rectangle 28"/>
+            <p:cNvSpPr/>
+            <p:nvPr/>
+          </p:nvSpPr>
+          <p:spPr>
+            <a:xfrm>
+              <a:off x="2895600" y="4732700"/>
+              <a:ext cx="540000" cy="360000"/>
+            </a:xfrm>
+            <a:prstGeom prst="rect">
+              <a:avLst/>
+            </a:prstGeom>
+          </p:spPr>
+          <p:style>
+            <a:lnRef idx="2">
+              <a:schemeClr val="accent1">
+                <a:shade val="50000"/>
+              </a:schemeClr>
+            </a:lnRef>
+            <a:fillRef idx="1">
+              <a:schemeClr val="accent1"/>
+            </a:fillRef>
+            <a:effectRef idx="0">
+              <a:schemeClr val="accent1"/>
+            </a:effectRef>
+            <a:fontRef idx="minor">
+              <a:schemeClr val="lt1"/>
+            </a:fontRef>
+          </p:style>
+          <p:txBody>
+            <a:bodyPr rtlCol="0" anchor="ctr"/>
+            <a:lstStyle/>
+            <a:p>
+              <a:pPr algn="ctr"/>
+              <a:r>
+                <a:rPr lang="en-US" sz="900" dirty="0" err="1" smtClean="0"/>
+                <a:t>conv</a:t>
+              </a:r>
+              <a:endParaRPr lang="en-US" sz="900" dirty="0"/>
+            </a:p>
+          </p:txBody>
+        </p:sp>
+        <p:cxnSp>
+          <p:nvCxnSpPr>
+            <p:cNvPr id="30" name="Straight Arrow Connector 29"/>
+            <p:cNvCxnSpPr>
+              <a:stCxn id="28" idx="3"/>
+              <a:endCxn id="9" idx="1"/>
+            </p:cNvCxnSpPr>
+            <p:nvPr/>
+          </p:nvCxnSpPr>
+          <p:spPr>
+            <a:xfrm>
+              <a:off x="3435600" y="4322619"/>
+              <a:ext cx="234978" cy="0"/>
+            </a:xfrm>
+            <a:prstGeom prst="straightConnector1">
+              <a:avLst/>
+            </a:prstGeom>
+            <a:ln>
+              <a:tailEnd type="arrow"/>
+            </a:ln>
+          </p:spPr>
+          <p:style>
+            <a:lnRef idx="1">
+              <a:schemeClr val="accent1"/>
+            </a:lnRef>
+            <a:fillRef idx="0">
+              <a:schemeClr val="accent1"/>
+            </a:fillRef>
+            <a:effectRef idx="0">
+              <a:schemeClr val="accent1"/>
+            </a:effectRef>
+            <a:fontRef idx="minor">
+              <a:schemeClr val="tx1"/>
+            </a:fontRef>
+          </p:style>
+        </p:cxnSp>
+        <p:cxnSp>
+          <p:nvCxnSpPr>
+            <p:cNvPr id="31" name="Straight Arrow Connector 30"/>
+            <p:cNvCxnSpPr>
+              <a:stCxn id="29" idx="3"/>
+              <a:endCxn id="11" idx="1"/>
+            </p:cNvCxnSpPr>
+            <p:nvPr/>
+          </p:nvCxnSpPr>
+          <p:spPr>
+            <a:xfrm flipV="1">
+              <a:off x="3435600" y="4905636"/>
+              <a:ext cx="234978" cy="7064"/>
+            </a:xfrm>
+            <a:prstGeom prst="straightConnector1">
+              <a:avLst/>
+            </a:prstGeom>
+            <a:ln>
+              <a:tailEnd type="arrow"/>
+            </a:ln>
+          </p:spPr>
+          <p:style>
+            <a:lnRef idx="1">
+              <a:schemeClr val="accent1"/>
+            </a:lnRef>
+            <a:fillRef idx="0">
+              <a:schemeClr val="accent1"/>
+            </a:fillRef>
+            <a:effectRef idx="0">
+              <a:schemeClr val="accent1"/>
+            </a:effectRef>
+            <a:fontRef idx="minor">
+              <a:schemeClr val="tx1"/>
+            </a:fontRef>
+          </p:style>
+        </p:cxnSp>
+        <p:sp>
+          <p:nvSpPr>
+            <p:cNvPr id="32" name="Rectangle 31"/>
+            <p:cNvSpPr/>
+            <p:nvPr/>
+          </p:nvSpPr>
+          <p:spPr>
+            <a:xfrm>
+              <a:off x="1981200" y="4725636"/>
+              <a:ext cx="609600" cy="360000"/>
+            </a:xfrm>
+            <a:prstGeom prst="rect">
+              <a:avLst/>
+            </a:prstGeom>
+          </p:spPr>
+          <p:style>
+            <a:lnRef idx="2">
+              <a:schemeClr val="accent1">
+                <a:shade val="50000"/>
+              </a:schemeClr>
+            </a:lnRef>
+            <a:fillRef idx="1">
+              <a:schemeClr val="accent1"/>
+            </a:fillRef>
+            <a:effectRef idx="0">
+              <a:schemeClr val="accent1"/>
+            </a:effectRef>
+            <a:fontRef idx="minor">
+              <a:schemeClr val="lt1"/>
+            </a:fontRef>
+          </p:style>
+          <p:txBody>
+            <a:bodyPr rtlCol="0" anchor="ctr"/>
+            <a:lstStyle/>
+            <a:p>
+              <a:pPr algn="ctr"/>
+              <a:r>
+                <a:rPr lang="en-US" sz="900" dirty="0" smtClean="0"/>
+                <a:t>scramble</a:t>
+              </a:r>
+              <a:endParaRPr lang="en-US" sz="900" dirty="0"/>
+            </a:p>
+          </p:txBody>
+        </p:sp>
+      </p:grpSp>
+      <p:cxnSp>
+        <p:nvCxnSpPr>
+          <p:cNvPr id="33" name="Elbow Connector 32"/>
+          <p:cNvCxnSpPr>
+            <a:stCxn id="8" idx="3"/>
+            <a:endCxn id="32" idx="1"/>
+          </p:cNvCxnSpPr>
+          <p:nvPr/>
+        </p:nvCxnSpPr>
+        <p:spPr>
+          <a:xfrm>
+            <a:off x="1149600" y="2285879"/>
+            <a:ext cx="831600" cy="305938"/>
+          </a:xfrm>
+          <a:prstGeom prst="bentConnector3">
+            <a:avLst/>
+          </a:prstGeom>
+          <a:ln>
+            <a:tailEnd type="arrow"/>
+          </a:ln>
+        </p:spPr>
+        <p:style>
+          <a:lnRef idx="1">
+            <a:schemeClr val="accent1"/>
+          </a:lnRef>
+          <a:fillRef idx="0">
+            <a:schemeClr val="accent1"/>
+          </a:fillRef>
+          <a:effectRef idx="0">
+            <a:schemeClr val="accent1"/>
+          </a:effectRef>
+          <a:fontRef idx="minor">
+            <a:schemeClr val="tx1"/>
+          </a:fontRef>
+        </p:style>
+      </p:cxnSp>
+      <p:cxnSp>
+        <p:nvCxnSpPr>
+          <p:cNvPr id="34" name="Straight Arrow Connector 33"/>
+          <p:cNvCxnSpPr>
+            <a:stCxn id="26" idx="3"/>
+            <a:endCxn id="28" idx="1"/>
+          </p:cNvCxnSpPr>
+          <p:nvPr/>
+        </p:nvCxnSpPr>
+        <p:spPr>
+          <a:xfrm>
+            <a:off x="2590800" y="2008800"/>
+            <a:ext cx="304800" cy="0"/>
+          </a:xfrm>
+          <a:prstGeom prst="straightConnector1">
+            <a:avLst/>
+          </a:prstGeom>
+          <a:ln>
+            <a:tailEnd type="arrow"/>
+          </a:ln>
+        </p:spPr>
+        <p:style>
+          <a:lnRef idx="1">
+            <a:schemeClr val="accent1"/>
+          </a:lnRef>
+          <a:fillRef idx="0">
+            <a:schemeClr val="accent1"/>
+          </a:fillRef>
+          <a:effectRef idx="0">
+            <a:schemeClr val="accent1"/>
+          </a:effectRef>
+          <a:fontRef idx="minor">
+            <a:schemeClr val="tx1"/>
+          </a:fontRef>
+        </p:style>
+      </p:cxnSp>
+      <p:cxnSp>
+        <p:nvCxnSpPr>
+          <p:cNvPr id="35" name="Straight Arrow Connector 34"/>
+          <p:cNvCxnSpPr>
+            <a:stCxn id="32" idx="3"/>
+            <a:endCxn id="29" idx="1"/>
+          </p:cNvCxnSpPr>
+          <p:nvPr/>
+        </p:nvCxnSpPr>
+        <p:spPr>
+          <a:xfrm>
+            <a:off x="2590800" y="2591817"/>
+            <a:ext cx="304800" cy="7064"/>
+          </a:xfrm>
+          <a:prstGeom prst="straightConnector1">
+            <a:avLst/>
+          </a:prstGeom>
+          <a:ln>
+            <a:tailEnd type="arrow"/>
+          </a:ln>
+        </p:spPr>
+        <p:style>
+          <a:lnRef idx="1">
+            <a:schemeClr val="accent1"/>
+          </a:lnRef>
+          <a:fillRef idx="0">
+            <a:schemeClr val="accent1"/>
+          </a:fillRef>
+          <a:effectRef idx="0">
+            <a:schemeClr val="accent1"/>
+          </a:effectRef>
+          <a:fontRef idx="minor">
+            <a:schemeClr val="tx1"/>
+          </a:fontRef>
+        </p:style>
+      </p:cxnSp>
+      <p:sp>
+        <p:nvSpPr>
+          <p:cNvPr id="38" name="TextBox 37"/>
+          <p:cNvSpPr txBox="1"/>
+          <p:nvPr/>
+        </p:nvSpPr>
+        <p:spPr>
+          <a:xfrm>
+            <a:off x="3670578" y="2882205"/>
+            <a:ext cx="779381" cy="923330"/>
+          </a:xfrm>
+          <a:prstGeom prst="rect">
+            <a:avLst/>
+          </a:prstGeom>
+          <a:noFill/>
+        </p:spPr>
+        <p:txBody>
+          <a:bodyPr wrap="none" rtlCol="0">
+            <a:spAutoFit/>
+          </a:bodyPr>
+          <a:lstStyle/>
+          <a:p>
+            <a:r>
+              <a:rPr lang="en-US" dirty="0" smtClean="0"/>
+              <a:t>6.5-&gt;1</a:t>
+            </a:r>
+          </a:p>
+          <a:p>
+            <a:r>
+              <a:rPr lang="en-US" dirty="0" smtClean="0"/>
+              <a:t>13</a:t>
+            </a:r>
+            <a:r>
+              <a:rPr lang="en-US" dirty="0"/>
+              <a:t>-</a:t>
+            </a:r>
+            <a:r>
+              <a:rPr lang="en-US" dirty="0" smtClean="0"/>
+              <a:t>&gt;2</a:t>
+            </a:r>
+          </a:p>
+          <a:p>
+            <a:r>
+              <a:rPr lang="en-US" dirty="0" smtClean="0"/>
+              <a:t>52</a:t>
+            </a:r>
+            <a:r>
+              <a:rPr lang="en-US" dirty="0"/>
+              <a:t>-</a:t>
+            </a:r>
+            <a:r>
+              <a:rPr lang="en-US" dirty="0" smtClean="0"/>
+              <a:t>&gt;4</a:t>
+            </a:r>
+            <a:endParaRPr lang="en-US" dirty="0"/>
+          </a:p>
+        </p:txBody>
+      </p:sp>
+      <p:sp>
+        <p:nvSpPr>
+          <p:cNvPr id="39" name="TextBox 38"/>
+          <p:cNvSpPr txBox="1"/>
+          <p:nvPr/>
+        </p:nvSpPr>
+        <p:spPr>
+          <a:xfrm>
+            <a:off x="2787546" y="2895600"/>
+            <a:ext cx="838691" cy="923330"/>
+          </a:xfrm>
+          <a:prstGeom prst="rect">
+            <a:avLst/>
+          </a:prstGeom>
+          <a:noFill/>
+        </p:spPr>
+        <p:txBody>
+          <a:bodyPr wrap="none" rtlCol="0">
+            <a:spAutoFit/>
+          </a:bodyPr>
+          <a:lstStyle/>
+          <a:p>
+            <a:r>
+              <a:rPr lang="en-US" dirty="0" smtClean="0"/>
+              <a:t>1-&gt;2</a:t>
+            </a:r>
+          </a:p>
+          <a:p>
+            <a:r>
+              <a:rPr lang="en-US" dirty="0" smtClean="0"/>
+              <a:t>2</a:t>
+            </a:r>
+            <a:r>
+              <a:rPr lang="en-US" dirty="0"/>
+              <a:t>-&gt;</a:t>
+            </a:r>
+            <a:r>
+              <a:rPr lang="en-US" dirty="0" smtClean="0"/>
+              <a:t>4</a:t>
+            </a:r>
+          </a:p>
+          <a:p>
+            <a:r>
+              <a:rPr lang="en-US" dirty="0" smtClean="0"/>
+              <a:t>26</a:t>
+            </a:r>
+            <a:r>
+              <a:rPr lang="en-US" dirty="0"/>
+              <a:t>-&gt;</a:t>
+            </a:r>
+            <a:r>
+              <a:rPr lang="en-US" dirty="0" smtClean="0"/>
+              <a:t>52</a:t>
+            </a:r>
+            <a:endParaRPr lang="en-US" dirty="0"/>
+          </a:p>
+        </p:txBody>
+      </p:sp>
+      <p:sp>
+        <p:nvSpPr>
+          <p:cNvPr id="40" name="TextBox 39"/>
+          <p:cNvSpPr txBox="1"/>
+          <p:nvPr/>
+        </p:nvSpPr>
+        <p:spPr>
+          <a:xfrm>
+            <a:off x="2076648" y="3427066"/>
+            <a:ext cx="418704" cy="369332"/>
+          </a:xfrm>
+          <a:prstGeom prst="rect">
+            <a:avLst/>
+          </a:prstGeom>
+          <a:noFill/>
+        </p:spPr>
+        <p:txBody>
+          <a:bodyPr wrap="none" rtlCol="0">
+            <a:spAutoFit/>
+          </a:bodyPr>
+          <a:lstStyle/>
+          <a:p>
+            <a:r>
+              <a:rPr lang="en-US" dirty="0" smtClean="0"/>
+              <a:t>26</a:t>
+            </a:r>
+            <a:endParaRPr lang="en-US" dirty="0"/>
+          </a:p>
+        </p:txBody>
+      </p:sp>
+      <p:sp>
+        <p:nvSpPr>
+          <p:cNvPr id="41" name="TextBox 40"/>
+          <p:cNvSpPr txBox="1"/>
+          <p:nvPr/>
+        </p:nvSpPr>
+        <p:spPr>
+          <a:xfrm>
+            <a:off x="457200" y="3357265"/>
+            <a:ext cx="728084" cy="369332"/>
+          </a:xfrm>
+          <a:prstGeom prst="rect">
+            <a:avLst/>
+          </a:prstGeom>
+          <a:noFill/>
+        </p:spPr>
+        <p:txBody>
+          <a:bodyPr wrap="none" rtlCol="0">
+            <a:spAutoFit/>
+          </a:bodyPr>
+          <a:lstStyle/>
+          <a:p>
+            <a:r>
+              <a:rPr lang="en-US" dirty="0" smtClean="0"/>
+              <a:t>MCS8</a:t>
+            </a:r>
+            <a:endParaRPr lang="en-US" dirty="0"/>
+          </a:p>
+        </p:txBody>
+      </p:sp>
+      <p:sp>
+        <p:nvSpPr>
+          <p:cNvPr id="42" name="TextBox 41"/>
+          <p:cNvSpPr txBox="1"/>
+          <p:nvPr/>
+        </p:nvSpPr>
+        <p:spPr>
+          <a:xfrm>
+            <a:off x="515558" y="4114800"/>
+            <a:ext cx="728084" cy="369332"/>
+          </a:xfrm>
+          <a:prstGeom prst="rect">
+            <a:avLst/>
+          </a:prstGeom>
+          <a:noFill/>
+        </p:spPr>
+        <p:txBody>
+          <a:bodyPr wrap="none" rtlCol="0">
+            <a:spAutoFit/>
+          </a:bodyPr>
+          <a:lstStyle/>
+          <a:p>
+            <a:r>
+              <a:rPr lang="en-US" dirty="0" smtClean="0"/>
+              <a:t>MCS9</a:t>
+            </a:r>
+            <a:endParaRPr lang="en-US" dirty="0"/>
+          </a:p>
+        </p:txBody>
+      </p:sp>
+      <p:sp>
+        <p:nvSpPr>
+          <p:cNvPr id="43" name="TextBox 42"/>
+          <p:cNvSpPr txBox="1"/>
+          <p:nvPr/>
+        </p:nvSpPr>
+        <p:spPr>
+          <a:xfrm>
+            <a:off x="2746254" y="4022467"/>
+            <a:ext cx="838691" cy="646331"/>
+          </a:xfrm>
+          <a:prstGeom prst="rect">
+            <a:avLst/>
+          </a:prstGeom>
+          <a:noFill/>
+        </p:spPr>
+        <p:txBody>
+          <a:bodyPr wrap="none" rtlCol="0">
+            <a:spAutoFit/>
+          </a:bodyPr>
+          <a:lstStyle/>
+          <a:p>
+            <a:r>
+              <a:rPr lang="en-US" dirty="0" smtClean="0"/>
+              <a:t>1-&gt;2</a:t>
+            </a:r>
+          </a:p>
+          <a:p>
+            <a:r>
+              <a:rPr lang="en-US" dirty="0" smtClean="0"/>
+              <a:t>13-&gt;26</a:t>
+            </a:r>
+            <a:endParaRPr lang="en-US" dirty="0"/>
+          </a:p>
+        </p:txBody>
+      </p:sp>
+      <p:sp>
+        <p:nvSpPr>
+          <p:cNvPr id="44" name="TextBox 43"/>
+          <p:cNvSpPr txBox="1"/>
+          <p:nvPr/>
+        </p:nvSpPr>
+        <p:spPr>
+          <a:xfrm>
+            <a:off x="3670578" y="4022467"/>
+            <a:ext cx="721672" cy="646331"/>
+          </a:xfrm>
+          <a:prstGeom prst="rect">
+            <a:avLst/>
+          </a:prstGeom>
+          <a:noFill/>
+        </p:spPr>
+        <p:txBody>
+          <a:bodyPr wrap="none" rtlCol="0">
+            <a:spAutoFit/>
+          </a:bodyPr>
+          <a:lstStyle/>
+          <a:p>
+            <a:r>
+              <a:rPr lang="en-US" dirty="0" smtClean="0"/>
+              <a:t>13-&gt;1</a:t>
+            </a:r>
+          </a:p>
+          <a:p>
+            <a:r>
+              <a:rPr lang="en-US" dirty="0" smtClean="0"/>
+              <a:t>26-&gt;2</a:t>
+            </a:r>
+            <a:endParaRPr lang="en-US" dirty="0"/>
+          </a:p>
+        </p:txBody>
+      </p:sp>
+      <p:sp>
+        <p:nvSpPr>
+          <p:cNvPr id="45" name="TextBox 44"/>
+          <p:cNvSpPr txBox="1"/>
+          <p:nvPr/>
+        </p:nvSpPr>
+        <p:spPr>
+          <a:xfrm>
+            <a:off x="457200" y="4800600"/>
+            <a:ext cx="845103" cy="369332"/>
+          </a:xfrm>
+          <a:prstGeom prst="rect">
+            <a:avLst/>
+          </a:prstGeom>
+          <a:noFill/>
+        </p:spPr>
+        <p:txBody>
+          <a:bodyPr wrap="none" rtlCol="0">
+            <a:spAutoFit/>
+          </a:bodyPr>
+          <a:lstStyle/>
+          <a:p>
+            <a:r>
+              <a:rPr lang="en-US" dirty="0" smtClean="0"/>
+              <a:t>MCS10</a:t>
+            </a:r>
+            <a:endParaRPr lang="en-US" dirty="0"/>
+          </a:p>
+        </p:txBody>
+      </p:sp>
+      <p:sp>
+        <p:nvSpPr>
+          <p:cNvPr id="46" name="TextBox 45"/>
+          <p:cNvSpPr txBox="1"/>
+          <p:nvPr/>
+        </p:nvSpPr>
+        <p:spPr>
+          <a:xfrm>
+            <a:off x="1981940" y="4292120"/>
+            <a:ext cx="418704" cy="369332"/>
+          </a:xfrm>
+          <a:prstGeom prst="rect">
+            <a:avLst/>
+          </a:prstGeom>
+          <a:noFill/>
+        </p:spPr>
+        <p:txBody>
+          <a:bodyPr wrap="none" rtlCol="0">
+            <a:spAutoFit/>
+          </a:bodyPr>
+          <a:lstStyle/>
+          <a:p>
+            <a:r>
+              <a:rPr lang="en-US" dirty="0" smtClean="0"/>
+              <a:t>13</a:t>
+            </a:r>
+            <a:endParaRPr lang="en-US" dirty="0"/>
+          </a:p>
+        </p:txBody>
+      </p:sp>
+      <p:sp>
+        <p:nvSpPr>
+          <p:cNvPr id="47" name="TextBox 46"/>
+          <p:cNvSpPr txBox="1"/>
+          <p:nvPr/>
+        </p:nvSpPr>
+        <p:spPr>
+          <a:xfrm>
+            <a:off x="2720361" y="4669473"/>
+            <a:ext cx="838691" cy="646331"/>
+          </a:xfrm>
+          <a:prstGeom prst="rect">
+            <a:avLst/>
+          </a:prstGeom>
+          <a:noFill/>
+        </p:spPr>
+        <p:txBody>
+          <a:bodyPr wrap="none" rtlCol="0">
+            <a:spAutoFit/>
+          </a:bodyPr>
+          <a:lstStyle/>
+          <a:p>
+            <a:r>
+              <a:rPr lang="en-US" dirty="0" smtClean="0"/>
+              <a:t>3-&gt;4</a:t>
+            </a:r>
+          </a:p>
+          <a:p>
+            <a:r>
+              <a:rPr lang="en-US" dirty="0" smtClean="0"/>
+              <a:t>39-&gt;52</a:t>
+            </a:r>
+            <a:endParaRPr lang="en-US" dirty="0"/>
+          </a:p>
+        </p:txBody>
+      </p:sp>
+      <p:sp>
+        <p:nvSpPr>
+          <p:cNvPr id="48" name="TextBox 47"/>
+          <p:cNvSpPr txBox="1"/>
+          <p:nvPr/>
+        </p:nvSpPr>
+        <p:spPr>
+          <a:xfrm>
+            <a:off x="3684478" y="4652393"/>
+            <a:ext cx="721672" cy="646331"/>
+          </a:xfrm>
+          <a:prstGeom prst="rect">
+            <a:avLst/>
+          </a:prstGeom>
+          <a:noFill/>
+        </p:spPr>
+        <p:txBody>
+          <a:bodyPr wrap="none" rtlCol="0">
+            <a:spAutoFit/>
+          </a:bodyPr>
+          <a:lstStyle/>
+          <a:p>
+            <a:r>
+              <a:rPr lang="en-US" dirty="0" smtClean="0"/>
+              <a:t>13-&gt;1</a:t>
+            </a:r>
+          </a:p>
+          <a:p>
+            <a:r>
+              <a:rPr lang="en-US" dirty="0" smtClean="0"/>
+              <a:t>52-&gt;4</a:t>
+            </a:r>
+            <a:endParaRPr lang="en-US" dirty="0"/>
+          </a:p>
+        </p:txBody>
+      </p:sp>
+      <p:sp>
+        <p:nvSpPr>
+          <p:cNvPr id="49" name="TextBox 48"/>
+          <p:cNvSpPr txBox="1"/>
+          <p:nvPr/>
+        </p:nvSpPr>
+        <p:spPr>
+          <a:xfrm>
+            <a:off x="1981940" y="4964721"/>
+            <a:ext cx="418704" cy="369332"/>
+          </a:xfrm>
+          <a:prstGeom prst="rect">
+            <a:avLst/>
+          </a:prstGeom>
+          <a:noFill/>
+        </p:spPr>
+        <p:txBody>
+          <a:bodyPr wrap="none" rtlCol="0">
+            <a:spAutoFit/>
+          </a:bodyPr>
+          <a:lstStyle/>
+          <a:p>
+            <a:r>
+              <a:rPr lang="en-US" dirty="0" smtClean="0"/>
+              <a:t>39</a:t>
+            </a:r>
+            <a:endParaRPr lang="en-US" dirty="0"/>
+          </a:p>
+        </p:txBody>
+      </p:sp>
+    </p:spTree>
+    <p:extLst>
+      <p:ext uri="{BB962C8B-B14F-4D97-AF65-F5344CB8AC3E}">
+        <p14:creationId xmlns:p14="http://schemas.microsoft.com/office/powerpoint/2010/main" val="274378783"/>
+      </p:ext>
+    </p:extLst>
+  </p:cSld>
+  <p:clrMapOvr>
+    <a:masterClrMapping/>
+  </p:clrMapOvr>
+</p:sld>
+</file>
+
 <file path=ppt/slides/slide3.xml><?xml version="1.0" encoding="utf-8"?>
 <p:sld xmlns:a="http://schemas.openxmlformats.org/drawingml/2006/main" xmlns:r="http://schemas.openxmlformats.org/officeDocument/2006/relationships" xmlns:p="http://schemas.openxmlformats.org/presentationml/2006/main">
   <p:cSld>

</xml_diff>

<commit_message>
update TPipeline. TODO: refine pipeline to reduce sync overhead...
</commit_message>
<xml_diff>
--- a/cora.pptx
+++ b/cora.pptx
@@ -5,7 +5,7 @@
     <p:sldMasterId id="2147483648" r:id="rId1"/>
   </p:sldMasterIdLst>
   <p:notesMasterIdLst>
-    <p:notesMasterId r:id="rId32"/>
+    <p:notesMasterId r:id="rId33"/>
   </p:notesMasterIdLst>
   <p:sldIdLst>
     <p:sldId id="256" r:id="rId2"/>
@@ -38,6 +38,7 @@
     <p:sldId id="290" r:id="rId29"/>
     <p:sldId id="291" r:id="rId30"/>
     <p:sldId id="292" r:id="rId31"/>
+    <p:sldId id="293" r:id="rId32"/>
   </p:sldIdLst>
   <p:sldSz cx="9144000" cy="6858000" type="screen4x3"/>
   <p:notesSz cx="6858000" cy="9144000"/>
@@ -193,6 +194,11 @@
             <p14:sldId id="292"/>
           </p14:sldIdLst>
         </p14:section>
+        <p14:section name="Profiling" id="{0D4A04C9-9E42-4C14-ADD3-3F3AE7079D47}">
+          <p14:sldIdLst>
+            <p14:sldId id="293"/>
+          </p14:sldIdLst>
+        </p14:section>
       </p14:sectionLst>
     </p:ext>
   </p:extLst>
@@ -202,7 +208,7 @@
 <file path=ppt/charts/chart1.xml><?xml version="1.0" encoding="utf-8"?>
 <c:chartSpace xmlns:c="http://schemas.openxmlformats.org/drawingml/2006/chart" xmlns:a="http://schemas.openxmlformats.org/drawingml/2006/main" xmlns:r="http://schemas.openxmlformats.org/officeDocument/2006/relationships">
   <c:date1904 val="0"/>
-  <c:lang val="zh-CN"/>
+  <c:lang val="en-US"/>
   <c:roundedCorners val="0"/>
   <mc:AlternateContent xmlns:mc="http://schemas.openxmlformats.org/markup-compatibility/2006">
     <mc:Choice xmlns:c14="http://schemas.microsoft.com/office/drawing/2007/8/2/chart" Requires="c14">
@@ -620,11 +626,11 @@
           <c:showBubbleSize val="0"/>
         </c:dLbls>
         <c:gapWidth val="150"/>
-        <c:axId val="124143104"/>
-        <c:axId val="124144640"/>
+        <c:axId val="95487488"/>
+        <c:axId val="95489024"/>
       </c:barChart>
       <c:catAx>
-        <c:axId val="124143104"/>
+        <c:axId val="95487488"/>
         <c:scaling>
           <c:orientation val="minMax"/>
         </c:scaling>
@@ -634,7 +640,7 @@
         <c:majorTickMark val="out"/>
         <c:minorTickMark val="none"/>
         <c:tickLblPos val="nextTo"/>
-        <c:crossAx val="124144640"/>
+        <c:crossAx val="95489024"/>
         <c:crosses val="autoZero"/>
         <c:auto val="1"/>
         <c:lblAlgn val="ctr"/>
@@ -642,7 +648,7 @@
         <c:noMultiLvlLbl val="0"/>
       </c:catAx>
       <c:valAx>
-        <c:axId val="124144640"/>
+        <c:axId val="95489024"/>
         <c:scaling>
           <c:orientation val="minMax"/>
         </c:scaling>
@@ -673,7 +679,7 @@
         <c:majorTickMark val="out"/>
         <c:minorTickMark val="none"/>
         <c:tickLblPos val="nextTo"/>
-        <c:crossAx val="124143104"/>
+        <c:crossAx val="95487488"/>
         <c:crosses val="autoZero"/>
         <c:crossBetween val="between"/>
       </c:valAx>
@@ -694,7 +700,7 @@
       <a:pPr>
         <a:defRPr sz="1800"/>
       </a:pPr>
-      <a:endParaRPr lang="zh-CN"/>
+      <a:endParaRPr lang="en-US"/>
     </a:p>
   </c:txPr>
   <c:externalData r:id="rId1">
@@ -706,7 +712,7 @@
 <file path=ppt/charts/chart2.xml><?xml version="1.0" encoding="utf-8"?>
 <c:chartSpace xmlns:c="http://schemas.openxmlformats.org/drawingml/2006/chart" xmlns:a="http://schemas.openxmlformats.org/drawingml/2006/main" xmlns:r="http://schemas.openxmlformats.org/officeDocument/2006/relationships">
   <c:date1904 val="0"/>
-  <c:lang val="zh-CN"/>
+  <c:lang val="en-US"/>
   <c:roundedCorners val="0"/>
   <mc:AlternateContent xmlns:mc="http://schemas.openxmlformats.org/markup-compatibility/2006">
     <mc:Choice xmlns:c14="http://schemas.microsoft.com/office/drawing/2007/8/2/chart" Requires="c14">
@@ -977,11 +983,11 @@
           <c:showBubbleSize val="0"/>
         </c:dLbls>
         <c:gapWidth val="150"/>
-        <c:axId val="124362752"/>
-        <c:axId val="124364288"/>
+        <c:axId val="100323328"/>
+        <c:axId val="100324864"/>
       </c:barChart>
       <c:catAx>
-        <c:axId val="124362752"/>
+        <c:axId val="100323328"/>
         <c:scaling>
           <c:orientation val="minMax"/>
         </c:scaling>
@@ -991,7 +997,7 @@
         <c:majorTickMark val="out"/>
         <c:minorTickMark val="none"/>
         <c:tickLblPos val="nextTo"/>
-        <c:crossAx val="124364288"/>
+        <c:crossAx val="100324864"/>
         <c:crosses val="autoZero"/>
         <c:auto val="1"/>
         <c:lblAlgn val="ctr"/>
@@ -999,7 +1005,7 @@
         <c:noMultiLvlLbl val="0"/>
       </c:catAx>
       <c:valAx>
-        <c:axId val="124364288"/>
+        <c:axId val="100324864"/>
         <c:scaling>
           <c:orientation val="minMax"/>
         </c:scaling>
@@ -1038,7 +1044,7 @@
         <c:majorTickMark val="out"/>
         <c:minorTickMark val="none"/>
         <c:tickLblPos val="nextTo"/>
-        <c:crossAx val="124362752"/>
+        <c:crossAx val="100323328"/>
         <c:crosses val="autoZero"/>
         <c:crossBetween val="between"/>
       </c:valAx>
@@ -1059,7 +1065,7 @@
       <a:pPr>
         <a:defRPr sz="1800"/>
       </a:pPr>
-      <a:endParaRPr lang="zh-CN"/>
+      <a:endParaRPr lang="en-US"/>
     </a:p>
   </c:txPr>
   <c:externalData r:id="rId1">
@@ -5808,7 +5814,7 @@
           <a:p>
             <a:fld id="{1CCAE213-0BEA-41FB-800D-FF7841C35566}" type="datetimeFigureOut">
               <a:rPr lang="zh-CN" altLang="en-US" smtClean="0"/>
-              <a:t>2012/6/16</a:t>
+              <a:t>2012/6/19</a:t>
             </a:fld>
             <a:endParaRPr lang="zh-CN" altLang="en-US"/>
           </a:p>
@@ -6530,7 +6536,7 @@
             <a:fld id="{1D8BD707-D9CF-40AE-B4C6-C98DA3205C09}" type="datetimeFigureOut">
               <a:rPr lang="en-US" smtClean="0"/>
               <a:pPr/>
-              <a:t>6/16/2012</a:t>
+              <a:t>6/19/2012</a:t>
             </a:fld>
             <a:endParaRPr lang="en-US"/>
           </a:p>
@@ -6707,7 +6713,7 @@
             <a:fld id="{1D8BD707-D9CF-40AE-B4C6-C98DA3205C09}" type="datetimeFigureOut">
               <a:rPr lang="en-US" smtClean="0"/>
               <a:pPr/>
-              <a:t>6/16/2012</a:t>
+              <a:t>6/19/2012</a:t>
             </a:fld>
             <a:endParaRPr lang="en-US"/>
           </a:p>
@@ -6874,7 +6880,7 @@
             <a:fld id="{1D8BD707-D9CF-40AE-B4C6-C98DA3205C09}" type="datetimeFigureOut">
               <a:rPr lang="en-US" smtClean="0"/>
               <a:pPr/>
-              <a:t>6/16/2012</a:t>
+              <a:t>6/19/2012</a:t>
             </a:fld>
             <a:endParaRPr lang="en-US"/>
           </a:p>
@@ -7117,7 +7123,7 @@
             <a:fld id="{1D8BD707-D9CF-40AE-B4C6-C98DA3205C09}" type="datetimeFigureOut">
               <a:rPr lang="en-US" smtClean="0"/>
               <a:pPr/>
-              <a:t>6/16/2012</a:t>
+              <a:t>6/19/2012</a:t>
             </a:fld>
             <a:endParaRPr lang="en-US"/>
           </a:p>
@@ -7402,7 +7408,7 @@
             <a:fld id="{1D8BD707-D9CF-40AE-B4C6-C98DA3205C09}" type="datetimeFigureOut">
               <a:rPr lang="en-US" smtClean="0"/>
               <a:pPr/>
-              <a:t>6/16/2012</a:t>
+              <a:t>6/19/2012</a:t>
             </a:fld>
             <a:endParaRPr lang="en-US"/>
           </a:p>
@@ -7821,7 +7827,7 @@
             <a:fld id="{1D8BD707-D9CF-40AE-B4C6-C98DA3205C09}" type="datetimeFigureOut">
               <a:rPr lang="en-US" smtClean="0"/>
               <a:pPr/>
-              <a:t>6/16/2012</a:t>
+              <a:t>6/19/2012</a:t>
             </a:fld>
             <a:endParaRPr lang="en-US"/>
           </a:p>
@@ -7936,7 +7942,7 @@
             <a:fld id="{1D8BD707-D9CF-40AE-B4C6-C98DA3205C09}" type="datetimeFigureOut">
               <a:rPr lang="en-US" smtClean="0"/>
               <a:pPr/>
-              <a:t>6/16/2012</a:t>
+              <a:t>6/19/2012</a:t>
             </a:fld>
             <a:endParaRPr lang="en-US"/>
           </a:p>
@@ -8028,7 +8034,7 @@
             <a:fld id="{1D8BD707-D9CF-40AE-B4C6-C98DA3205C09}" type="datetimeFigureOut">
               <a:rPr lang="en-US" smtClean="0"/>
               <a:pPr/>
-              <a:t>6/16/2012</a:t>
+              <a:t>6/19/2012</a:t>
             </a:fld>
             <a:endParaRPr lang="en-US"/>
           </a:p>
@@ -8302,7 +8308,7 @@
             <a:fld id="{1D8BD707-D9CF-40AE-B4C6-C98DA3205C09}" type="datetimeFigureOut">
               <a:rPr lang="en-US" smtClean="0"/>
               <a:pPr/>
-              <a:t>6/16/2012</a:t>
+              <a:t>6/19/2012</a:t>
             </a:fld>
             <a:endParaRPr lang="en-US"/>
           </a:p>
@@ -8552,7 +8558,7 @@
             <a:fld id="{1D8BD707-D9CF-40AE-B4C6-C98DA3205C09}" type="datetimeFigureOut">
               <a:rPr lang="en-US" smtClean="0"/>
               <a:pPr/>
-              <a:t>6/16/2012</a:t>
+              <a:t>6/19/2012</a:t>
             </a:fld>
             <a:endParaRPr lang="en-US"/>
           </a:p>
@@ -8762,7 +8768,7 @@
             <a:fld id="{1D8BD707-D9CF-40AE-B4C6-C98DA3205C09}" type="datetimeFigureOut">
               <a:rPr lang="en-US" smtClean="0"/>
               <a:pPr/>
-              <a:t>6/16/2012</a:t>
+              <a:t>6/19/2012</a:t>
             </a:fld>
             <a:endParaRPr lang="en-US"/>
           </a:p>
@@ -27850,6 +27856,140 @@
 </p:sld>
 </file>
 
+<file path=ppt/slides/slide31.xml><?xml version="1.0" encoding="utf-8"?>
+<p:sld xmlns:a="http://schemas.openxmlformats.org/drawingml/2006/main" xmlns:r="http://schemas.openxmlformats.org/officeDocument/2006/relationships" xmlns:p="http://schemas.openxmlformats.org/presentationml/2006/main">
+  <p:cSld>
+    <p:spTree>
+      <p:nvGrpSpPr>
+        <p:cNvPr id="1" name=""/>
+        <p:cNvGrpSpPr/>
+        <p:nvPr/>
+      </p:nvGrpSpPr>
+      <p:grpSpPr>
+        <a:xfrm>
+          <a:off x="0" y="0"/>
+          <a:ext cx="0" cy="0"/>
+          <a:chOff x="0" y="0"/>
+          <a:chExt cx="0" cy="0"/>
+        </a:xfrm>
+      </p:grpSpPr>
+      <p:sp>
+        <p:nvSpPr>
+          <p:cNvPr id="2" name="Title 1"/>
+          <p:cNvSpPr>
+            <a:spLocks noGrp="1"/>
+          </p:cNvSpPr>
+          <p:nvPr>
+            <p:ph type="title"/>
+          </p:nvPr>
+        </p:nvSpPr>
+        <p:spPr/>
+        <p:txBody>
+          <a:bodyPr/>
+          <a:lstStyle/>
+          <a:p>
+            <a:endParaRPr lang="en-US"/>
+          </a:p>
+        </p:txBody>
+      </p:sp>
+      <p:sp>
+        <p:nvSpPr>
+          <p:cNvPr id="3" name="Content Placeholder 2"/>
+          <p:cNvSpPr>
+            <a:spLocks noGrp="1"/>
+          </p:cNvSpPr>
+          <p:nvPr>
+            <p:ph idx="1"/>
+          </p:nvPr>
+        </p:nvSpPr>
+        <p:spPr/>
+        <p:txBody>
+          <a:bodyPr/>
+          <a:lstStyle/>
+          <a:p>
+            <a:r>
+              <a:rPr lang="en-US" dirty="0" smtClean="0"/>
+              <a:t>Viterbi34+Descramble+CRC32</a:t>
+            </a:r>
+          </a:p>
+          <a:p>
+            <a:pPr lvl="1"/>
+            <a:r>
+              <a:rPr lang="en-US" dirty="0" smtClean="0"/>
+              <a:t>1x: 64Mbps / w 58</a:t>
+            </a:r>
+          </a:p>
+          <a:p>
+            <a:pPr lvl="1"/>
+            <a:r>
+              <a:rPr lang="en-US" dirty="0" smtClean="0"/>
+              <a:t>2x </a:t>
+            </a:r>
+            <a:r>
+              <a:rPr lang="en-US" dirty="0" err="1" smtClean="0"/>
+              <a:t>seq</a:t>
+            </a:r>
+            <a:r>
+              <a:rPr lang="en-US" dirty="0" smtClean="0"/>
+              <a:t>: 31Mbps / w 30</a:t>
+            </a:r>
+          </a:p>
+          <a:p>
+            <a:pPr lvl="1"/>
+            <a:r>
+              <a:rPr lang="en-US" dirty="0" smtClean="0"/>
+              <a:t>2x parallel: 58Mbps / w 52</a:t>
+            </a:r>
+          </a:p>
+          <a:p>
+            <a:pPr lvl="1"/>
+            <a:r>
+              <a:rPr lang="en-US" dirty="0" smtClean="0"/>
+              <a:t>Pipeline 1x: 59Mbps / 62 / w 58</a:t>
+            </a:r>
+          </a:p>
+          <a:p>
+            <a:pPr lvl="1"/>
+            <a:r>
+              <a:rPr lang="en-US" dirty="0" smtClean="0"/>
+              <a:t>Pipeline 2x </a:t>
+            </a:r>
+            <a:r>
+              <a:rPr lang="en-US" dirty="0" err="1" smtClean="0"/>
+              <a:t>seq</a:t>
+            </a:r>
+            <a:r>
+              <a:rPr lang="en-US" dirty="0" smtClean="0"/>
+              <a:t>: 30Mbps / w 30</a:t>
+            </a:r>
+          </a:p>
+          <a:p>
+            <a:pPr lvl="1"/>
+            <a:r>
+              <a:rPr lang="en-US" dirty="0" smtClean="0"/>
+              <a:t>Pipeline 2x parallel</a:t>
+            </a:r>
+            <a:r>
+              <a:rPr lang="en-US" smtClean="0"/>
+              <a:t>: 53Mbps/58 / w 32~55</a:t>
+            </a:r>
+            <a:endParaRPr lang="en-US" dirty="0"/>
+          </a:p>
+        </p:txBody>
+      </p:sp>
+    </p:spTree>
+    <p:extLst>
+      <p:ext uri="{BB962C8B-B14F-4D97-AF65-F5344CB8AC3E}">
+        <p14:creationId xmlns:p14="http://schemas.microsoft.com/office/powerpoint/2010/main" val="2947205033"/>
+      </p:ext>
+    </p:extLst>
+  </p:cSld>
+  <p:clrMapOvr>
+    <a:masterClrMapping/>
+  </p:clrMapOvr>
+</p:sld>
+</file>
+
 <file path=ppt/slides/slide4.xml><?xml version="1.0" encoding="utf-8"?>
 <p:sld xmlns:a="http://schemas.openxmlformats.org/drawingml/2006/main" xmlns:r="http://schemas.openxmlformats.org/officeDocument/2006/relationships" xmlns:p="http://schemas.openxmlformats.org/presentationml/2006/main">
   <p:cSld>

</xml_diff>

<commit_message>
4x4 TX & RX architecture are done~ TODO: Impl. ZF & MMSE MIMO Channel estimation
</commit_message>
<xml_diff>
--- a/cora.pptx
+++ b/cora.pptx
@@ -5,7 +5,7 @@
     <p:sldMasterId id="2147483648" r:id="rId1"/>
   </p:sldMasterIdLst>
   <p:notesMasterIdLst>
-    <p:notesMasterId r:id="rId36"/>
+    <p:notesMasterId r:id="rId37"/>
   </p:notesMasterIdLst>
   <p:sldIdLst>
     <p:sldId id="256" r:id="rId2"/>
@@ -38,10 +38,11 @@
     <p:sldId id="290" r:id="rId29"/>
     <p:sldId id="291" r:id="rId30"/>
     <p:sldId id="292" r:id="rId31"/>
-    <p:sldId id="294" r:id="rId32"/>
-    <p:sldId id="295" r:id="rId33"/>
-    <p:sldId id="296" r:id="rId34"/>
-    <p:sldId id="293" r:id="rId35"/>
+    <p:sldId id="297" r:id="rId32"/>
+    <p:sldId id="294" r:id="rId33"/>
+    <p:sldId id="295" r:id="rId34"/>
+    <p:sldId id="296" r:id="rId35"/>
+    <p:sldId id="293" r:id="rId36"/>
   </p:sldIdLst>
   <p:sldSz cx="9144000" cy="6858000" type="screen4x3"/>
   <p:notesSz cx="6858000" cy="9144000"/>
@@ -195,6 +196,7 @@
             <p14:sldId id="290"/>
             <p14:sldId id="291"/>
             <p14:sldId id="292"/>
+            <p14:sldId id="297"/>
             <p14:sldId id="294"/>
             <p14:sldId id="295"/>
             <p14:sldId id="296"/>
@@ -632,11 +634,11 @@
           <c:showBubbleSize val="0"/>
         </c:dLbls>
         <c:gapWidth val="150"/>
-        <c:axId val="105961728"/>
-        <c:axId val="118558720"/>
+        <c:axId val="100533760"/>
+        <c:axId val="100535296"/>
       </c:barChart>
       <c:catAx>
-        <c:axId val="105961728"/>
+        <c:axId val="100533760"/>
         <c:scaling>
           <c:orientation val="minMax"/>
         </c:scaling>
@@ -646,7 +648,7 @@
         <c:majorTickMark val="out"/>
         <c:minorTickMark val="none"/>
         <c:tickLblPos val="nextTo"/>
-        <c:crossAx val="118558720"/>
+        <c:crossAx val="100535296"/>
         <c:crosses val="autoZero"/>
         <c:auto val="1"/>
         <c:lblAlgn val="ctr"/>
@@ -654,7 +656,7 @@
         <c:noMultiLvlLbl val="0"/>
       </c:catAx>
       <c:valAx>
-        <c:axId val="118558720"/>
+        <c:axId val="100535296"/>
         <c:scaling>
           <c:orientation val="minMax"/>
         </c:scaling>
@@ -685,7 +687,7 @@
         <c:majorTickMark val="out"/>
         <c:minorTickMark val="none"/>
         <c:tickLblPos val="nextTo"/>
-        <c:crossAx val="105961728"/>
+        <c:crossAx val="100533760"/>
         <c:crosses val="autoZero"/>
         <c:crossBetween val="between"/>
       </c:valAx>
@@ -989,11 +991,11 @@
           <c:showBubbleSize val="0"/>
         </c:dLbls>
         <c:gapWidth val="150"/>
-        <c:axId val="118596352"/>
-        <c:axId val="118597888"/>
+        <c:axId val="100700160"/>
+        <c:axId val="100701696"/>
       </c:barChart>
       <c:catAx>
-        <c:axId val="118596352"/>
+        <c:axId val="100700160"/>
         <c:scaling>
           <c:orientation val="minMax"/>
         </c:scaling>
@@ -1003,7 +1005,7 @@
         <c:majorTickMark val="out"/>
         <c:minorTickMark val="none"/>
         <c:tickLblPos val="nextTo"/>
-        <c:crossAx val="118597888"/>
+        <c:crossAx val="100701696"/>
         <c:crosses val="autoZero"/>
         <c:auto val="1"/>
         <c:lblAlgn val="ctr"/>
@@ -1011,7 +1013,7 @@
         <c:noMultiLvlLbl val="0"/>
       </c:catAx>
       <c:valAx>
-        <c:axId val="118597888"/>
+        <c:axId val="100701696"/>
         <c:scaling>
           <c:orientation val="minMax"/>
         </c:scaling>
@@ -1050,7 +1052,876 @@
         <c:majorTickMark val="out"/>
         <c:minorTickMark val="none"/>
         <c:tickLblPos val="nextTo"/>
-        <c:crossAx val="118596352"/>
+        <c:crossAx val="100700160"/>
+        <c:crosses val="autoZero"/>
+        <c:crossBetween val="between"/>
+      </c:valAx>
+    </c:plotArea>
+    <c:legend>
+      <c:legendPos val="r"/>
+      <c:layout/>
+      <c:overlay val="0"/>
+    </c:legend>
+    <c:plotVisOnly val="1"/>
+    <c:dispBlanksAs val="gap"/>
+    <c:showDLblsOverMax val="0"/>
+  </c:chart>
+  <c:txPr>
+    <a:bodyPr/>
+    <a:lstStyle/>
+    <a:p>
+      <a:pPr>
+        <a:defRPr sz="1800"/>
+      </a:pPr>
+      <a:endParaRPr lang="en-US"/>
+    </a:p>
+  </c:txPr>
+  <c:externalData r:id="rId1">
+    <c:autoUpdate val="0"/>
+  </c:externalData>
+</c:chartSpace>
+</file>
+
+<file path=ppt/charts/chart3.xml><?xml version="1.0" encoding="utf-8"?>
+<c:chartSpace xmlns:c="http://schemas.openxmlformats.org/drawingml/2006/chart" xmlns:a="http://schemas.openxmlformats.org/drawingml/2006/main" xmlns:r="http://schemas.openxmlformats.org/officeDocument/2006/relationships">
+  <c:date1904 val="0"/>
+  <c:lang val="en-US"/>
+  <c:roundedCorners val="0"/>
+  <mc:AlternateContent xmlns:mc="http://schemas.openxmlformats.org/markup-compatibility/2006">
+    <mc:Choice xmlns:c14="http://schemas.microsoft.com/office/drawing/2007/8/2/chart" Requires="c14">
+      <c14:style val="102"/>
+    </mc:Choice>
+    <mc:Fallback>
+      <c:style val="2"/>
+    </mc:Fallback>
+  </mc:AlternateContent>
+  <c:chart>
+    <c:autoTitleDeleted val="0"/>
+    <c:plotArea>
+      <c:layout/>
+      <c:barChart>
+        <c:barDir val="col"/>
+        <c:grouping val="clustered"/>
+        <c:varyColors val="0"/>
+        <c:ser>
+          <c:idx val="6"/>
+          <c:order val="0"/>
+          <c:tx>
+            <c:v>8</c:v>
+          </c:tx>
+          <c:invertIfNegative val="0"/>
+          <c:cat>
+            <c:strRef>
+              <c:f>Sheet1!$A$1:$G$1</c:f>
+              <c:strCache>
+                <c:ptCount val="7"/>
+                <c:pt idx="0">
+                  <c:v>8</c:v>
+                </c:pt>
+                <c:pt idx="1">
+                  <c:v>9</c:v>
+                </c:pt>
+                <c:pt idx="2">
+                  <c:v>10</c:v>
+                </c:pt>
+                <c:pt idx="3">
+                  <c:v>11</c:v>
+                </c:pt>
+                <c:pt idx="4">
+                  <c:v>12</c:v>
+                </c:pt>
+                <c:pt idx="5">
+                  <c:v>13</c:v>
+                </c:pt>
+                <c:pt idx="6">
+                  <c:v>14</c:v>
+                </c:pt>
+              </c:strCache>
+            </c:strRef>
+          </c:cat>
+          <c:val>
+            <c:numRef>
+              <c:f>Sheet1!$A$2</c:f>
+              <c:numCache>
+                <c:formatCode>General</c:formatCode>
+                <c:ptCount val="1"/>
+                <c:pt idx="0">
+                  <c:v>33.653970999999999</c:v>
+                </c:pt>
+              </c:numCache>
+            </c:numRef>
+          </c:val>
+        </c:ser>
+        <c:ser>
+          <c:idx val="0"/>
+          <c:order val="1"/>
+          <c:tx>
+            <c:strRef>
+              <c:f>Sheet1!$B$1</c:f>
+              <c:strCache>
+                <c:ptCount val="1"/>
+                <c:pt idx="0">
+                  <c:v>9</c:v>
+                </c:pt>
+              </c:strCache>
+            </c:strRef>
+          </c:tx>
+          <c:invertIfNegative val="0"/>
+          <c:cat>
+            <c:strRef>
+              <c:f>Sheet1!$A$1:$G$1</c:f>
+              <c:strCache>
+                <c:ptCount val="7"/>
+                <c:pt idx="0">
+                  <c:v>8</c:v>
+                </c:pt>
+                <c:pt idx="1">
+                  <c:v>9</c:v>
+                </c:pt>
+                <c:pt idx="2">
+                  <c:v>10</c:v>
+                </c:pt>
+                <c:pt idx="3">
+                  <c:v>11</c:v>
+                </c:pt>
+                <c:pt idx="4">
+                  <c:v>12</c:v>
+                </c:pt>
+                <c:pt idx="5">
+                  <c:v>13</c:v>
+                </c:pt>
+                <c:pt idx="6">
+                  <c:v>14</c:v>
+                </c:pt>
+              </c:strCache>
+            </c:strRef>
+          </c:cat>
+          <c:val>
+            <c:numRef>
+              <c:f>Sheet1!$B$2</c:f>
+              <c:numCache>
+                <c:formatCode>General</c:formatCode>
+                <c:ptCount val="1"/>
+                <c:pt idx="0">
+                  <c:v>62.351629000000003</c:v>
+                </c:pt>
+              </c:numCache>
+            </c:numRef>
+          </c:val>
+        </c:ser>
+        <c:ser>
+          <c:idx val="1"/>
+          <c:order val="2"/>
+          <c:tx>
+            <c:strRef>
+              <c:f>Sheet1!$C$1</c:f>
+              <c:strCache>
+                <c:ptCount val="1"/>
+                <c:pt idx="0">
+                  <c:v>10</c:v>
+                </c:pt>
+              </c:strCache>
+            </c:strRef>
+          </c:tx>
+          <c:invertIfNegative val="0"/>
+          <c:cat>
+            <c:strRef>
+              <c:f>Sheet1!$A$1:$G$1</c:f>
+              <c:strCache>
+                <c:ptCount val="7"/>
+                <c:pt idx="0">
+                  <c:v>8</c:v>
+                </c:pt>
+                <c:pt idx="1">
+                  <c:v>9</c:v>
+                </c:pt>
+                <c:pt idx="2">
+                  <c:v>10</c:v>
+                </c:pt>
+                <c:pt idx="3">
+                  <c:v>11</c:v>
+                </c:pt>
+                <c:pt idx="4">
+                  <c:v>12</c:v>
+                </c:pt>
+                <c:pt idx="5">
+                  <c:v>13</c:v>
+                </c:pt>
+                <c:pt idx="6">
+                  <c:v>14</c:v>
+                </c:pt>
+              </c:strCache>
+            </c:strRef>
+          </c:cat>
+          <c:val>
+            <c:numRef>
+              <c:f>Sheet1!$C$2</c:f>
+              <c:numCache>
+                <c:formatCode>General</c:formatCode>
+                <c:ptCount val="1"/>
+                <c:pt idx="0">
+                  <c:v>89.538893000000002</c:v>
+                </c:pt>
+              </c:numCache>
+            </c:numRef>
+          </c:val>
+        </c:ser>
+        <c:ser>
+          <c:idx val="2"/>
+          <c:order val="3"/>
+          <c:tx>
+            <c:strRef>
+              <c:f>Sheet1!$D$1</c:f>
+              <c:strCache>
+                <c:ptCount val="1"/>
+                <c:pt idx="0">
+                  <c:v>11</c:v>
+                </c:pt>
+              </c:strCache>
+            </c:strRef>
+          </c:tx>
+          <c:invertIfNegative val="0"/>
+          <c:cat>
+            <c:strRef>
+              <c:f>Sheet1!$A$1:$G$1</c:f>
+              <c:strCache>
+                <c:ptCount val="7"/>
+                <c:pt idx="0">
+                  <c:v>8</c:v>
+                </c:pt>
+                <c:pt idx="1">
+                  <c:v>9</c:v>
+                </c:pt>
+                <c:pt idx="2">
+                  <c:v>10</c:v>
+                </c:pt>
+                <c:pt idx="3">
+                  <c:v>11</c:v>
+                </c:pt>
+                <c:pt idx="4">
+                  <c:v>12</c:v>
+                </c:pt>
+                <c:pt idx="5">
+                  <c:v>13</c:v>
+                </c:pt>
+                <c:pt idx="6">
+                  <c:v>14</c:v>
+                </c:pt>
+              </c:strCache>
+            </c:strRef>
+          </c:cat>
+          <c:val>
+            <c:numRef>
+              <c:f>Sheet1!$D$2</c:f>
+              <c:numCache>
+                <c:formatCode>General</c:formatCode>
+                <c:ptCount val="1"/>
+                <c:pt idx="0">
+                  <c:v>100.56740000000001</c:v>
+                </c:pt>
+              </c:numCache>
+            </c:numRef>
+          </c:val>
+        </c:ser>
+        <c:ser>
+          <c:idx val="3"/>
+          <c:order val="4"/>
+          <c:tx>
+            <c:strRef>
+              <c:f>Sheet1!$E$1</c:f>
+              <c:strCache>
+                <c:ptCount val="1"/>
+                <c:pt idx="0">
+                  <c:v>12</c:v>
+                </c:pt>
+              </c:strCache>
+            </c:strRef>
+          </c:tx>
+          <c:invertIfNegative val="0"/>
+          <c:cat>
+            <c:strRef>
+              <c:f>Sheet1!$A$1:$G$1</c:f>
+              <c:strCache>
+                <c:ptCount val="7"/>
+                <c:pt idx="0">
+                  <c:v>8</c:v>
+                </c:pt>
+                <c:pt idx="1">
+                  <c:v>9</c:v>
+                </c:pt>
+                <c:pt idx="2">
+                  <c:v>10</c:v>
+                </c:pt>
+                <c:pt idx="3">
+                  <c:v>11</c:v>
+                </c:pt>
+                <c:pt idx="4">
+                  <c:v>12</c:v>
+                </c:pt>
+                <c:pt idx="5">
+                  <c:v>13</c:v>
+                </c:pt>
+                <c:pt idx="6">
+                  <c:v>14</c:v>
+                </c:pt>
+              </c:strCache>
+            </c:strRef>
+          </c:cat>
+          <c:val>
+            <c:numRef>
+              <c:f>Sheet1!$E$2</c:f>
+              <c:numCache>
+                <c:formatCode>General</c:formatCode>
+                <c:ptCount val="1"/>
+                <c:pt idx="0">
+                  <c:v>139.97304</c:v>
+                </c:pt>
+              </c:numCache>
+            </c:numRef>
+          </c:val>
+        </c:ser>
+        <c:ser>
+          <c:idx val="4"/>
+          <c:order val="5"/>
+          <c:tx>
+            <c:strRef>
+              <c:f>Sheet1!$F$1</c:f>
+              <c:strCache>
+                <c:ptCount val="1"/>
+                <c:pt idx="0">
+                  <c:v>13</c:v>
+                </c:pt>
+              </c:strCache>
+            </c:strRef>
+          </c:tx>
+          <c:invertIfNegative val="0"/>
+          <c:cat>
+            <c:strRef>
+              <c:f>Sheet1!$A$1:$G$1</c:f>
+              <c:strCache>
+                <c:ptCount val="7"/>
+                <c:pt idx="0">
+                  <c:v>8</c:v>
+                </c:pt>
+                <c:pt idx="1">
+                  <c:v>9</c:v>
+                </c:pt>
+                <c:pt idx="2">
+                  <c:v>10</c:v>
+                </c:pt>
+                <c:pt idx="3">
+                  <c:v>11</c:v>
+                </c:pt>
+                <c:pt idx="4">
+                  <c:v>12</c:v>
+                </c:pt>
+                <c:pt idx="5">
+                  <c:v>13</c:v>
+                </c:pt>
+                <c:pt idx="6">
+                  <c:v>14</c:v>
+                </c:pt>
+              </c:strCache>
+            </c:strRef>
+          </c:cat>
+          <c:val>
+            <c:numRef>
+              <c:f>Sheet1!$F$2</c:f>
+              <c:numCache>
+                <c:formatCode>General</c:formatCode>
+                <c:ptCount val="1"/>
+                <c:pt idx="0">
+                  <c:v>155.87907000000001</c:v>
+                </c:pt>
+              </c:numCache>
+            </c:numRef>
+          </c:val>
+        </c:ser>
+        <c:ser>
+          <c:idx val="5"/>
+          <c:order val="6"/>
+          <c:tx>
+            <c:strRef>
+              <c:f>Sheet1!$G$1</c:f>
+              <c:strCache>
+                <c:ptCount val="1"/>
+                <c:pt idx="0">
+                  <c:v>14</c:v>
+                </c:pt>
+              </c:strCache>
+            </c:strRef>
+          </c:tx>
+          <c:invertIfNegative val="0"/>
+          <c:cat>
+            <c:strRef>
+              <c:f>Sheet1!$A$1:$G$1</c:f>
+              <c:strCache>
+                <c:ptCount val="7"/>
+                <c:pt idx="0">
+                  <c:v>8</c:v>
+                </c:pt>
+                <c:pt idx="1">
+                  <c:v>9</c:v>
+                </c:pt>
+                <c:pt idx="2">
+                  <c:v>10</c:v>
+                </c:pt>
+                <c:pt idx="3">
+                  <c:v>11</c:v>
+                </c:pt>
+                <c:pt idx="4">
+                  <c:v>12</c:v>
+                </c:pt>
+                <c:pt idx="5">
+                  <c:v>13</c:v>
+                </c:pt>
+                <c:pt idx="6">
+                  <c:v>14</c:v>
+                </c:pt>
+              </c:strCache>
+            </c:strRef>
+          </c:cat>
+          <c:val>
+            <c:numRef>
+              <c:f>Sheet1!$G$2</c:f>
+              <c:numCache>
+                <c:formatCode>General</c:formatCode>
+                <c:ptCount val="1"/>
+                <c:pt idx="0">
+                  <c:v>170.61391</c:v>
+                </c:pt>
+              </c:numCache>
+            </c:numRef>
+          </c:val>
+        </c:ser>
+        <c:dLbls>
+          <c:showLegendKey val="0"/>
+          <c:showVal val="0"/>
+          <c:showCatName val="0"/>
+          <c:showSerName val="0"/>
+          <c:showPercent val="0"/>
+          <c:showBubbleSize val="0"/>
+        </c:dLbls>
+        <c:gapWidth val="150"/>
+        <c:axId val="131778432"/>
+        <c:axId val="131785856"/>
+      </c:barChart>
+      <c:catAx>
+        <c:axId val="131778432"/>
+        <c:scaling>
+          <c:orientation val="minMax"/>
+        </c:scaling>
+        <c:delete val="1"/>
+        <c:axPos val="b"/>
+        <c:numFmt formatCode="General" sourceLinked="1"/>
+        <c:majorTickMark val="out"/>
+        <c:minorTickMark val="none"/>
+        <c:tickLblPos val="nextTo"/>
+        <c:crossAx val="131785856"/>
+        <c:crosses val="autoZero"/>
+        <c:auto val="1"/>
+        <c:lblAlgn val="ctr"/>
+        <c:lblOffset val="100"/>
+        <c:noMultiLvlLbl val="0"/>
+      </c:catAx>
+      <c:valAx>
+        <c:axId val="131785856"/>
+        <c:scaling>
+          <c:orientation val="minMax"/>
+        </c:scaling>
+        <c:delete val="0"/>
+        <c:axPos val="l"/>
+        <c:majorGridlines/>
+        <c:title>
+          <c:tx>
+            <c:rich>
+              <a:bodyPr rot="-5400000" vert="horz"/>
+              <a:lstStyle/>
+              <a:p>
+                <a:pPr>
+                  <a:defRPr/>
+                </a:pPr>
+                <a:r>
+                  <a:rPr lang="en-US" dirty="0" smtClean="0"/>
+                  <a:t>Encoding Throughput(Mbps)</a:t>
+                </a:r>
+                <a:endParaRPr lang="en-US" dirty="0"/>
+              </a:p>
+            </c:rich>
+          </c:tx>
+          <c:layout/>
+          <c:overlay val="0"/>
+        </c:title>
+        <c:numFmt formatCode="General" sourceLinked="1"/>
+        <c:majorTickMark val="out"/>
+        <c:minorTickMark val="none"/>
+        <c:tickLblPos val="nextTo"/>
+        <c:crossAx val="131778432"/>
+        <c:crosses val="autoZero"/>
+        <c:crossBetween val="between"/>
+      </c:valAx>
+    </c:plotArea>
+    <c:legend>
+      <c:legendPos val="r"/>
+      <c:layout/>
+      <c:overlay val="0"/>
+    </c:legend>
+    <c:plotVisOnly val="1"/>
+    <c:dispBlanksAs val="gap"/>
+    <c:showDLblsOverMax val="0"/>
+  </c:chart>
+  <c:txPr>
+    <a:bodyPr/>
+    <a:lstStyle/>
+    <a:p>
+      <a:pPr>
+        <a:defRPr sz="1800"/>
+      </a:pPr>
+      <a:endParaRPr lang="en-US"/>
+    </a:p>
+  </c:txPr>
+  <c:externalData r:id="rId1">
+    <c:autoUpdate val="0"/>
+  </c:externalData>
+</c:chartSpace>
+</file>
+
+<file path=ppt/charts/chart4.xml><?xml version="1.0" encoding="utf-8"?>
+<c:chartSpace xmlns:c="http://schemas.openxmlformats.org/drawingml/2006/chart" xmlns:a="http://schemas.openxmlformats.org/drawingml/2006/main" xmlns:r="http://schemas.openxmlformats.org/officeDocument/2006/relationships">
+  <c:date1904 val="0"/>
+  <c:lang val="en-US"/>
+  <c:roundedCorners val="0"/>
+  <mc:AlternateContent xmlns:mc="http://schemas.openxmlformats.org/markup-compatibility/2006">
+    <mc:Choice xmlns:c14="http://schemas.microsoft.com/office/drawing/2007/8/2/chart" Requires="c14">
+      <c14:style val="102"/>
+    </mc:Choice>
+    <mc:Fallback>
+      <c:style val="2"/>
+    </mc:Fallback>
+  </mc:AlternateContent>
+  <c:chart>
+    <c:autoTitleDeleted val="0"/>
+    <c:plotArea>
+      <c:layout/>
+      <c:barChart>
+        <c:barDir val="col"/>
+        <c:grouping val="clustered"/>
+        <c:varyColors val="0"/>
+        <c:ser>
+          <c:idx val="6"/>
+          <c:order val="0"/>
+          <c:tx>
+            <c:v>8</c:v>
+          </c:tx>
+          <c:invertIfNegative val="0"/>
+          <c:cat>
+            <c:strLit>
+              <c:ptCount val="1"/>
+              <c:pt idx="0">
+                <c:v>Rate</c:v>
+              </c:pt>
+            </c:strLit>
+          </c:cat>
+          <c:val>
+            <c:numRef>
+              <c:f>Sheet1!$A$2</c:f>
+              <c:numCache>
+                <c:formatCode>General</c:formatCode>
+                <c:ptCount val="1"/>
+                <c:pt idx="0">
+                  <c:v>24</c:v>
+                </c:pt>
+              </c:numCache>
+            </c:numRef>
+          </c:val>
+        </c:ser>
+        <c:ser>
+          <c:idx val="0"/>
+          <c:order val="1"/>
+          <c:tx>
+            <c:strRef>
+              <c:f>Sheet1!$B$1</c:f>
+              <c:strCache>
+                <c:ptCount val="1"/>
+                <c:pt idx="0">
+                  <c:v>9</c:v>
+                </c:pt>
+              </c:strCache>
+            </c:strRef>
+          </c:tx>
+          <c:invertIfNegative val="0"/>
+          <c:cat>
+            <c:strLit>
+              <c:ptCount val="1"/>
+              <c:pt idx="0">
+                <c:v>Rate</c:v>
+              </c:pt>
+            </c:strLit>
+          </c:cat>
+          <c:val>
+            <c:numRef>
+              <c:f>Sheet1!$B$2</c:f>
+              <c:numCache>
+                <c:formatCode>General</c:formatCode>
+                <c:ptCount val="1"/>
+                <c:pt idx="0">
+                  <c:v>22</c:v>
+                </c:pt>
+              </c:numCache>
+            </c:numRef>
+          </c:val>
+        </c:ser>
+        <c:ser>
+          <c:idx val="1"/>
+          <c:order val="2"/>
+          <c:tx>
+            <c:strRef>
+              <c:f>Sheet1!$C$1</c:f>
+              <c:strCache>
+                <c:ptCount val="1"/>
+                <c:pt idx="0">
+                  <c:v>10</c:v>
+                </c:pt>
+              </c:strCache>
+            </c:strRef>
+          </c:tx>
+          <c:invertIfNegative val="0"/>
+          <c:cat>
+            <c:strLit>
+              <c:ptCount val="1"/>
+              <c:pt idx="0">
+                <c:v>Rate</c:v>
+              </c:pt>
+            </c:strLit>
+          </c:cat>
+          <c:val>
+            <c:numRef>
+              <c:f>Sheet1!$C$2</c:f>
+              <c:numCache>
+                <c:formatCode>General</c:formatCode>
+                <c:ptCount val="1"/>
+                <c:pt idx="0">
+                  <c:v>21</c:v>
+                </c:pt>
+              </c:numCache>
+            </c:numRef>
+          </c:val>
+        </c:ser>
+        <c:ser>
+          <c:idx val="2"/>
+          <c:order val="3"/>
+          <c:tx>
+            <c:strRef>
+              <c:f>Sheet1!$D$1</c:f>
+              <c:strCache>
+                <c:ptCount val="1"/>
+                <c:pt idx="0">
+                  <c:v>11</c:v>
+                </c:pt>
+              </c:strCache>
+            </c:strRef>
+          </c:tx>
+          <c:invertIfNegative val="0"/>
+          <c:cat>
+            <c:strLit>
+              <c:ptCount val="1"/>
+              <c:pt idx="0">
+                <c:v>Rate</c:v>
+              </c:pt>
+            </c:strLit>
+          </c:cat>
+          <c:val>
+            <c:numRef>
+              <c:f>Sheet1!$D$2</c:f>
+              <c:numCache>
+                <c:formatCode>General</c:formatCode>
+                <c:ptCount val="1"/>
+                <c:pt idx="0">
+                  <c:v>18</c:v>
+                </c:pt>
+              </c:numCache>
+            </c:numRef>
+          </c:val>
+        </c:ser>
+        <c:ser>
+          <c:idx val="3"/>
+          <c:order val="4"/>
+          <c:tx>
+            <c:strRef>
+              <c:f>Sheet1!$E$1</c:f>
+              <c:strCache>
+                <c:ptCount val="1"/>
+                <c:pt idx="0">
+                  <c:v>12</c:v>
+                </c:pt>
+              </c:strCache>
+            </c:strRef>
+          </c:tx>
+          <c:invertIfNegative val="0"/>
+          <c:cat>
+            <c:strLit>
+              <c:ptCount val="1"/>
+              <c:pt idx="0">
+                <c:v>Rate</c:v>
+              </c:pt>
+            </c:strLit>
+          </c:cat>
+          <c:val>
+            <c:numRef>
+              <c:f>Sheet1!$E$2</c:f>
+              <c:numCache>
+                <c:formatCode>General</c:formatCode>
+                <c:ptCount val="1"/>
+                <c:pt idx="0">
+                  <c:v>17</c:v>
+                </c:pt>
+              </c:numCache>
+            </c:numRef>
+          </c:val>
+        </c:ser>
+        <c:ser>
+          <c:idx val="4"/>
+          <c:order val="5"/>
+          <c:tx>
+            <c:strRef>
+              <c:f>Sheet1!$F$1</c:f>
+              <c:strCache>
+                <c:ptCount val="1"/>
+                <c:pt idx="0">
+                  <c:v>13</c:v>
+                </c:pt>
+              </c:strCache>
+            </c:strRef>
+          </c:tx>
+          <c:invertIfNegative val="0"/>
+          <c:cat>
+            <c:strLit>
+              <c:ptCount val="1"/>
+              <c:pt idx="0">
+                <c:v>Rate</c:v>
+              </c:pt>
+            </c:strLit>
+          </c:cat>
+          <c:val>
+            <c:numRef>
+              <c:f>Sheet1!$F$2</c:f>
+              <c:numCache>
+                <c:formatCode>General</c:formatCode>
+                <c:ptCount val="1"/>
+                <c:pt idx="0">
+                  <c:v>15</c:v>
+                </c:pt>
+              </c:numCache>
+            </c:numRef>
+          </c:val>
+        </c:ser>
+        <c:ser>
+          <c:idx val="5"/>
+          <c:order val="6"/>
+          <c:tx>
+            <c:strRef>
+              <c:f>Sheet1!$G$1</c:f>
+              <c:strCache>
+                <c:ptCount val="1"/>
+                <c:pt idx="0">
+                  <c:v>14</c:v>
+                </c:pt>
+              </c:strCache>
+            </c:strRef>
+          </c:tx>
+          <c:invertIfNegative val="0"/>
+          <c:cat>
+            <c:strLit>
+              <c:ptCount val="1"/>
+              <c:pt idx="0">
+                <c:v>Rate</c:v>
+              </c:pt>
+            </c:strLit>
+          </c:cat>
+          <c:val>
+            <c:numRef>
+              <c:f>Sheet1!$G$2</c:f>
+              <c:numCache>
+                <c:formatCode>General</c:formatCode>
+                <c:ptCount val="1"/>
+                <c:pt idx="0">
+                  <c:v>14</c:v>
+                </c:pt>
+              </c:numCache>
+            </c:numRef>
+          </c:val>
+        </c:ser>
+        <c:dLbls>
+          <c:showLegendKey val="0"/>
+          <c:showVal val="0"/>
+          <c:showCatName val="0"/>
+          <c:showSerName val="0"/>
+          <c:showPercent val="0"/>
+          <c:showBubbleSize val="0"/>
+        </c:dLbls>
+        <c:gapWidth val="150"/>
+        <c:axId val="100967168"/>
+        <c:axId val="100968704"/>
+      </c:barChart>
+      <c:catAx>
+        <c:axId val="100967168"/>
+        <c:scaling>
+          <c:orientation val="minMax"/>
+        </c:scaling>
+        <c:delete val="1"/>
+        <c:axPos val="b"/>
+        <c:numFmt formatCode="General" sourceLinked="1"/>
+        <c:majorTickMark val="out"/>
+        <c:minorTickMark val="none"/>
+        <c:tickLblPos val="nextTo"/>
+        <c:crossAx val="100968704"/>
+        <c:crosses val="autoZero"/>
+        <c:auto val="1"/>
+        <c:lblAlgn val="ctr"/>
+        <c:lblOffset val="100"/>
+        <c:noMultiLvlLbl val="0"/>
+      </c:catAx>
+      <c:valAx>
+        <c:axId val="100968704"/>
+        <c:scaling>
+          <c:orientation val="minMax"/>
+        </c:scaling>
+        <c:delete val="0"/>
+        <c:axPos val="l"/>
+        <c:majorGridlines/>
+        <c:title>
+          <c:tx>
+            <c:rich>
+              <a:bodyPr rot="-5400000" vert="horz"/>
+              <a:lstStyle/>
+              <a:p>
+                <a:pPr>
+                  <a:defRPr/>
+                </a:pPr>
+                <a:r>
+                  <a:rPr lang="en-US" dirty="0" smtClean="0"/>
+                  <a:t>Decoding Throughput(</a:t>
+                </a:r>
+                <a:r>
+                  <a:rPr lang="en-US" dirty="0" err="1" smtClean="0"/>
+                  <a:t>Msps</a:t>
+                </a:r>
+                <a:r>
+                  <a:rPr lang="en-US" dirty="0" smtClean="0"/>
+                  <a:t>)</a:t>
+                </a:r>
+                <a:endParaRPr lang="en-US" dirty="0"/>
+              </a:p>
+            </c:rich>
+          </c:tx>
+          <c:layout/>
+          <c:overlay val="0"/>
+        </c:title>
+        <c:numFmt formatCode="General" sourceLinked="1"/>
+        <c:majorTickMark val="out"/>
+        <c:minorTickMark val="none"/>
+        <c:tickLblPos val="nextTo"/>
+        <c:crossAx val="100967168"/>
         <c:crosses val="autoZero"/>
         <c:crossBetween val="between"/>
       </c:valAx>
@@ -5820,7 +6691,7 @@
           <a:p>
             <a:fld id="{1CCAE213-0BEA-41FB-800D-FF7841C35566}" type="datetimeFigureOut">
               <a:rPr lang="zh-CN" altLang="en-US" smtClean="0"/>
-              <a:t>2012/6/28</a:t>
+              <a:t>2012/6/29</a:t>
             </a:fld>
             <a:endParaRPr lang="zh-CN" altLang="en-US"/>
           </a:p>
@@ -6542,7 +7413,7 @@
             <a:fld id="{1D8BD707-D9CF-40AE-B4C6-C98DA3205C09}" type="datetimeFigureOut">
               <a:rPr lang="en-US" smtClean="0"/>
               <a:pPr/>
-              <a:t>6/28/2012</a:t>
+              <a:t>6/29/2012</a:t>
             </a:fld>
             <a:endParaRPr lang="en-US"/>
           </a:p>
@@ -6719,7 +7590,7 @@
             <a:fld id="{1D8BD707-D9CF-40AE-B4C6-C98DA3205C09}" type="datetimeFigureOut">
               <a:rPr lang="en-US" smtClean="0"/>
               <a:pPr/>
-              <a:t>6/28/2012</a:t>
+              <a:t>6/29/2012</a:t>
             </a:fld>
             <a:endParaRPr lang="en-US"/>
           </a:p>
@@ -6886,7 +7757,7 @@
             <a:fld id="{1D8BD707-D9CF-40AE-B4C6-C98DA3205C09}" type="datetimeFigureOut">
               <a:rPr lang="en-US" smtClean="0"/>
               <a:pPr/>
-              <a:t>6/28/2012</a:t>
+              <a:t>6/29/2012</a:t>
             </a:fld>
             <a:endParaRPr lang="en-US"/>
           </a:p>
@@ -7129,7 +8000,7 @@
             <a:fld id="{1D8BD707-D9CF-40AE-B4C6-C98DA3205C09}" type="datetimeFigureOut">
               <a:rPr lang="en-US" smtClean="0"/>
               <a:pPr/>
-              <a:t>6/28/2012</a:t>
+              <a:t>6/29/2012</a:t>
             </a:fld>
             <a:endParaRPr lang="en-US"/>
           </a:p>
@@ -7414,7 +8285,7 @@
             <a:fld id="{1D8BD707-D9CF-40AE-B4C6-C98DA3205C09}" type="datetimeFigureOut">
               <a:rPr lang="en-US" smtClean="0"/>
               <a:pPr/>
-              <a:t>6/28/2012</a:t>
+              <a:t>6/29/2012</a:t>
             </a:fld>
             <a:endParaRPr lang="en-US"/>
           </a:p>
@@ -7833,7 +8704,7 @@
             <a:fld id="{1D8BD707-D9CF-40AE-B4C6-C98DA3205C09}" type="datetimeFigureOut">
               <a:rPr lang="en-US" smtClean="0"/>
               <a:pPr/>
-              <a:t>6/28/2012</a:t>
+              <a:t>6/29/2012</a:t>
             </a:fld>
             <a:endParaRPr lang="en-US"/>
           </a:p>
@@ -7948,7 +8819,7 @@
             <a:fld id="{1D8BD707-D9CF-40AE-B4C6-C98DA3205C09}" type="datetimeFigureOut">
               <a:rPr lang="en-US" smtClean="0"/>
               <a:pPr/>
-              <a:t>6/28/2012</a:t>
+              <a:t>6/29/2012</a:t>
             </a:fld>
             <a:endParaRPr lang="en-US"/>
           </a:p>
@@ -8040,7 +8911,7 @@
             <a:fld id="{1D8BD707-D9CF-40AE-B4C6-C98DA3205C09}" type="datetimeFigureOut">
               <a:rPr lang="en-US" smtClean="0"/>
               <a:pPr/>
-              <a:t>6/28/2012</a:t>
+              <a:t>6/29/2012</a:t>
             </a:fld>
             <a:endParaRPr lang="en-US"/>
           </a:p>
@@ -8314,7 +9185,7 @@
             <a:fld id="{1D8BD707-D9CF-40AE-B4C6-C98DA3205C09}" type="datetimeFigureOut">
               <a:rPr lang="en-US" smtClean="0"/>
               <a:pPr/>
-              <a:t>6/28/2012</a:t>
+              <a:t>6/29/2012</a:t>
             </a:fld>
             <a:endParaRPr lang="en-US"/>
           </a:p>
@@ -8564,7 +9435,7 @@
             <a:fld id="{1D8BD707-D9CF-40AE-B4C6-C98DA3205C09}" type="datetimeFigureOut">
               <a:rPr lang="en-US" smtClean="0"/>
               <a:pPr/>
-              <a:t>6/28/2012</a:t>
+              <a:t>6/29/2012</a:t>
             </a:fld>
             <a:endParaRPr lang="en-US"/>
           </a:p>
@@ -8774,7 +9645,7 @@
             <a:fld id="{1D8BD707-D9CF-40AE-B4C6-C98DA3205C09}" type="datetimeFigureOut">
               <a:rPr lang="en-US" smtClean="0"/>
               <a:pPr/>
-              <a:t>6/28/2012</a:t>
+              <a:t>6/29/2012</a:t>
             </a:fld>
             <a:endParaRPr lang="en-US"/>
           </a:p>
@@ -27895,6 +28766,732 @@
           <a:lstStyle/>
           <a:p>
             <a:r>
+              <a:rPr lang="en-US" dirty="0" smtClean="0"/>
+              <a:t>4x4 </a:t>
+            </a:r>
+            <a:r>
+              <a:rPr lang="en-US" dirty="0" err="1" smtClean="0"/>
+              <a:t>Perf</a:t>
+            </a:r>
+            <a:endParaRPr lang="en-US" dirty="0"/>
+          </a:p>
+        </p:txBody>
+      </p:sp>
+      <p:graphicFrame>
+        <p:nvGraphicFramePr>
+          <p:cNvPr id="4" name="Content Placeholder 3"/>
+          <p:cNvGraphicFramePr>
+            <a:graphicFrameLocks noGrp="1"/>
+          </p:cNvGraphicFramePr>
+          <p:nvPr>
+            <p:ph idx="1"/>
+            <p:extLst>
+              <p:ext uri="{D42A27DB-BD31-4B8C-83A1-F6EECF244321}">
+                <p14:modId xmlns:p14="http://schemas.microsoft.com/office/powerpoint/2010/main" val="3962446282"/>
+              </p:ext>
+            </p:extLst>
+          </p:nvPr>
+        </p:nvGraphicFramePr>
+        <p:xfrm>
+          <a:off x="457200" y="1600200"/>
+          <a:ext cx="8229599" cy="741680"/>
+        </p:xfrm>
+        <a:graphic>
+          <a:graphicData uri="http://schemas.openxmlformats.org/drawingml/2006/table">
+            <a:tbl>
+              <a:tblPr firstRow="1" bandRow="1">
+                <a:tableStyleId>{5C22544A-7EE6-4342-B048-85BDC9FD1C3A}</a:tableStyleId>
+              </a:tblPr>
+              <a:tblGrid>
+                <a:gridCol w="1175657"/>
+                <a:gridCol w="1175657"/>
+                <a:gridCol w="1175657"/>
+                <a:gridCol w="1175657"/>
+                <a:gridCol w="1175657"/>
+                <a:gridCol w="1175657"/>
+                <a:gridCol w="1175657"/>
+              </a:tblGrid>
+              <a:tr h="370840">
+                <a:tc>
+                  <a:txBody>
+                    <a:bodyPr/>
+                    <a:lstStyle/>
+                    <a:p>
+                      <a:r>
+                        <a:rPr lang="en-US" dirty="0" smtClean="0"/>
+                        <a:t>8</a:t>
+                      </a:r>
+                      <a:endParaRPr lang="en-US" dirty="0"/>
+                    </a:p>
+                  </a:txBody>
+                  <a:tcPr/>
+                </a:tc>
+                <a:tc>
+                  <a:txBody>
+                    <a:bodyPr/>
+                    <a:lstStyle/>
+                    <a:p>
+                      <a:r>
+                        <a:rPr lang="en-US" dirty="0" smtClean="0"/>
+                        <a:t>9</a:t>
+                      </a:r>
+                      <a:endParaRPr lang="en-US" dirty="0"/>
+                    </a:p>
+                  </a:txBody>
+                  <a:tcPr/>
+                </a:tc>
+                <a:tc>
+                  <a:txBody>
+                    <a:bodyPr/>
+                    <a:lstStyle/>
+                    <a:p>
+                      <a:r>
+                        <a:rPr lang="en-US" dirty="0" smtClean="0"/>
+                        <a:t>10</a:t>
+                      </a:r>
+                      <a:endParaRPr lang="en-US" dirty="0"/>
+                    </a:p>
+                  </a:txBody>
+                  <a:tcPr/>
+                </a:tc>
+                <a:tc>
+                  <a:txBody>
+                    <a:bodyPr/>
+                    <a:lstStyle/>
+                    <a:p>
+                      <a:r>
+                        <a:rPr lang="en-US" dirty="0" smtClean="0"/>
+                        <a:t>11</a:t>
+                      </a:r>
+                      <a:endParaRPr lang="en-US" dirty="0"/>
+                    </a:p>
+                  </a:txBody>
+                  <a:tcPr/>
+                </a:tc>
+                <a:tc>
+                  <a:txBody>
+                    <a:bodyPr/>
+                    <a:lstStyle/>
+                    <a:p>
+                      <a:r>
+                        <a:rPr lang="en-US" dirty="0" smtClean="0"/>
+                        <a:t>12</a:t>
+                      </a:r>
+                      <a:endParaRPr lang="en-US" dirty="0"/>
+                    </a:p>
+                  </a:txBody>
+                  <a:tcPr/>
+                </a:tc>
+                <a:tc>
+                  <a:txBody>
+                    <a:bodyPr/>
+                    <a:lstStyle/>
+                    <a:p>
+                      <a:r>
+                        <a:rPr lang="en-US" dirty="0" smtClean="0"/>
+                        <a:t>13</a:t>
+                      </a:r>
+                      <a:endParaRPr lang="en-US" dirty="0"/>
+                    </a:p>
+                  </a:txBody>
+                  <a:tcPr/>
+                </a:tc>
+                <a:tc>
+                  <a:txBody>
+                    <a:bodyPr/>
+                    <a:lstStyle/>
+                    <a:p>
+                      <a:r>
+                        <a:rPr lang="en-US" dirty="0" smtClean="0"/>
+                        <a:t>14</a:t>
+                      </a:r>
+                      <a:endParaRPr lang="en-US" dirty="0"/>
+                    </a:p>
+                  </a:txBody>
+                  <a:tcPr/>
+                </a:tc>
+              </a:tr>
+              <a:tr h="370840">
+                <a:tc>
+                  <a:txBody>
+                    <a:bodyPr/>
+                    <a:lstStyle/>
+                    <a:p>
+                      <a:r>
+                        <a:rPr lang="en-US" dirty="0" smtClean="0"/>
+                        <a:t>24</a:t>
+                      </a:r>
+                      <a:endParaRPr lang="en-US" dirty="0"/>
+                    </a:p>
+                  </a:txBody>
+                  <a:tcPr/>
+                </a:tc>
+                <a:tc>
+                  <a:txBody>
+                    <a:bodyPr/>
+                    <a:lstStyle/>
+                    <a:p>
+                      <a:r>
+                        <a:rPr lang="en-US" dirty="0" smtClean="0"/>
+                        <a:t>62.351629</a:t>
+                      </a:r>
+                      <a:endParaRPr lang="en-US" dirty="0"/>
+                    </a:p>
+                  </a:txBody>
+                  <a:tcPr/>
+                </a:tc>
+                <a:tc>
+                  <a:txBody>
+                    <a:bodyPr/>
+                    <a:lstStyle/>
+                    <a:p>
+                      <a:r>
+                        <a:rPr lang="en-US" dirty="0" smtClean="0"/>
+                        <a:t>89.538893</a:t>
+                      </a:r>
+                      <a:endParaRPr lang="en-US" dirty="0"/>
+                    </a:p>
+                  </a:txBody>
+                  <a:tcPr/>
+                </a:tc>
+                <a:tc>
+                  <a:txBody>
+                    <a:bodyPr/>
+                    <a:lstStyle/>
+                    <a:p>
+                      <a:r>
+                        <a:rPr lang="en-US" dirty="0" smtClean="0"/>
+                        <a:t>100.5674</a:t>
+                      </a:r>
+                      <a:endParaRPr lang="en-US" dirty="0"/>
+                    </a:p>
+                  </a:txBody>
+                  <a:tcPr/>
+                </a:tc>
+                <a:tc>
+                  <a:txBody>
+                    <a:bodyPr/>
+                    <a:lstStyle/>
+                    <a:p>
+                      <a:r>
+                        <a:rPr lang="en-US" dirty="0" smtClean="0"/>
+                        <a:t>139.97304</a:t>
+                      </a:r>
+                      <a:endParaRPr lang="en-US" dirty="0"/>
+                    </a:p>
+                  </a:txBody>
+                  <a:tcPr/>
+                </a:tc>
+                <a:tc>
+                  <a:txBody>
+                    <a:bodyPr/>
+                    <a:lstStyle/>
+                    <a:p>
+                      <a:r>
+                        <a:rPr lang="en-US" dirty="0" smtClean="0"/>
+                        <a:t>155.87907</a:t>
+                      </a:r>
+                      <a:endParaRPr lang="en-US" dirty="0"/>
+                    </a:p>
+                  </a:txBody>
+                  <a:tcPr/>
+                </a:tc>
+                <a:tc>
+                  <a:txBody>
+                    <a:bodyPr/>
+                    <a:lstStyle/>
+                    <a:p>
+                      <a:r>
+                        <a:rPr lang="en-US" dirty="0" smtClean="0"/>
+                        <a:t>170.61391</a:t>
+                      </a:r>
+                      <a:endParaRPr lang="en-US" dirty="0"/>
+                    </a:p>
+                  </a:txBody>
+                  <a:tcPr/>
+                </a:tc>
+              </a:tr>
+            </a:tbl>
+          </a:graphicData>
+        </a:graphic>
+      </p:graphicFrame>
+      <p:graphicFrame>
+        <p:nvGraphicFramePr>
+          <p:cNvPr id="5" name="Content Placeholder 3"/>
+          <p:cNvGraphicFramePr>
+            <a:graphicFrameLocks/>
+          </p:cNvGraphicFramePr>
+          <p:nvPr>
+            <p:extLst>
+              <p:ext uri="{D42A27DB-BD31-4B8C-83A1-F6EECF244321}">
+                <p14:modId xmlns:p14="http://schemas.microsoft.com/office/powerpoint/2010/main" val="2852035412"/>
+              </p:ext>
+            </p:extLst>
+          </p:nvPr>
+        </p:nvGraphicFramePr>
+        <p:xfrm>
+          <a:off x="464647" y="2819400"/>
+          <a:ext cx="8229599" cy="741680"/>
+        </p:xfrm>
+        <a:graphic>
+          <a:graphicData uri="http://schemas.openxmlformats.org/drawingml/2006/table">
+            <a:tbl>
+              <a:tblPr firstRow="1" bandRow="1">
+                <a:tableStyleId>{5C22544A-7EE6-4342-B048-85BDC9FD1C3A}</a:tableStyleId>
+              </a:tblPr>
+              <a:tblGrid>
+                <a:gridCol w="1175657"/>
+                <a:gridCol w="1175657"/>
+                <a:gridCol w="1175657"/>
+                <a:gridCol w="1175657"/>
+                <a:gridCol w="1175657"/>
+                <a:gridCol w="1175657"/>
+                <a:gridCol w="1175657"/>
+              </a:tblGrid>
+              <a:tr h="370840">
+                <a:tc>
+                  <a:txBody>
+                    <a:bodyPr/>
+                    <a:lstStyle/>
+                    <a:p>
+                      <a:r>
+                        <a:rPr lang="en-US" dirty="0" smtClean="0"/>
+                        <a:t>8</a:t>
+                      </a:r>
+                      <a:endParaRPr lang="en-US" dirty="0"/>
+                    </a:p>
+                  </a:txBody>
+                  <a:tcPr/>
+                </a:tc>
+                <a:tc>
+                  <a:txBody>
+                    <a:bodyPr/>
+                    <a:lstStyle/>
+                    <a:p>
+                      <a:r>
+                        <a:rPr lang="en-US" dirty="0" smtClean="0"/>
+                        <a:t>9</a:t>
+                      </a:r>
+                      <a:endParaRPr lang="en-US" dirty="0"/>
+                    </a:p>
+                  </a:txBody>
+                  <a:tcPr/>
+                </a:tc>
+                <a:tc>
+                  <a:txBody>
+                    <a:bodyPr/>
+                    <a:lstStyle/>
+                    <a:p>
+                      <a:r>
+                        <a:rPr lang="en-US" dirty="0" smtClean="0"/>
+                        <a:t>10</a:t>
+                      </a:r>
+                      <a:endParaRPr lang="en-US" dirty="0"/>
+                    </a:p>
+                  </a:txBody>
+                  <a:tcPr/>
+                </a:tc>
+                <a:tc>
+                  <a:txBody>
+                    <a:bodyPr/>
+                    <a:lstStyle/>
+                    <a:p>
+                      <a:r>
+                        <a:rPr lang="en-US" dirty="0" smtClean="0"/>
+                        <a:t>11</a:t>
+                      </a:r>
+                      <a:endParaRPr lang="en-US" dirty="0"/>
+                    </a:p>
+                  </a:txBody>
+                  <a:tcPr/>
+                </a:tc>
+                <a:tc>
+                  <a:txBody>
+                    <a:bodyPr/>
+                    <a:lstStyle/>
+                    <a:p>
+                      <a:r>
+                        <a:rPr lang="en-US" dirty="0" smtClean="0"/>
+                        <a:t>12</a:t>
+                      </a:r>
+                      <a:endParaRPr lang="en-US" dirty="0"/>
+                    </a:p>
+                  </a:txBody>
+                  <a:tcPr/>
+                </a:tc>
+                <a:tc>
+                  <a:txBody>
+                    <a:bodyPr/>
+                    <a:lstStyle/>
+                    <a:p>
+                      <a:r>
+                        <a:rPr lang="en-US" dirty="0" smtClean="0"/>
+                        <a:t>13</a:t>
+                      </a:r>
+                      <a:endParaRPr lang="en-US" dirty="0"/>
+                    </a:p>
+                  </a:txBody>
+                  <a:tcPr/>
+                </a:tc>
+                <a:tc>
+                  <a:txBody>
+                    <a:bodyPr/>
+                    <a:lstStyle/>
+                    <a:p>
+                      <a:r>
+                        <a:rPr lang="en-US" dirty="0" smtClean="0"/>
+                        <a:t>14</a:t>
+                      </a:r>
+                      <a:endParaRPr lang="en-US" dirty="0"/>
+                    </a:p>
+                  </a:txBody>
+                  <a:tcPr/>
+                </a:tc>
+              </a:tr>
+              <a:tr h="370840">
+                <a:tc>
+                  <a:txBody>
+                    <a:bodyPr/>
+                    <a:lstStyle/>
+                    <a:p>
+                      <a:r>
+                        <a:rPr lang="en-US" dirty="0" smtClean="0"/>
+                        <a:t>24</a:t>
+                      </a:r>
+                      <a:endParaRPr lang="en-US" dirty="0"/>
+                    </a:p>
+                  </a:txBody>
+                  <a:tcPr/>
+                </a:tc>
+                <a:tc>
+                  <a:txBody>
+                    <a:bodyPr/>
+                    <a:lstStyle/>
+                    <a:p>
+                      <a:r>
+                        <a:rPr lang="en-US" dirty="0" smtClean="0"/>
+                        <a:t>22</a:t>
+                      </a:r>
+                      <a:endParaRPr lang="en-US" dirty="0"/>
+                    </a:p>
+                  </a:txBody>
+                  <a:tcPr/>
+                </a:tc>
+                <a:tc>
+                  <a:txBody>
+                    <a:bodyPr/>
+                    <a:lstStyle/>
+                    <a:p>
+                      <a:r>
+                        <a:rPr lang="en-US" dirty="0" smtClean="0"/>
+                        <a:t>21</a:t>
+                      </a:r>
+                      <a:endParaRPr lang="en-US" dirty="0"/>
+                    </a:p>
+                  </a:txBody>
+                  <a:tcPr/>
+                </a:tc>
+                <a:tc>
+                  <a:txBody>
+                    <a:bodyPr/>
+                    <a:lstStyle/>
+                    <a:p>
+                      <a:r>
+                        <a:rPr lang="en-US" dirty="0" smtClean="0"/>
+                        <a:t>18</a:t>
+                      </a:r>
+                      <a:endParaRPr lang="en-US" dirty="0"/>
+                    </a:p>
+                  </a:txBody>
+                  <a:tcPr/>
+                </a:tc>
+                <a:tc>
+                  <a:txBody>
+                    <a:bodyPr/>
+                    <a:lstStyle/>
+                    <a:p>
+                      <a:r>
+                        <a:rPr lang="en-US" dirty="0" smtClean="0"/>
+                        <a:t>17</a:t>
+                      </a:r>
+                      <a:endParaRPr lang="en-US" dirty="0"/>
+                    </a:p>
+                  </a:txBody>
+                  <a:tcPr/>
+                </a:tc>
+                <a:tc>
+                  <a:txBody>
+                    <a:bodyPr/>
+                    <a:lstStyle/>
+                    <a:p>
+                      <a:r>
+                        <a:rPr lang="en-US" dirty="0" smtClean="0"/>
+                        <a:t>15</a:t>
+                      </a:r>
+                      <a:endParaRPr lang="en-US" dirty="0"/>
+                    </a:p>
+                  </a:txBody>
+                  <a:tcPr/>
+                </a:tc>
+                <a:tc>
+                  <a:txBody>
+                    <a:bodyPr/>
+                    <a:lstStyle/>
+                    <a:p>
+                      <a:r>
+                        <a:rPr lang="en-US" dirty="0" smtClean="0"/>
+                        <a:t>14</a:t>
+                      </a:r>
+                      <a:endParaRPr lang="en-US" dirty="0"/>
+                    </a:p>
+                  </a:txBody>
+                  <a:tcPr/>
+                </a:tc>
+              </a:tr>
+            </a:tbl>
+          </a:graphicData>
+        </a:graphic>
+      </p:graphicFrame>
+      <p:sp>
+        <p:nvSpPr>
+          <p:cNvPr id="6" name="TextBox 5"/>
+          <p:cNvSpPr txBox="1"/>
+          <p:nvPr/>
+        </p:nvSpPr>
+        <p:spPr>
+          <a:xfrm>
+            <a:off x="457200" y="1219200"/>
+            <a:ext cx="1203022" cy="369332"/>
+          </a:xfrm>
+          <a:prstGeom prst="rect">
+            <a:avLst/>
+          </a:prstGeom>
+          <a:noFill/>
+        </p:spPr>
+        <p:txBody>
+          <a:bodyPr wrap="none" rtlCol="0">
+            <a:spAutoFit/>
+          </a:bodyPr>
+          <a:lstStyle/>
+          <a:p>
+            <a:r>
+              <a:rPr lang="en-US" dirty="0" smtClean="0"/>
+              <a:t>TX: (Mbps)</a:t>
+            </a:r>
+            <a:endParaRPr lang="en-US" dirty="0"/>
+          </a:p>
+        </p:txBody>
+      </p:sp>
+      <p:sp>
+        <p:nvSpPr>
+          <p:cNvPr id="7" name="TextBox 6"/>
+          <p:cNvSpPr txBox="1"/>
+          <p:nvPr/>
+        </p:nvSpPr>
+        <p:spPr>
+          <a:xfrm>
+            <a:off x="484671" y="2438400"/>
+            <a:ext cx="1183786" cy="369332"/>
+          </a:xfrm>
+          <a:prstGeom prst="rect">
+            <a:avLst/>
+          </a:prstGeom>
+          <a:noFill/>
+        </p:spPr>
+        <p:txBody>
+          <a:bodyPr wrap="none" rtlCol="0">
+            <a:spAutoFit/>
+          </a:bodyPr>
+          <a:lstStyle/>
+          <a:p>
+            <a:r>
+              <a:rPr lang="en-US" dirty="0"/>
+              <a:t>R</a:t>
+            </a:r>
+            <a:r>
+              <a:rPr lang="en-US" dirty="0" smtClean="0"/>
+              <a:t>X: (</a:t>
+            </a:r>
+            <a:r>
+              <a:rPr lang="en-US" dirty="0" err="1" smtClean="0"/>
+              <a:t>Msps</a:t>
+            </a:r>
+            <a:r>
+              <a:rPr lang="en-US" dirty="0" smtClean="0"/>
+              <a:t>)</a:t>
+            </a:r>
+            <a:endParaRPr lang="en-US" dirty="0"/>
+          </a:p>
+        </p:txBody>
+      </p:sp>
+      <p:graphicFrame>
+        <p:nvGraphicFramePr>
+          <p:cNvPr id="8" name="Chart 7"/>
+          <p:cNvGraphicFramePr/>
+          <p:nvPr>
+            <p:extLst>
+              <p:ext uri="{D42A27DB-BD31-4B8C-83A1-F6EECF244321}">
+                <p14:modId xmlns:p14="http://schemas.microsoft.com/office/powerpoint/2010/main" val="565500716"/>
+              </p:ext>
+            </p:extLst>
+          </p:nvPr>
+        </p:nvGraphicFramePr>
+        <p:xfrm>
+          <a:off x="0" y="3852909"/>
+          <a:ext cx="4604502" cy="2971800"/>
+        </p:xfrm>
+        <a:graphic>
+          <a:graphicData uri="http://schemas.openxmlformats.org/drawingml/2006/chart">
+            <c:chart xmlns:c="http://schemas.openxmlformats.org/drawingml/2006/chart" xmlns:r="http://schemas.openxmlformats.org/officeDocument/2006/relationships" r:id="rId2"/>
+          </a:graphicData>
+        </a:graphic>
+      </p:graphicFrame>
+      <p:graphicFrame>
+        <p:nvGraphicFramePr>
+          <p:cNvPr id="9" name="Chart 8"/>
+          <p:cNvGraphicFramePr/>
+          <p:nvPr>
+            <p:extLst>
+              <p:ext uri="{D42A27DB-BD31-4B8C-83A1-F6EECF244321}">
+                <p14:modId xmlns:p14="http://schemas.microsoft.com/office/powerpoint/2010/main" val="1241532392"/>
+              </p:ext>
+            </p:extLst>
+          </p:nvPr>
+        </p:nvGraphicFramePr>
+        <p:xfrm>
+          <a:off x="4648200" y="3810000"/>
+          <a:ext cx="4495800" cy="3048000"/>
+        </p:xfrm>
+        <a:graphic>
+          <a:graphicData uri="http://schemas.openxmlformats.org/drawingml/2006/chart">
+            <c:chart xmlns:c="http://schemas.openxmlformats.org/drawingml/2006/chart" xmlns:r="http://schemas.openxmlformats.org/officeDocument/2006/relationships" r:id="rId3"/>
+          </a:graphicData>
+        </a:graphic>
+      </p:graphicFrame>
+      <p:pic>
+        <p:nvPicPr>
+          <p:cNvPr id="1026" name="Picture 2" descr="http://i.ebayimg.com/00/s/NTAwWDUwMA==/$(KGrHqR,!joE9Tpcbt)uBPg(KNZFDw~~60_12.JPG"/>
+          <p:cNvPicPr>
+            <a:picLocks noChangeAspect="1" noChangeArrowheads="1"/>
+          </p:cNvPicPr>
+          <p:nvPr/>
+        </p:nvPicPr>
+        <p:blipFill>
+          <a:blip r:embed="rId4" cstate="print">
+            <a:extLst>
+              <a:ext uri="{28A0092B-C50C-407E-A947-70E740481C1C}">
+                <a14:useLocalDpi xmlns:a14="http://schemas.microsoft.com/office/drawing/2010/main" val="0"/>
+              </a:ext>
+            </a:extLst>
+          </a:blip>
+          <a:srcRect/>
+          <a:stretch>
+            <a:fillRect/>
+          </a:stretch>
+        </p:blipFill>
+        <p:spPr bwMode="auto">
+          <a:xfrm>
+            <a:off x="7602257" y="0"/>
+            <a:ext cx="1481831" cy="1370119"/>
+          </a:xfrm>
+          <a:prstGeom prst="rect">
+            <a:avLst/>
+          </a:prstGeom>
+          <a:noFill/>
+          <a:extLst>
+            <a:ext uri="{909E8E84-426E-40DD-AFC4-6F175D3DCCD1}">
+              <a14:hiddenFill xmlns:a14="http://schemas.microsoft.com/office/drawing/2010/main">
+                <a:solidFill>
+                  <a:srgbClr val="FFFFFF"/>
+                </a:solidFill>
+              </a14:hiddenFill>
+            </a:ext>
+          </a:extLst>
+        </p:spPr>
+      </p:pic>
+      <p:sp>
+        <p:nvSpPr>
+          <p:cNvPr id="3" name="TextBox 2"/>
+          <p:cNvSpPr txBox="1"/>
+          <p:nvPr/>
+        </p:nvSpPr>
+        <p:spPr>
+          <a:xfrm>
+            <a:off x="5034287" y="1277472"/>
+            <a:ext cx="4063805" cy="369332"/>
+          </a:xfrm>
+          <a:prstGeom prst="rect">
+            <a:avLst/>
+          </a:prstGeom>
+          <a:noFill/>
+        </p:spPr>
+        <p:txBody>
+          <a:bodyPr wrap="none" rtlCol="0">
+            <a:spAutoFit/>
+          </a:bodyPr>
+          <a:lstStyle/>
+          <a:p>
+            <a:r>
+              <a:rPr lang="en-US" dirty="0" smtClean="0"/>
+              <a:t>i7-980X (6 cores, 3.33GHz), 8G 1333 RAM</a:t>
+            </a:r>
+            <a:endParaRPr lang="en-US" dirty="0"/>
+          </a:p>
+        </p:txBody>
+      </p:sp>
+    </p:spTree>
+    <p:extLst>
+      <p:ext uri="{BB962C8B-B14F-4D97-AF65-F5344CB8AC3E}">
+        <p14:creationId xmlns:p14="http://schemas.microsoft.com/office/powerpoint/2010/main" val="349215339"/>
+      </p:ext>
+    </p:extLst>
+  </p:cSld>
+  <p:clrMapOvr>
+    <a:masterClrMapping/>
+  </p:clrMapOvr>
+  <p:timing>
+    <p:tnLst>
+      <p:par>
+        <p:cTn id="1" dur="indefinite" restart="never" nodeType="tmRoot"/>
+      </p:par>
+    </p:tnLst>
+  </p:timing>
+</p:sld>
+</file>
+
+<file path=ppt/slides/slide32.xml><?xml version="1.0" encoding="utf-8"?>
+<p:sld xmlns:a="http://schemas.openxmlformats.org/drawingml/2006/main" xmlns:r="http://schemas.openxmlformats.org/officeDocument/2006/relationships" xmlns:p="http://schemas.openxmlformats.org/presentationml/2006/main">
+  <p:cSld>
+    <p:spTree>
+      <p:nvGrpSpPr>
+        <p:cNvPr id="1" name=""/>
+        <p:cNvGrpSpPr/>
+        <p:nvPr/>
+      </p:nvGrpSpPr>
+      <p:grpSpPr>
+        <a:xfrm>
+          <a:off x="0" y="0"/>
+          <a:ext cx="0" cy="0"/>
+          <a:chOff x="0" y="0"/>
+          <a:chExt cx="0" cy="0"/>
+        </a:xfrm>
+      </p:grpSpPr>
+      <p:sp>
+        <p:nvSpPr>
+          <p:cNvPr id="2" name="Title 1"/>
+          <p:cNvSpPr>
+            <a:spLocks noGrp="1"/>
+          </p:cNvSpPr>
+          <p:nvPr>
+            <p:ph type="title"/>
+          </p:nvPr>
+        </p:nvSpPr>
+        <p:spPr/>
+        <p:txBody>
+          <a:bodyPr/>
+          <a:lstStyle/>
+          <a:p>
+            <a:r>
               <a:rPr lang="en-US" dirty="0"/>
               <a:t>Cyclic </a:t>
             </a:r>
@@ -28077,7 +29674,7 @@
 </p:sld>
 </file>
 
-<file path=ppt/slides/slide32.xml><?xml version="1.0" encoding="utf-8"?>
+<file path=ppt/slides/slide33.xml><?xml version="1.0" encoding="utf-8"?>
 <p:sld xmlns:a="http://schemas.openxmlformats.org/drawingml/2006/main" xmlns:r="http://schemas.openxmlformats.org/officeDocument/2006/relationships" xmlns:p="http://schemas.openxmlformats.org/presentationml/2006/main">
   <p:cSld>
     <p:spTree>
@@ -28216,7 +29813,7 @@
 </p:sld>
 </file>
 
-<file path=ppt/slides/slide33.xml><?xml version="1.0" encoding="utf-8"?>
+<file path=ppt/slides/slide34.xml><?xml version="1.0" encoding="utf-8"?>
 <p:sld xmlns:a="http://schemas.openxmlformats.org/drawingml/2006/main" xmlns:r="http://schemas.openxmlformats.org/officeDocument/2006/relationships" xmlns:p="http://schemas.openxmlformats.org/presentationml/2006/main">
   <p:cSld>
     <p:spTree>
@@ -28348,7 +29945,7 @@
 </p:sld>
 </file>
 
-<file path=ppt/slides/slide34.xml><?xml version="1.0" encoding="utf-8"?>
+<file path=ppt/slides/slide35.xml><?xml version="1.0" encoding="utf-8"?>
 <p:sld xmlns:a="http://schemas.openxmlformats.org/drawingml/2006/main" xmlns:r="http://schemas.openxmlformats.org/officeDocument/2006/relationships" xmlns:p="http://schemas.openxmlformats.org/presentationml/2006/main">
   <p:cSld>
     <p:spTree>

</xml_diff>